<commit_message>
Made improvements to PP
</commit_message>
<xml_diff>
--- a/PracticalProject/Documentation/PP Presentation.pptx
+++ b/PracticalProject/Documentation/PP Presentation.pptx
@@ -5,7 +5,7 @@
     <p:sldMasterId id="2147483648" r:id="rId1"/>
   </p:sldMasterIdLst>
   <p:notesMasterIdLst>
-    <p:notesMasterId r:id="rId20"/>
+    <p:notesMasterId r:id="rId21"/>
   </p:notesMasterIdLst>
   <p:sldIdLst>
     <p:sldId id="256" r:id="rId2"/>
@@ -20,12 +20,13 @@
     <p:sldId id="266" r:id="rId11"/>
     <p:sldId id="263" r:id="rId12"/>
     <p:sldId id="273" r:id="rId13"/>
-    <p:sldId id="274" r:id="rId14"/>
-    <p:sldId id="275" r:id="rId15"/>
-    <p:sldId id="276" r:id="rId16"/>
-    <p:sldId id="264" r:id="rId17"/>
+    <p:sldId id="277" r:id="rId14"/>
+    <p:sldId id="274" r:id="rId15"/>
+    <p:sldId id="264" r:id="rId16"/>
+    <p:sldId id="276" r:id="rId17"/>
     <p:sldId id="269" r:id="rId18"/>
-    <p:sldId id="270" r:id="rId19"/>
+    <p:sldId id="275" r:id="rId19"/>
+    <p:sldId id="270" r:id="rId20"/>
   </p:sldIdLst>
   <p:sldSz cx="12192000" cy="6858000"/>
   <p:notesSz cx="6858000" cy="9144000"/>
@@ -6999,10 +7000,10 @@
       </p:grpSpPr>
       <p:sp>
         <p:nvSpPr>
-          <p:cNvPr id="24" name="Rectangle 23">
+          <p:cNvPr id="38" name="Rectangle 37">
             <a:extLst>
               <a:ext uri="{FF2B5EF4-FFF2-40B4-BE49-F238E27FC236}">
-                <a16:creationId xmlns:a16="http://schemas.microsoft.com/office/drawing/2014/main" id="{6753252F-4873-4F63-801D-CC719279A7D5}"/>
+                <a16:creationId xmlns:a16="http://schemas.microsoft.com/office/drawing/2014/main" id="{1707FC24-6981-43D9-B525-C7832BA22463}"/>
               </a:ext>
               <a:ext uri="{C183D7F6-B498-43B3-948B-1728B52AA6E4}">
                 <adec:decorative xmlns:adec="http://schemas.microsoft.com/office/drawing/2017/decorative" val="1"/>
@@ -7020,19 +7021,21 @@
             </p:extLst>
           </p:nvPr>
         </p:nvSpPr>
-        <p:spPr>
+        <p:spPr bwMode="ltGray">
           <a:xfrm>
-            <a:off x="0" y="0"/>
-            <a:ext cx="12192000" cy="6858000"/>
+            <a:off x="336884" y="311449"/>
+            <a:ext cx="4332307" cy="6179552"/>
           </a:xfrm>
           <a:prstGeom prst="rect">
             <a:avLst/>
           </a:prstGeom>
           <a:solidFill>
-            <a:srgbClr val="FFFFFF"/>
+            <a:srgbClr val="404040"/>
           </a:solidFill>
-          <a:ln>
-            <a:noFill/>
+          <a:ln w="127000" cap="sq" cmpd="thinThick">
+            <a:solidFill>
+              <a:srgbClr val="404040"/>
+            </a:solidFill>
           </a:ln>
         </p:spPr>
         <p:style>
@@ -7062,10 +7065,176 @@
       </p:sp>
       <p:sp>
         <p:nvSpPr>
-          <p:cNvPr id="26" name="Rectangle 25">
+          <p:cNvPr id="2" name="Title 1">
             <a:extLst>
               <a:ext uri="{FF2B5EF4-FFF2-40B4-BE49-F238E27FC236}">
-                <a16:creationId xmlns:a16="http://schemas.microsoft.com/office/drawing/2014/main" id="{047C8CCB-F95D-4249-92DD-651249D3535A}"/>
+                <a16:creationId xmlns:a16="http://schemas.microsoft.com/office/drawing/2014/main" id="{F702E1B9-A07E-BD3E-DFF1-D7ED4137494E}"/>
+              </a:ext>
+            </a:extLst>
+          </p:cNvPr>
+          <p:cNvSpPr>
+            <a:spLocks noGrp="1"/>
+          </p:cNvSpPr>
+          <p:nvPr>
+            <p:ph type="title"/>
+          </p:nvPr>
+        </p:nvSpPr>
+        <p:spPr>
+          <a:xfrm>
+            <a:off x="742950" y="742951"/>
+            <a:ext cx="3476625" cy="4962524"/>
+          </a:xfrm>
+        </p:spPr>
+        <p:txBody>
+          <a:bodyPr vert="horz" lIns="91440" tIns="45720" rIns="91440" bIns="45720" rtlCol="0" anchor="ctr">
+            <a:normAutofit/>
+          </a:bodyPr>
+          <a:lstStyle/>
+          <a:p>
+            <a:pPr algn="ctr"/>
+            <a:r>
+              <a:rPr lang="en-US" sz="4800" kern="1200">
+                <a:solidFill>
+                  <a:srgbClr val="FFFFFF"/>
+                </a:solidFill>
+                <a:latin typeface="+mj-lt"/>
+                <a:ea typeface="+mj-ea"/>
+                <a:cs typeface="+mj-cs"/>
+              </a:rPr>
+              <a:t>Version Control – Feature Branch Model (FBM)</a:t>
+            </a:r>
+          </a:p>
+        </p:txBody>
+      </p:sp>
+      <p:pic>
+        <p:nvPicPr>
+          <p:cNvPr id="4" name="Picture 3">
+            <a:extLst>
+              <a:ext uri="{FF2B5EF4-FFF2-40B4-BE49-F238E27FC236}">
+                <a16:creationId xmlns:a16="http://schemas.microsoft.com/office/drawing/2014/main" id="{AD6ED0FB-1B43-D247-A7E1-79E77F874A79}"/>
+              </a:ext>
+            </a:extLst>
+          </p:cNvPr>
+          <p:cNvPicPr>
+            <a:picLocks noChangeAspect="1"/>
+          </p:cNvPicPr>
+          <p:nvPr/>
+        </p:nvPicPr>
+        <p:blipFill>
+          <a:blip r:embed="rId2"/>
+          <a:stretch>
+            <a:fillRect/>
+          </a:stretch>
+        </p:blipFill>
+        <p:spPr>
+          <a:xfrm>
+            <a:off x="5075257" y="823977"/>
+            <a:ext cx="6553545" cy="4800472"/>
+          </a:xfrm>
+          <a:prstGeom prst="rect">
+            <a:avLst/>
+          </a:prstGeom>
+        </p:spPr>
+      </p:pic>
+    </p:spTree>
+    <p:extLst>
+      <p:ext uri="{BB962C8B-B14F-4D97-AF65-F5344CB8AC3E}">
+        <p14:creationId xmlns:p14="http://schemas.microsoft.com/office/powerpoint/2010/main" val="2302782993"/>
+      </p:ext>
+    </p:extLst>
+  </p:cSld>
+  <p:clrMapOvr>
+    <a:masterClrMapping/>
+  </p:clrMapOvr>
+</p:sld>
+</file>
+
+<file path=ppt/slides/slide12.xml><?xml version="1.0" encoding="utf-8"?>
+<p:sld xmlns:a="http://schemas.openxmlformats.org/drawingml/2006/main" xmlns:r="http://schemas.openxmlformats.org/officeDocument/2006/relationships" xmlns:p="http://schemas.openxmlformats.org/presentationml/2006/main">
+  <p:cSld>
+    <p:bg>
+      <p:bgPr>
+        <a:solidFill>
+          <a:schemeClr val="bg1"/>
+        </a:solidFill>
+        <a:effectLst/>
+      </p:bgPr>
+    </p:bg>
+    <p:spTree>
+      <p:nvGrpSpPr>
+        <p:cNvPr id="1" name=""/>
+        <p:cNvGrpSpPr/>
+        <p:nvPr/>
+      </p:nvGrpSpPr>
+      <p:grpSpPr>
+        <a:xfrm>
+          <a:off x="0" y="0"/>
+          <a:ext cx="0" cy="0"/>
+          <a:chOff x="0" y="0"/>
+          <a:chExt cx="0" cy="0"/>
+        </a:xfrm>
+      </p:grpSpPr>
+      <p:cxnSp>
+        <p:nvCxnSpPr>
+          <p:cNvPr id="26" name="Straight Connector 20">
+            <a:extLst>
+              <a:ext uri="{FF2B5EF4-FFF2-40B4-BE49-F238E27FC236}">
+                <a16:creationId xmlns:a16="http://schemas.microsoft.com/office/drawing/2014/main" id="{D2E961F1-4A28-4A5F-BBD4-6E400E5E6C75}"/>
+              </a:ext>
+              <a:ext uri="{C183D7F6-B498-43B3-948B-1728B52AA6E4}">
+                <adec:decorative xmlns:adec="http://schemas.microsoft.com/office/drawing/2017/decorative" val="1"/>
+              </a:ext>
+            </a:extLst>
+          </p:cNvPr>
+          <p:cNvCxnSpPr>
+            <a:cxnSpLocks noGrp="1" noRot="1" noChangeAspect="1" noMove="1" noResize="1" noEditPoints="1" noAdjustHandles="1" noChangeArrowheads="1" noChangeShapeType="1"/>
+          </p:cNvCxnSpPr>
+          <p:nvPr>
+            <p:extLst>
+              <p:ext uri="{386F3935-93C4-4BCD-93E2-E3B085C9AB24}">
+                <p16:designElem xmlns:p16="http://schemas.microsoft.com/office/powerpoint/2015/main" val="1"/>
+              </p:ext>
+            </p:extLst>
+          </p:nvPr>
+        </p:nvCxnSpPr>
+        <p:spPr bwMode="white">
+          <a:xfrm>
+            <a:off x="0" y="272357"/>
+            <a:ext cx="12188824" cy="0"/>
+          </a:xfrm>
+          <a:prstGeom prst="line">
+            <a:avLst/>
+          </a:prstGeom>
+          <a:ln w="50800">
+            <a:solidFill>
+              <a:schemeClr val="tx1">
+                <a:lumMod val="75000"/>
+                <a:lumOff val="25000"/>
+              </a:schemeClr>
+            </a:solidFill>
+          </a:ln>
+        </p:spPr>
+        <p:style>
+          <a:lnRef idx="1">
+            <a:schemeClr val="accent1"/>
+          </a:lnRef>
+          <a:fillRef idx="0">
+            <a:schemeClr val="accent1"/>
+          </a:fillRef>
+          <a:effectRef idx="0">
+            <a:schemeClr val="accent1"/>
+          </a:effectRef>
+          <a:fontRef idx="minor">
+            <a:schemeClr val="tx1"/>
+          </a:fontRef>
+        </p:style>
+      </p:cxnSp>
+      <p:sp>
+        <p:nvSpPr>
+          <p:cNvPr id="28" name="Rectangle 22">
+            <a:extLst>
+              <a:ext uri="{FF2B5EF4-FFF2-40B4-BE49-F238E27FC236}">
+                <a16:creationId xmlns:a16="http://schemas.microsoft.com/office/drawing/2014/main" id="{7F57BEA8-497D-4AA8-8A18-BDCD696B25FE}"/>
               </a:ext>
               <a:ext uri="{C183D7F6-B498-43B3-948B-1728B52AA6E4}">
                 <adec:decorative xmlns:adec="http://schemas.microsoft.com/office/drawing/2017/decorative" val="1"/>
@@ -7085,14 +7254,17 @@
         </p:nvSpPr>
         <p:spPr>
           <a:xfrm>
-            <a:off x="0" y="0"/>
-            <a:ext cx="2013557" cy="6858000"/>
+            <a:off x="0" y="368596"/>
+            <a:ext cx="12192000" cy="1735555"/>
           </a:xfrm>
           <a:prstGeom prst="rect">
             <a:avLst/>
           </a:prstGeom>
           <a:solidFill>
-            <a:srgbClr val="205E4E"/>
+            <a:schemeClr val="tx1">
+              <a:lumMod val="75000"/>
+              <a:lumOff val="25000"/>
+            </a:schemeClr>
           </a:solidFill>
           <a:ln>
             <a:noFill/>
@@ -7128,7 +7300,7 @@
           <p:cNvPr id="2" name="Title 1">
             <a:extLst>
               <a:ext uri="{FF2B5EF4-FFF2-40B4-BE49-F238E27FC236}">
-                <a16:creationId xmlns:a16="http://schemas.microsoft.com/office/drawing/2014/main" id="{F702E1B9-A07E-BD3E-DFF1-D7ED4137494E}"/>
+                <a16:creationId xmlns:a16="http://schemas.microsoft.com/office/drawing/2014/main" id="{4417C6E9-3EAC-C3DA-14BC-C170D0B2D3BF}"/>
               </a:ext>
             </a:extLst>
           </p:cNvPr>
@@ -7141,46 +7313,176 @@
         </p:nvSpPr>
         <p:spPr>
           <a:xfrm>
-            <a:off x="640080" y="2074363"/>
-            <a:ext cx="2752354" cy="2709275"/>
+            <a:off x="526073" y="489439"/>
+            <a:ext cx="11139854" cy="930447"/>
           </a:xfrm>
-          <a:prstGeom prst="ellipse">
-            <a:avLst/>
-          </a:prstGeom>
-          <a:solidFill>
-            <a:srgbClr val="262626"/>
-          </a:solidFill>
-          <a:ln w="174625" cmpd="thinThick">
-            <a:solidFill>
-              <a:srgbClr val="262626"/>
-            </a:solidFill>
-          </a:ln>
         </p:spPr>
         <p:txBody>
-          <a:bodyPr vert="horz" lIns="91440" tIns="45720" rIns="91440" bIns="45720" rtlCol="0" anchor="ctr">
+          <a:bodyPr vert="horz" lIns="91440" tIns="45720" rIns="91440" bIns="45720" rtlCol="0" anchor="b">
             <a:normAutofit/>
           </a:bodyPr>
           <a:lstStyle/>
           <a:p>
             <a:pPr algn="ctr"/>
             <a:r>
-              <a:rPr lang="en-US" sz="2600" kern="1200">
+              <a:rPr lang="en-US" sz="5400" kern="1200">
                 <a:solidFill>
-                  <a:srgbClr val="FFFFFF"/>
+                  <a:schemeClr val="bg1"/>
                 </a:solidFill>
                 <a:latin typeface="+mj-lt"/>
                 <a:ea typeface="+mj-ea"/>
                 <a:cs typeface="+mj-cs"/>
               </a:rPr>
-              <a:t>Version Control – Feature Branch Model (FBM)</a:t>
+              <a:t>Postman</a:t>
             </a:r>
           </a:p>
         </p:txBody>
       </p:sp>
+      <p:cxnSp>
+        <p:nvCxnSpPr>
+          <p:cNvPr id="25" name="Straight Connector 24">
+            <a:extLst>
+              <a:ext uri="{FF2B5EF4-FFF2-40B4-BE49-F238E27FC236}">
+                <a16:creationId xmlns:a16="http://schemas.microsoft.com/office/drawing/2014/main" id="{A82415D3-DDE5-4D63-8CB3-23A5EC581B27}"/>
+              </a:ext>
+              <a:ext uri="{C183D7F6-B498-43B3-948B-1728B52AA6E4}">
+                <adec:decorative xmlns:adec="http://schemas.microsoft.com/office/drawing/2017/decorative" val="1"/>
+              </a:ext>
+            </a:extLst>
+          </p:cNvPr>
+          <p:cNvCxnSpPr>
+            <a:cxnSpLocks noGrp="1" noRot="1" noChangeAspect="1" noMove="1" noResize="1" noEditPoints="1" noAdjustHandles="1" noChangeArrowheads="1" noChangeShapeType="1"/>
+          </p:cNvCxnSpPr>
+          <p:nvPr>
+            <p:extLst>
+              <p:ext uri="{386F3935-93C4-4BCD-93E2-E3B085C9AB24}">
+                <p16:designElem xmlns:p16="http://schemas.microsoft.com/office/powerpoint/2015/main" val="1"/>
+              </p:ext>
+            </p:extLst>
+          </p:nvPr>
+        </p:nvCxnSpPr>
+        <p:spPr>
+          <a:xfrm>
+            <a:off x="4724400" y="1479733"/>
+            <a:ext cx="2743200" cy="0"/>
+          </a:xfrm>
+          <a:prstGeom prst="line">
+            <a:avLst/>
+          </a:prstGeom>
+          <a:ln w="19050">
+            <a:solidFill>
+              <a:schemeClr val="bg1">
+                <a:alpha val="75000"/>
+              </a:schemeClr>
+            </a:solidFill>
+          </a:ln>
+        </p:spPr>
+        <p:style>
+          <a:lnRef idx="1">
+            <a:schemeClr val="accent1"/>
+          </a:lnRef>
+          <a:fillRef idx="0">
+            <a:schemeClr val="accent1"/>
+          </a:fillRef>
+          <a:effectRef idx="0">
+            <a:schemeClr val="accent1"/>
+          </a:effectRef>
+          <a:fontRef idx="minor">
+            <a:schemeClr val="tx1"/>
+          </a:fontRef>
+        </p:style>
+      </p:cxnSp>
+      <p:cxnSp>
+        <p:nvCxnSpPr>
+          <p:cNvPr id="27" name="Straight Connector 26">
+            <a:extLst>
+              <a:ext uri="{FF2B5EF4-FFF2-40B4-BE49-F238E27FC236}">
+                <a16:creationId xmlns:a16="http://schemas.microsoft.com/office/drawing/2014/main" id="{AD7193FB-6AE6-4B3B-8F89-56B55DD63B4D}"/>
+              </a:ext>
+              <a:ext uri="{C183D7F6-B498-43B3-948B-1728B52AA6E4}">
+                <adec:decorative xmlns:adec="http://schemas.microsoft.com/office/drawing/2017/decorative" val="1"/>
+              </a:ext>
+            </a:extLst>
+          </p:cNvPr>
+          <p:cNvCxnSpPr>
+            <a:cxnSpLocks noGrp="1" noRot="1" noChangeAspect="1" noMove="1" noResize="1" noEditPoints="1" noAdjustHandles="1" noChangeArrowheads="1" noChangeShapeType="1"/>
+          </p:cNvCxnSpPr>
+          <p:nvPr>
+            <p:extLst>
+              <p:ext uri="{386F3935-93C4-4BCD-93E2-E3B085C9AB24}">
+                <p16:designElem xmlns:p16="http://schemas.microsoft.com/office/powerpoint/2015/main" val="1"/>
+              </p:ext>
+            </p:extLst>
+          </p:nvPr>
+        </p:nvCxnSpPr>
+        <p:spPr bwMode="white">
+          <a:xfrm>
+            <a:off x="0" y="2201402"/>
+            <a:ext cx="12188824" cy="0"/>
+          </a:xfrm>
+          <a:prstGeom prst="line">
+            <a:avLst/>
+          </a:prstGeom>
+          <a:ln w="50800">
+            <a:solidFill>
+              <a:schemeClr val="tx1">
+                <a:lumMod val="75000"/>
+                <a:lumOff val="25000"/>
+              </a:schemeClr>
+            </a:solidFill>
+          </a:ln>
+        </p:spPr>
+        <p:style>
+          <a:lnRef idx="1">
+            <a:schemeClr val="accent1"/>
+          </a:lnRef>
+          <a:fillRef idx="0">
+            <a:schemeClr val="accent1"/>
+          </a:fillRef>
+          <a:effectRef idx="0">
+            <a:schemeClr val="accent1"/>
+          </a:effectRef>
+          <a:fontRef idx="minor">
+            <a:schemeClr val="tx1"/>
+          </a:fontRef>
+        </p:style>
+      </p:cxnSp>
+      <p:pic>
+        <p:nvPicPr>
+          <p:cNvPr id="5" name="Content Placeholder 4">
+            <a:extLst>
+              <a:ext uri="{FF2B5EF4-FFF2-40B4-BE49-F238E27FC236}">
+                <a16:creationId xmlns:a16="http://schemas.microsoft.com/office/drawing/2014/main" id="{93FF4B53-5D80-02AA-2A91-25AF41760FD2}"/>
+              </a:ext>
+            </a:extLst>
+          </p:cNvPr>
+          <p:cNvPicPr>
+            <a:picLocks noGrp="1" noChangeAspect="1"/>
+          </p:cNvPicPr>
+          <p:nvPr>
+            <p:ph idx="1"/>
+          </p:nvPr>
+        </p:nvPicPr>
+        <p:blipFill>
+          <a:blip r:embed="rId2"/>
+          <a:stretch>
+            <a:fillRect/>
+          </a:stretch>
+        </p:blipFill>
+        <p:spPr>
+          <a:xfrm>
+            <a:off x="1202124" y="2298654"/>
+            <a:ext cx="9784576" cy="4305213"/>
+          </a:xfrm>
+          <a:prstGeom prst="rect">
+            <a:avLst/>
+          </a:prstGeom>
+        </p:spPr>
+      </p:pic>
     </p:spTree>
     <p:extLst>
       <p:ext uri="{BB962C8B-B14F-4D97-AF65-F5344CB8AC3E}">
-        <p14:creationId xmlns:p14="http://schemas.microsoft.com/office/powerpoint/2010/main" val="2302782993"/>
+        <p14:creationId xmlns:p14="http://schemas.microsoft.com/office/powerpoint/2010/main" val="1255525579"/>
       </p:ext>
     </p:extLst>
   </p:cSld>
@@ -7190,9 +7492,17 @@
 </p:sld>
 </file>
 
-<file path=ppt/slides/slide12.xml><?xml version="1.0" encoding="utf-8"?>
+<file path=ppt/slides/slide13.xml><?xml version="1.0" encoding="utf-8"?>
 <p:sld xmlns:a="http://schemas.openxmlformats.org/drawingml/2006/main" xmlns:r="http://schemas.openxmlformats.org/officeDocument/2006/relationships" xmlns:p="http://schemas.openxmlformats.org/presentationml/2006/main">
   <p:cSld>
+    <p:bg>
+      <p:bgPr>
+        <a:solidFill>
+          <a:schemeClr val="bg1"/>
+        </a:solidFill>
+        <a:effectLst/>
+      </p:bgPr>
+    </p:bg>
     <p:spTree>
       <p:nvGrpSpPr>
         <p:cNvPr id="1" name=""/>
@@ -7209,6 +7519,3711 @@
       </p:grpSpPr>
       <p:sp>
         <p:nvSpPr>
+          <p:cNvPr id="42" name="Rectangle 41">
+            <a:extLst>
+              <a:ext uri="{FF2B5EF4-FFF2-40B4-BE49-F238E27FC236}">
+                <a16:creationId xmlns:a16="http://schemas.microsoft.com/office/drawing/2014/main" id="{1825AC39-5F85-4CAA-8A81-A1287086B2B6}"/>
+              </a:ext>
+              <a:ext uri="{C183D7F6-B498-43B3-948B-1728B52AA6E4}">
+                <adec:decorative xmlns:adec="http://schemas.microsoft.com/office/drawing/2017/decorative" val="1"/>
+              </a:ext>
+            </a:extLst>
+          </p:cNvPr>
+          <p:cNvSpPr>
+            <a:spLocks noGrp="1" noRot="1" noChangeAspect="1" noMove="1" noResize="1" noEditPoints="1" noAdjustHandles="1" noChangeArrowheads="1" noChangeShapeType="1" noTextEdit="1"/>
+          </p:cNvSpPr>
+          <p:nvPr>
+            <p:extLst>
+              <p:ext uri="{386F3935-93C4-4BCD-93E2-E3B085C9AB24}">
+                <p16:designElem xmlns:p16="http://schemas.microsoft.com/office/powerpoint/2015/main" val="1"/>
+              </p:ext>
+            </p:extLst>
+          </p:nvPr>
+        </p:nvSpPr>
+        <p:spPr>
+          <a:xfrm>
+            <a:off x="0" y="0"/>
+            <a:ext cx="12192000" cy="6858000"/>
+          </a:xfrm>
+          <a:prstGeom prst="rect">
+            <a:avLst/>
+          </a:prstGeom>
+          <a:solidFill>
+            <a:srgbClr val="FFFFFF"/>
+          </a:solidFill>
+          <a:ln w="12700" cap="flat" cmpd="sng" algn="ctr">
+            <a:noFill/>
+            <a:prstDash val="solid"/>
+            <a:miter lim="800000"/>
+          </a:ln>
+          <a:effectLst/>
+        </p:spPr>
+        <p:style>
+          <a:lnRef idx="2">
+            <a:schemeClr val="accent1">
+              <a:shade val="50000"/>
+            </a:schemeClr>
+          </a:lnRef>
+          <a:fillRef idx="1">
+            <a:schemeClr val="accent1"/>
+          </a:fillRef>
+          <a:effectRef idx="0">
+            <a:schemeClr val="accent1"/>
+          </a:effectRef>
+          <a:fontRef idx="minor">
+            <a:schemeClr val="lt1"/>
+          </a:fontRef>
+        </p:style>
+        <p:txBody>
+          <a:bodyPr rtlCol="0" anchor="ctr"/>
+          <a:lstStyle/>
+          <a:p>
+            <a:pPr algn="ctr"/>
+            <a:endParaRPr lang="en-US" dirty="0"/>
+          </a:p>
+        </p:txBody>
+      </p:sp>
+      <p:sp>
+        <p:nvSpPr>
+          <p:cNvPr id="44" name="Freeform: Shape 43">
+            <a:extLst>
+              <a:ext uri="{FF2B5EF4-FFF2-40B4-BE49-F238E27FC236}">
+                <a16:creationId xmlns:a16="http://schemas.microsoft.com/office/drawing/2014/main" id="{95DA4D23-37FC-4B90-8188-F0377C5FF44B}"/>
+              </a:ext>
+              <a:ext uri="{C183D7F6-B498-43B3-948B-1728B52AA6E4}">
+                <adec:decorative xmlns:adec="http://schemas.microsoft.com/office/drawing/2017/decorative" val="1"/>
+              </a:ext>
+            </a:extLst>
+          </p:cNvPr>
+          <p:cNvSpPr>
+            <a:spLocks noGrp="1" noRot="1" noChangeAspect="1" noMove="1" noResize="1" noEditPoints="1" noAdjustHandles="1" noChangeArrowheads="1" noChangeShapeType="1" noTextEdit="1"/>
+          </p:cNvSpPr>
+          <p:nvPr>
+            <p:extLst>
+              <p:ext uri="{386F3935-93C4-4BCD-93E2-E3B085C9AB24}">
+                <p16:designElem xmlns:p16="http://schemas.microsoft.com/office/powerpoint/2015/main" val="1"/>
+              </p:ext>
+            </p:extLst>
+          </p:nvPr>
+        </p:nvSpPr>
+        <p:spPr bwMode="ltGray">
+          <a:xfrm>
+            <a:off x="0" y="0"/>
+            <a:ext cx="4417162" cy="6858000"/>
+          </a:xfrm>
+          <a:custGeom>
+            <a:avLst/>
+            <a:gdLst>
+              <a:gd name="connsiteX0" fmla="*/ 0 w 4417162"/>
+              <a:gd name="connsiteY0" fmla="*/ 0 h 6858000"/>
+              <a:gd name="connsiteX1" fmla="*/ 144378 w 4417162"/>
+              <a:gd name="connsiteY1" fmla="*/ 0 h 6858000"/>
+              <a:gd name="connsiteX2" fmla="*/ 2310062 w 4417162"/>
+              <a:gd name="connsiteY2" fmla="*/ 0 h 6858000"/>
+              <a:gd name="connsiteX3" fmla="*/ 4227367 w 4417162"/>
+              <a:gd name="connsiteY3" fmla="*/ 0 h 6858000"/>
+              <a:gd name="connsiteX4" fmla="*/ 4232407 w 4417162"/>
+              <a:gd name="connsiteY4" fmla="*/ 66675 h 6858000"/>
+              <a:gd name="connsiteX5" fmla="*/ 4240804 w 4417162"/>
+              <a:gd name="connsiteY5" fmla="*/ 122237 h 6858000"/>
+              <a:gd name="connsiteX6" fmla="*/ 4250882 w 4417162"/>
+              <a:gd name="connsiteY6" fmla="*/ 174625 h 6858000"/>
+              <a:gd name="connsiteX7" fmla="*/ 4267678 w 4417162"/>
+              <a:gd name="connsiteY7" fmla="*/ 217487 h 6858000"/>
+              <a:gd name="connsiteX8" fmla="*/ 4284474 w 4417162"/>
+              <a:gd name="connsiteY8" fmla="*/ 260350 h 6858000"/>
+              <a:gd name="connsiteX9" fmla="*/ 4304629 w 4417162"/>
+              <a:gd name="connsiteY9" fmla="*/ 296862 h 6858000"/>
+              <a:gd name="connsiteX10" fmla="*/ 4324784 w 4417162"/>
+              <a:gd name="connsiteY10" fmla="*/ 334962 h 6858000"/>
+              <a:gd name="connsiteX11" fmla="*/ 4343260 w 4417162"/>
+              <a:gd name="connsiteY11" fmla="*/ 369887 h 6858000"/>
+              <a:gd name="connsiteX12" fmla="*/ 4361735 w 4417162"/>
+              <a:gd name="connsiteY12" fmla="*/ 409575 h 6858000"/>
+              <a:gd name="connsiteX13" fmla="*/ 4378531 w 4417162"/>
+              <a:gd name="connsiteY13" fmla="*/ 450850 h 6858000"/>
+              <a:gd name="connsiteX14" fmla="*/ 4393648 w 4417162"/>
+              <a:gd name="connsiteY14" fmla="*/ 496887 h 6858000"/>
+              <a:gd name="connsiteX15" fmla="*/ 4405405 w 4417162"/>
+              <a:gd name="connsiteY15" fmla="*/ 546100 h 6858000"/>
+              <a:gd name="connsiteX16" fmla="*/ 4413803 w 4417162"/>
+              <a:gd name="connsiteY16" fmla="*/ 606425 h 6858000"/>
+              <a:gd name="connsiteX17" fmla="*/ 4417162 w 4417162"/>
+              <a:gd name="connsiteY17" fmla="*/ 673100 h 6858000"/>
+              <a:gd name="connsiteX18" fmla="*/ 4413803 w 4417162"/>
+              <a:gd name="connsiteY18" fmla="*/ 744537 h 6858000"/>
+              <a:gd name="connsiteX19" fmla="*/ 4405405 w 4417162"/>
+              <a:gd name="connsiteY19" fmla="*/ 801687 h 6858000"/>
+              <a:gd name="connsiteX20" fmla="*/ 4393648 w 4417162"/>
+              <a:gd name="connsiteY20" fmla="*/ 854075 h 6858000"/>
+              <a:gd name="connsiteX21" fmla="*/ 4378531 w 4417162"/>
+              <a:gd name="connsiteY21" fmla="*/ 901700 h 6858000"/>
+              <a:gd name="connsiteX22" fmla="*/ 4361735 w 4417162"/>
+              <a:gd name="connsiteY22" fmla="*/ 942975 h 6858000"/>
+              <a:gd name="connsiteX23" fmla="*/ 4341580 w 4417162"/>
+              <a:gd name="connsiteY23" fmla="*/ 981075 h 6858000"/>
+              <a:gd name="connsiteX24" fmla="*/ 4321425 w 4417162"/>
+              <a:gd name="connsiteY24" fmla="*/ 1017587 h 6858000"/>
+              <a:gd name="connsiteX25" fmla="*/ 4301270 w 4417162"/>
+              <a:gd name="connsiteY25" fmla="*/ 1055687 h 6858000"/>
+              <a:gd name="connsiteX26" fmla="*/ 4282794 w 4417162"/>
+              <a:gd name="connsiteY26" fmla="*/ 1095375 h 6858000"/>
+              <a:gd name="connsiteX27" fmla="*/ 4264318 w 4417162"/>
+              <a:gd name="connsiteY27" fmla="*/ 1136650 h 6858000"/>
+              <a:gd name="connsiteX28" fmla="*/ 4249203 w 4417162"/>
+              <a:gd name="connsiteY28" fmla="*/ 1182687 h 6858000"/>
+              <a:gd name="connsiteX29" fmla="*/ 4239125 w 4417162"/>
+              <a:gd name="connsiteY29" fmla="*/ 1235075 h 6858000"/>
+              <a:gd name="connsiteX30" fmla="*/ 4229047 w 4417162"/>
+              <a:gd name="connsiteY30" fmla="*/ 1295400 h 6858000"/>
+              <a:gd name="connsiteX31" fmla="*/ 4227367 w 4417162"/>
+              <a:gd name="connsiteY31" fmla="*/ 1363662 h 6858000"/>
+              <a:gd name="connsiteX32" fmla="*/ 4229047 w 4417162"/>
+              <a:gd name="connsiteY32" fmla="*/ 1431925 h 6858000"/>
+              <a:gd name="connsiteX33" fmla="*/ 4239125 w 4417162"/>
+              <a:gd name="connsiteY33" fmla="*/ 1492250 h 6858000"/>
+              <a:gd name="connsiteX34" fmla="*/ 4249203 w 4417162"/>
+              <a:gd name="connsiteY34" fmla="*/ 1544637 h 6858000"/>
+              <a:gd name="connsiteX35" fmla="*/ 4264318 w 4417162"/>
+              <a:gd name="connsiteY35" fmla="*/ 1589087 h 6858000"/>
+              <a:gd name="connsiteX36" fmla="*/ 4282794 w 4417162"/>
+              <a:gd name="connsiteY36" fmla="*/ 1631950 h 6858000"/>
+              <a:gd name="connsiteX37" fmla="*/ 4301270 w 4417162"/>
+              <a:gd name="connsiteY37" fmla="*/ 1671637 h 6858000"/>
+              <a:gd name="connsiteX38" fmla="*/ 4321425 w 4417162"/>
+              <a:gd name="connsiteY38" fmla="*/ 1708150 h 6858000"/>
+              <a:gd name="connsiteX39" fmla="*/ 4341580 w 4417162"/>
+              <a:gd name="connsiteY39" fmla="*/ 1743075 h 6858000"/>
+              <a:gd name="connsiteX40" fmla="*/ 4361735 w 4417162"/>
+              <a:gd name="connsiteY40" fmla="*/ 1782762 h 6858000"/>
+              <a:gd name="connsiteX41" fmla="*/ 4378531 w 4417162"/>
+              <a:gd name="connsiteY41" fmla="*/ 1824037 h 6858000"/>
+              <a:gd name="connsiteX42" fmla="*/ 4393648 w 4417162"/>
+              <a:gd name="connsiteY42" fmla="*/ 1870075 h 6858000"/>
+              <a:gd name="connsiteX43" fmla="*/ 4405405 w 4417162"/>
+              <a:gd name="connsiteY43" fmla="*/ 1922462 h 6858000"/>
+              <a:gd name="connsiteX44" fmla="*/ 4413803 w 4417162"/>
+              <a:gd name="connsiteY44" fmla="*/ 1982787 h 6858000"/>
+              <a:gd name="connsiteX45" fmla="*/ 4417162 w 4417162"/>
+              <a:gd name="connsiteY45" fmla="*/ 2051050 h 6858000"/>
+              <a:gd name="connsiteX46" fmla="*/ 4413803 w 4417162"/>
+              <a:gd name="connsiteY46" fmla="*/ 2119312 h 6858000"/>
+              <a:gd name="connsiteX47" fmla="*/ 4405405 w 4417162"/>
+              <a:gd name="connsiteY47" fmla="*/ 2179637 h 6858000"/>
+              <a:gd name="connsiteX48" fmla="*/ 4393648 w 4417162"/>
+              <a:gd name="connsiteY48" fmla="*/ 2232025 h 6858000"/>
+              <a:gd name="connsiteX49" fmla="*/ 4378531 w 4417162"/>
+              <a:gd name="connsiteY49" fmla="*/ 2278062 h 6858000"/>
+              <a:gd name="connsiteX50" fmla="*/ 4361735 w 4417162"/>
+              <a:gd name="connsiteY50" fmla="*/ 2319337 h 6858000"/>
+              <a:gd name="connsiteX51" fmla="*/ 4341580 w 4417162"/>
+              <a:gd name="connsiteY51" fmla="*/ 2359025 h 6858000"/>
+              <a:gd name="connsiteX52" fmla="*/ 4321425 w 4417162"/>
+              <a:gd name="connsiteY52" fmla="*/ 2395537 h 6858000"/>
+              <a:gd name="connsiteX53" fmla="*/ 4301270 w 4417162"/>
+              <a:gd name="connsiteY53" fmla="*/ 2433637 h 6858000"/>
+              <a:gd name="connsiteX54" fmla="*/ 4282794 w 4417162"/>
+              <a:gd name="connsiteY54" fmla="*/ 2471737 h 6858000"/>
+              <a:gd name="connsiteX55" fmla="*/ 4264318 w 4417162"/>
+              <a:gd name="connsiteY55" fmla="*/ 2513012 h 6858000"/>
+              <a:gd name="connsiteX56" fmla="*/ 4249203 w 4417162"/>
+              <a:gd name="connsiteY56" fmla="*/ 2560637 h 6858000"/>
+              <a:gd name="connsiteX57" fmla="*/ 4239125 w 4417162"/>
+              <a:gd name="connsiteY57" fmla="*/ 2613025 h 6858000"/>
+              <a:gd name="connsiteX58" fmla="*/ 4229047 w 4417162"/>
+              <a:gd name="connsiteY58" fmla="*/ 2671762 h 6858000"/>
+              <a:gd name="connsiteX59" fmla="*/ 4227367 w 4417162"/>
+              <a:gd name="connsiteY59" fmla="*/ 2741612 h 6858000"/>
+              <a:gd name="connsiteX60" fmla="*/ 4229047 w 4417162"/>
+              <a:gd name="connsiteY60" fmla="*/ 2809875 h 6858000"/>
+              <a:gd name="connsiteX61" fmla="*/ 4239125 w 4417162"/>
+              <a:gd name="connsiteY61" fmla="*/ 2868612 h 6858000"/>
+              <a:gd name="connsiteX62" fmla="*/ 4249203 w 4417162"/>
+              <a:gd name="connsiteY62" fmla="*/ 2922587 h 6858000"/>
+              <a:gd name="connsiteX63" fmla="*/ 4264318 w 4417162"/>
+              <a:gd name="connsiteY63" fmla="*/ 2967037 h 6858000"/>
+              <a:gd name="connsiteX64" fmla="*/ 4282794 w 4417162"/>
+              <a:gd name="connsiteY64" fmla="*/ 3009900 h 6858000"/>
+              <a:gd name="connsiteX65" fmla="*/ 4301270 w 4417162"/>
+              <a:gd name="connsiteY65" fmla="*/ 3046412 h 6858000"/>
+              <a:gd name="connsiteX66" fmla="*/ 4321425 w 4417162"/>
+              <a:gd name="connsiteY66" fmla="*/ 3084512 h 6858000"/>
+              <a:gd name="connsiteX67" fmla="*/ 4341580 w 4417162"/>
+              <a:gd name="connsiteY67" fmla="*/ 3121025 h 6858000"/>
+              <a:gd name="connsiteX68" fmla="*/ 4361735 w 4417162"/>
+              <a:gd name="connsiteY68" fmla="*/ 3160712 h 6858000"/>
+              <a:gd name="connsiteX69" fmla="*/ 4378531 w 4417162"/>
+              <a:gd name="connsiteY69" fmla="*/ 3201987 h 6858000"/>
+              <a:gd name="connsiteX70" fmla="*/ 4393648 w 4417162"/>
+              <a:gd name="connsiteY70" fmla="*/ 3248025 h 6858000"/>
+              <a:gd name="connsiteX71" fmla="*/ 4405405 w 4417162"/>
+              <a:gd name="connsiteY71" fmla="*/ 3300412 h 6858000"/>
+              <a:gd name="connsiteX72" fmla="*/ 4413803 w 4417162"/>
+              <a:gd name="connsiteY72" fmla="*/ 3360737 h 6858000"/>
+              <a:gd name="connsiteX73" fmla="*/ 4417162 w 4417162"/>
+              <a:gd name="connsiteY73" fmla="*/ 3427412 h 6858000"/>
+              <a:gd name="connsiteX74" fmla="*/ 4413803 w 4417162"/>
+              <a:gd name="connsiteY74" fmla="*/ 3497262 h 6858000"/>
+              <a:gd name="connsiteX75" fmla="*/ 4405405 w 4417162"/>
+              <a:gd name="connsiteY75" fmla="*/ 3557587 h 6858000"/>
+              <a:gd name="connsiteX76" fmla="*/ 4393648 w 4417162"/>
+              <a:gd name="connsiteY76" fmla="*/ 3609975 h 6858000"/>
+              <a:gd name="connsiteX77" fmla="*/ 4378531 w 4417162"/>
+              <a:gd name="connsiteY77" fmla="*/ 3656012 h 6858000"/>
+              <a:gd name="connsiteX78" fmla="*/ 4361735 w 4417162"/>
+              <a:gd name="connsiteY78" fmla="*/ 3697287 h 6858000"/>
+              <a:gd name="connsiteX79" fmla="*/ 4341580 w 4417162"/>
+              <a:gd name="connsiteY79" fmla="*/ 3736975 h 6858000"/>
+              <a:gd name="connsiteX80" fmla="*/ 4301270 w 4417162"/>
+              <a:gd name="connsiteY80" fmla="*/ 3811587 h 6858000"/>
+              <a:gd name="connsiteX81" fmla="*/ 4282794 w 4417162"/>
+              <a:gd name="connsiteY81" fmla="*/ 3848100 h 6858000"/>
+              <a:gd name="connsiteX82" fmla="*/ 4264318 w 4417162"/>
+              <a:gd name="connsiteY82" fmla="*/ 3890962 h 6858000"/>
+              <a:gd name="connsiteX83" fmla="*/ 4249203 w 4417162"/>
+              <a:gd name="connsiteY83" fmla="*/ 3935412 h 6858000"/>
+              <a:gd name="connsiteX84" fmla="*/ 4239125 w 4417162"/>
+              <a:gd name="connsiteY84" fmla="*/ 3987800 h 6858000"/>
+              <a:gd name="connsiteX85" fmla="*/ 4229047 w 4417162"/>
+              <a:gd name="connsiteY85" fmla="*/ 4048125 h 6858000"/>
+              <a:gd name="connsiteX86" fmla="*/ 4227367 w 4417162"/>
+              <a:gd name="connsiteY86" fmla="*/ 4116387 h 6858000"/>
+              <a:gd name="connsiteX87" fmla="*/ 4229047 w 4417162"/>
+              <a:gd name="connsiteY87" fmla="*/ 4186237 h 6858000"/>
+              <a:gd name="connsiteX88" fmla="*/ 4239125 w 4417162"/>
+              <a:gd name="connsiteY88" fmla="*/ 4244975 h 6858000"/>
+              <a:gd name="connsiteX89" fmla="*/ 4249203 w 4417162"/>
+              <a:gd name="connsiteY89" fmla="*/ 4297362 h 6858000"/>
+              <a:gd name="connsiteX90" fmla="*/ 4264318 w 4417162"/>
+              <a:gd name="connsiteY90" fmla="*/ 4343400 h 6858000"/>
+              <a:gd name="connsiteX91" fmla="*/ 4282794 w 4417162"/>
+              <a:gd name="connsiteY91" fmla="*/ 4386262 h 6858000"/>
+              <a:gd name="connsiteX92" fmla="*/ 4301270 w 4417162"/>
+              <a:gd name="connsiteY92" fmla="*/ 4424362 h 6858000"/>
+              <a:gd name="connsiteX93" fmla="*/ 4341580 w 4417162"/>
+              <a:gd name="connsiteY93" fmla="*/ 4498975 h 6858000"/>
+              <a:gd name="connsiteX94" fmla="*/ 4361735 w 4417162"/>
+              <a:gd name="connsiteY94" fmla="*/ 4537075 h 6858000"/>
+              <a:gd name="connsiteX95" fmla="*/ 4378531 w 4417162"/>
+              <a:gd name="connsiteY95" fmla="*/ 4579937 h 6858000"/>
+              <a:gd name="connsiteX96" fmla="*/ 4393648 w 4417162"/>
+              <a:gd name="connsiteY96" fmla="*/ 4625975 h 6858000"/>
+              <a:gd name="connsiteX97" fmla="*/ 4405405 w 4417162"/>
+              <a:gd name="connsiteY97" fmla="*/ 4678362 h 6858000"/>
+              <a:gd name="connsiteX98" fmla="*/ 4413803 w 4417162"/>
+              <a:gd name="connsiteY98" fmla="*/ 4738687 h 6858000"/>
+              <a:gd name="connsiteX99" fmla="*/ 4417162 w 4417162"/>
+              <a:gd name="connsiteY99" fmla="*/ 4806950 h 6858000"/>
+              <a:gd name="connsiteX100" fmla="*/ 4413803 w 4417162"/>
+              <a:gd name="connsiteY100" fmla="*/ 4875212 h 6858000"/>
+              <a:gd name="connsiteX101" fmla="*/ 4405405 w 4417162"/>
+              <a:gd name="connsiteY101" fmla="*/ 4935537 h 6858000"/>
+              <a:gd name="connsiteX102" fmla="*/ 4393648 w 4417162"/>
+              <a:gd name="connsiteY102" fmla="*/ 4987925 h 6858000"/>
+              <a:gd name="connsiteX103" fmla="*/ 4378531 w 4417162"/>
+              <a:gd name="connsiteY103" fmla="*/ 5033962 h 6858000"/>
+              <a:gd name="connsiteX104" fmla="*/ 4361735 w 4417162"/>
+              <a:gd name="connsiteY104" fmla="*/ 5075237 h 6858000"/>
+              <a:gd name="connsiteX105" fmla="*/ 4341580 w 4417162"/>
+              <a:gd name="connsiteY105" fmla="*/ 5114925 h 6858000"/>
+              <a:gd name="connsiteX106" fmla="*/ 4321425 w 4417162"/>
+              <a:gd name="connsiteY106" fmla="*/ 5149850 h 6858000"/>
+              <a:gd name="connsiteX107" fmla="*/ 4301270 w 4417162"/>
+              <a:gd name="connsiteY107" fmla="*/ 5186362 h 6858000"/>
+              <a:gd name="connsiteX108" fmla="*/ 4282794 w 4417162"/>
+              <a:gd name="connsiteY108" fmla="*/ 5226050 h 6858000"/>
+              <a:gd name="connsiteX109" fmla="*/ 4264318 w 4417162"/>
+              <a:gd name="connsiteY109" fmla="*/ 5268912 h 6858000"/>
+              <a:gd name="connsiteX110" fmla="*/ 4249203 w 4417162"/>
+              <a:gd name="connsiteY110" fmla="*/ 5313362 h 6858000"/>
+              <a:gd name="connsiteX111" fmla="*/ 4239125 w 4417162"/>
+              <a:gd name="connsiteY111" fmla="*/ 5365750 h 6858000"/>
+              <a:gd name="connsiteX112" fmla="*/ 4229047 w 4417162"/>
+              <a:gd name="connsiteY112" fmla="*/ 5426075 h 6858000"/>
+              <a:gd name="connsiteX113" fmla="*/ 4227367 w 4417162"/>
+              <a:gd name="connsiteY113" fmla="*/ 5494337 h 6858000"/>
+              <a:gd name="connsiteX114" fmla="*/ 4229047 w 4417162"/>
+              <a:gd name="connsiteY114" fmla="*/ 5562600 h 6858000"/>
+              <a:gd name="connsiteX115" fmla="*/ 4239125 w 4417162"/>
+              <a:gd name="connsiteY115" fmla="*/ 5622925 h 6858000"/>
+              <a:gd name="connsiteX116" fmla="*/ 4249203 w 4417162"/>
+              <a:gd name="connsiteY116" fmla="*/ 5675312 h 6858000"/>
+              <a:gd name="connsiteX117" fmla="*/ 4264318 w 4417162"/>
+              <a:gd name="connsiteY117" fmla="*/ 5721350 h 6858000"/>
+              <a:gd name="connsiteX118" fmla="*/ 4282794 w 4417162"/>
+              <a:gd name="connsiteY118" fmla="*/ 5762625 h 6858000"/>
+              <a:gd name="connsiteX119" fmla="*/ 4301270 w 4417162"/>
+              <a:gd name="connsiteY119" fmla="*/ 5802312 h 6858000"/>
+              <a:gd name="connsiteX120" fmla="*/ 4321425 w 4417162"/>
+              <a:gd name="connsiteY120" fmla="*/ 5840412 h 6858000"/>
+              <a:gd name="connsiteX121" fmla="*/ 4341580 w 4417162"/>
+              <a:gd name="connsiteY121" fmla="*/ 5876925 h 6858000"/>
+              <a:gd name="connsiteX122" fmla="*/ 4361735 w 4417162"/>
+              <a:gd name="connsiteY122" fmla="*/ 5915025 h 6858000"/>
+              <a:gd name="connsiteX123" fmla="*/ 4378531 w 4417162"/>
+              <a:gd name="connsiteY123" fmla="*/ 5956300 h 6858000"/>
+              <a:gd name="connsiteX124" fmla="*/ 4393648 w 4417162"/>
+              <a:gd name="connsiteY124" fmla="*/ 6003925 h 6858000"/>
+              <a:gd name="connsiteX125" fmla="*/ 4405405 w 4417162"/>
+              <a:gd name="connsiteY125" fmla="*/ 6056312 h 6858000"/>
+              <a:gd name="connsiteX126" fmla="*/ 4413803 w 4417162"/>
+              <a:gd name="connsiteY126" fmla="*/ 6113462 h 6858000"/>
+              <a:gd name="connsiteX127" fmla="*/ 4417162 w 4417162"/>
+              <a:gd name="connsiteY127" fmla="*/ 6183312 h 6858000"/>
+              <a:gd name="connsiteX128" fmla="*/ 4413803 w 4417162"/>
+              <a:gd name="connsiteY128" fmla="*/ 6251575 h 6858000"/>
+              <a:gd name="connsiteX129" fmla="*/ 4405405 w 4417162"/>
+              <a:gd name="connsiteY129" fmla="*/ 6311900 h 6858000"/>
+              <a:gd name="connsiteX130" fmla="*/ 4393648 w 4417162"/>
+              <a:gd name="connsiteY130" fmla="*/ 6361112 h 6858000"/>
+              <a:gd name="connsiteX131" fmla="*/ 4378531 w 4417162"/>
+              <a:gd name="connsiteY131" fmla="*/ 6407150 h 6858000"/>
+              <a:gd name="connsiteX132" fmla="*/ 4361735 w 4417162"/>
+              <a:gd name="connsiteY132" fmla="*/ 6448425 h 6858000"/>
+              <a:gd name="connsiteX133" fmla="*/ 4343260 w 4417162"/>
+              <a:gd name="connsiteY133" fmla="*/ 6488112 h 6858000"/>
+              <a:gd name="connsiteX134" fmla="*/ 4324784 w 4417162"/>
+              <a:gd name="connsiteY134" fmla="*/ 6523037 h 6858000"/>
+              <a:gd name="connsiteX135" fmla="*/ 4304629 w 4417162"/>
+              <a:gd name="connsiteY135" fmla="*/ 6561137 h 6858000"/>
+              <a:gd name="connsiteX136" fmla="*/ 4284474 w 4417162"/>
+              <a:gd name="connsiteY136" fmla="*/ 6597650 h 6858000"/>
+              <a:gd name="connsiteX137" fmla="*/ 4267678 w 4417162"/>
+              <a:gd name="connsiteY137" fmla="*/ 6640512 h 6858000"/>
+              <a:gd name="connsiteX138" fmla="*/ 4250882 w 4417162"/>
+              <a:gd name="connsiteY138" fmla="*/ 6683375 h 6858000"/>
+              <a:gd name="connsiteX139" fmla="*/ 4240804 w 4417162"/>
+              <a:gd name="connsiteY139" fmla="*/ 6735762 h 6858000"/>
+              <a:gd name="connsiteX140" fmla="*/ 4232407 w 4417162"/>
+              <a:gd name="connsiteY140" fmla="*/ 6791325 h 6858000"/>
+              <a:gd name="connsiteX141" fmla="*/ 4227367 w 4417162"/>
+              <a:gd name="connsiteY141" fmla="*/ 6858000 h 6858000"/>
+              <a:gd name="connsiteX142" fmla="*/ 2310062 w 4417162"/>
+              <a:gd name="connsiteY142" fmla="*/ 6858000 h 6858000"/>
+              <a:gd name="connsiteX143" fmla="*/ 144378 w 4417162"/>
+              <a:gd name="connsiteY143" fmla="*/ 6858000 h 6858000"/>
+              <a:gd name="connsiteX144" fmla="*/ 0 w 4417162"/>
+              <a:gd name="connsiteY144" fmla="*/ 6858000 h 6858000"/>
+            </a:gdLst>
+            <a:ahLst/>
+            <a:cxnLst>
+              <a:cxn ang="0">
+                <a:pos x="connsiteX0" y="connsiteY0"/>
+              </a:cxn>
+              <a:cxn ang="0">
+                <a:pos x="connsiteX1" y="connsiteY1"/>
+              </a:cxn>
+              <a:cxn ang="0">
+                <a:pos x="connsiteX2" y="connsiteY2"/>
+              </a:cxn>
+              <a:cxn ang="0">
+                <a:pos x="connsiteX3" y="connsiteY3"/>
+              </a:cxn>
+              <a:cxn ang="0">
+                <a:pos x="connsiteX4" y="connsiteY4"/>
+              </a:cxn>
+              <a:cxn ang="0">
+                <a:pos x="connsiteX5" y="connsiteY5"/>
+              </a:cxn>
+              <a:cxn ang="0">
+                <a:pos x="connsiteX6" y="connsiteY6"/>
+              </a:cxn>
+              <a:cxn ang="0">
+                <a:pos x="connsiteX7" y="connsiteY7"/>
+              </a:cxn>
+              <a:cxn ang="0">
+                <a:pos x="connsiteX8" y="connsiteY8"/>
+              </a:cxn>
+              <a:cxn ang="0">
+                <a:pos x="connsiteX9" y="connsiteY9"/>
+              </a:cxn>
+              <a:cxn ang="0">
+                <a:pos x="connsiteX10" y="connsiteY10"/>
+              </a:cxn>
+              <a:cxn ang="0">
+                <a:pos x="connsiteX11" y="connsiteY11"/>
+              </a:cxn>
+              <a:cxn ang="0">
+                <a:pos x="connsiteX12" y="connsiteY12"/>
+              </a:cxn>
+              <a:cxn ang="0">
+                <a:pos x="connsiteX13" y="connsiteY13"/>
+              </a:cxn>
+              <a:cxn ang="0">
+                <a:pos x="connsiteX14" y="connsiteY14"/>
+              </a:cxn>
+              <a:cxn ang="0">
+                <a:pos x="connsiteX15" y="connsiteY15"/>
+              </a:cxn>
+              <a:cxn ang="0">
+                <a:pos x="connsiteX16" y="connsiteY16"/>
+              </a:cxn>
+              <a:cxn ang="0">
+                <a:pos x="connsiteX17" y="connsiteY17"/>
+              </a:cxn>
+              <a:cxn ang="0">
+                <a:pos x="connsiteX18" y="connsiteY18"/>
+              </a:cxn>
+              <a:cxn ang="0">
+                <a:pos x="connsiteX19" y="connsiteY19"/>
+              </a:cxn>
+              <a:cxn ang="0">
+                <a:pos x="connsiteX20" y="connsiteY20"/>
+              </a:cxn>
+              <a:cxn ang="0">
+                <a:pos x="connsiteX21" y="connsiteY21"/>
+              </a:cxn>
+              <a:cxn ang="0">
+                <a:pos x="connsiteX22" y="connsiteY22"/>
+              </a:cxn>
+              <a:cxn ang="0">
+                <a:pos x="connsiteX23" y="connsiteY23"/>
+              </a:cxn>
+              <a:cxn ang="0">
+                <a:pos x="connsiteX24" y="connsiteY24"/>
+              </a:cxn>
+              <a:cxn ang="0">
+                <a:pos x="connsiteX25" y="connsiteY25"/>
+              </a:cxn>
+              <a:cxn ang="0">
+                <a:pos x="connsiteX26" y="connsiteY26"/>
+              </a:cxn>
+              <a:cxn ang="0">
+                <a:pos x="connsiteX27" y="connsiteY27"/>
+              </a:cxn>
+              <a:cxn ang="0">
+                <a:pos x="connsiteX28" y="connsiteY28"/>
+              </a:cxn>
+              <a:cxn ang="0">
+                <a:pos x="connsiteX29" y="connsiteY29"/>
+              </a:cxn>
+              <a:cxn ang="0">
+                <a:pos x="connsiteX30" y="connsiteY30"/>
+              </a:cxn>
+              <a:cxn ang="0">
+                <a:pos x="connsiteX31" y="connsiteY31"/>
+              </a:cxn>
+              <a:cxn ang="0">
+                <a:pos x="connsiteX32" y="connsiteY32"/>
+              </a:cxn>
+              <a:cxn ang="0">
+                <a:pos x="connsiteX33" y="connsiteY33"/>
+              </a:cxn>
+              <a:cxn ang="0">
+                <a:pos x="connsiteX34" y="connsiteY34"/>
+              </a:cxn>
+              <a:cxn ang="0">
+                <a:pos x="connsiteX35" y="connsiteY35"/>
+              </a:cxn>
+              <a:cxn ang="0">
+                <a:pos x="connsiteX36" y="connsiteY36"/>
+              </a:cxn>
+              <a:cxn ang="0">
+                <a:pos x="connsiteX37" y="connsiteY37"/>
+              </a:cxn>
+              <a:cxn ang="0">
+                <a:pos x="connsiteX38" y="connsiteY38"/>
+              </a:cxn>
+              <a:cxn ang="0">
+                <a:pos x="connsiteX39" y="connsiteY39"/>
+              </a:cxn>
+              <a:cxn ang="0">
+                <a:pos x="connsiteX40" y="connsiteY40"/>
+              </a:cxn>
+              <a:cxn ang="0">
+                <a:pos x="connsiteX41" y="connsiteY41"/>
+              </a:cxn>
+              <a:cxn ang="0">
+                <a:pos x="connsiteX42" y="connsiteY42"/>
+              </a:cxn>
+              <a:cxn ang="0">
+                <a:pos x="connsiteX43" y="connsiteY43"/>
+              </a:cxn>
+              <a:cxn ang="0">
+                <a:pos x="connsiteX44" y="connsiteY44"/>
+              </a:cxn>
+              <a:cxn ang="0">
+                <a:pos x="connsiteX45" y="connsiteY45"/>
+              </a:cxn>
+              <a:cxn ang="0">
+                <a:pos x="connsiteX46" y="connsiteY46"/>
+              </a:cxn>
+              <a:cxn ang="0">
+                <a:pos x="connsiteX47" y="connsiteY47"/>
+              </a:cxn>
+              <a:cxn ang="0">
+                <a:pos x="connsiteX48" y="connsiteY48"/>
+              </a:cxn>
+              <a:cxn ang="0">
+                <a:pos x="connsiteX49" y="connsiteY49"/>
+              </a:cxn>
+              <a:cxn ang="0">
+                <a:pos x="connsiteX50" y="connsiteY50"/>
+              </a:cxn>
+              <a:cxn ang="0">
+                <a:pos x="connsiteX51" y="connsiteY51"/>
+              </a:cxn>
+              <a:cxn ang="0">
+                <a:pos x="connsiteX52" y="connsiteY52"/>
+              </a:cxn>
+              <a:cxn ang="0">
+                <a:pos x="connsiteX53" y="connsiteY53"/>
+              </a:cxn>
+              <a:cxn ang="0">
+                <a:pos x="connsiteX54" y="connsiteY54"/>
+              </a:cxn>
+              <a:cxn ang="0">
+                <a:pos x="connsiteX55" y="connsiteY55"/>
+              </a:cxn>
+              <a:cxn ang="0">
+                <a:pos x="connsiteX56" y="connsiteY56"/>
+              </a:cxn>
+              <a:cxn ang="0">
+                <a:pos x="connsiteX57" y="connsiteY57"/>
+              </a:cxn>
+              <a:cxn ang="0">
+                <a:pos x="connsiteX58" y="connsiteY58"/>
+              </a:cxn>
+              <a:cxn ang="0">
+                <a:pos x="connsiteX59" y="connsiteY59"/>
+              </a:cxn>
+              <a:cxn ang="0">
+                <a:pos x="connsiteX60" y="connsiteY60"/>
+              </a:cxn>
+              <a:cxn ang="0">
+                <a:pos x="connsiteX61" y="connsiteY61"/>
+              </a:cxn>
+              <a:cxn ang="0">
+                <a:pos x="connsiteX62" y="connsiteY62"/>
+              </a:cxn>
+              <a:cxn ang="0">
+                <a:pos x="connsiteX63" y="connsiteY63"/>
+              </a:cxn>
+              <a:cxn ang="0">
+                <a:pos x="connsiteX64" y="connsiteY64"/>
+              </a:cxn>
+              <a:cxn ang="0">
+                <a:pos x="connsiteX65" y="connsiteY65"/>
+              </a:cxn>
+              <a:cxn ang="0">
+                <a:pos x="connsiteX66" y="connsiteY66"/>
+              </a:cxn>
+              <a:cxn ang="0">
+                <a:pos x="connsiteX67" y="connsiteY67"/>
+              </a:cxn>
+              <a:cxn ang="0">
+                <a:pos x="connsiteX68" y="connsiteY68"/>
+              </a:cxn>
+              <a:cxn ang="0">
+                <a:pos x="connsiteX69" y="connsiteY69"/>
+              </a:cxn>
+              <a:cxn ang="0">
+                <a:pos x="connsiteX70" y="connsiteY70"/>
+              </a:cxn>
+              <a:cxn ang="0">
+                <a:pos x="connsiteX71" y="connsiteY71"/>
+              </a:cxn>
+              <a:cxn ang="0">
+                <a:pos x="connsiteX72" y="connsiteY72"/>
+              </a:cxn>
+              <a:cxn ang="0">
+                <a:pos x="connsiteX73" y="connsiteY73"/>
+              </a:cxn>
+              <a:cxn ang="0">
+                <a:pos x="connsiteX74" y="connsiteY74"/>
+              </a:cxn>
+              <a:cxn ang="0">
+                <a:pos x="connsiteX75" y="connsiteY75"/>
+              </a:cxn>
+              <a:cxn ang="0">
+                <a:pos x="connsiteX76" y="connsiteY76"/>
+              </a:cxn>
+              <a:cxn ang="0">
+                <a:pos x="connsiteX77" y="connsiteY77"/>
+              </a:cxn>
+              <a:cxn ang="0">
+                <a:pos x="connsiteX78" y="connsiteY78"/>
+              </a:cxn>
+              <a:cxn ang="0">
+                <a:pos x="connsiteX79" y="connsiteY79"/>
+              </a:cxn>
+              <a:cxn ang="0">
+                <a:pos x="connsiteX80" y="connsiteY80"/>
+              </a:cxn>
+              <a:cxn ang="0">
+                <a:pos x="connsiteX81" y="connsiteY81"/>
+              </a:cxn>
+              <a:cxn ang="0">
+                <a:pos x="connsiteX82" y="connsiteY82"/>
+              </a:cxn>
+              <a:cxn ang="0">
+                <a:pos x="connsiteX83" y="connsiteY83"/>
+              </a:cxn>
+              <a:cxn ang="0">
+                <a:pos x="connsiteX84" y="connsiteY84"/>
+              </a:cxn>
+              <a:cxn ang="0">
+                <a:pos x="connsiteX85" y="connsiteY85"/>
+              </a:cxn>
+              <a:cxn ang="0">
+                <a:pos x="connsiteX86" y="connsiteY86"/>
+              </a:cxn>
+              <a:cxn ang="0">
+                <a:pos x="connsiteX87" y="connsiteY87"/>
+              </a:cxn>
+              <a:cxn ang="0">
+                <a:pos x="connsiteX88" y="connsiteY88"/>
+              </a:cxn>
+              <a:cxn ang="0">
+                <a:pos x="connsiteX89" y="connsiteY89"/>
+              </a:cxn>
+              <a:cxn ang="0">
+                <a:pos x="connsiteX90" y="connsiteY90"/>
+              </a:cxn>
+              <a:cxn ang="0">
+                <a:pos x="connsiteX91" y="connsiteY91"/>
+              </a:cxn>
+              <a:cxn ang="0">
+                <a:pos x="connsiteX92" y="connsiteY92"/>
+              </a:cxn>
+              <a:cxn ang="0">
+                <a:pos x="connsiteX93" y="connsiteY93"/>
+              </a:cxn>
+              <a:cxn ang="0">
+                <a:pos x="connsiteX94" y="connsiteY94"/>
+              </a:cxn>
+              <a:cxn ang="0">
+                <a:pos x="connsiteX95" y="connsiteY95"/>
+              </a:cxn>
+              <a:cxn ang="0">
+                <a:pos x="connsiteX96" y="connsiteY96"/>
+              </a:cxn>
+              <a:cxn ang="0">
+                <a:pos x="connsiteX97" y="connsiteY97"/>
+              </a:cxn>
+              <a:cxn ang="0">
+                <a:pos x="connsiteX98" y="connsiteY98"/>
+              </a:cxn>
+              <a:cxn ang="0">
+                <a:pos x="connsiteX99" y="connsiteY99"/>
+              </a:cxn>
+              <a:cxn ang="0">
+                <a:pos x="connsiteX100" y="connsiteY100"/>
+              </a:cxn>
+              <a:cxn ang="0">
+                <a:pos x="connsiteX101" y="connsiteY101"/>
+              </a:cxn>
+              <a:cxn ang="0">
+                <a:pos x="connsiteX102" y="connsiteY102"/>
+              </a:cxn>
+              <a:cxn ang="0">
+                <a:pos x="connsiteX103" y="connsiteY103"/>
+              </a:cxn>
+              <a:cxn ang="0">
+                <a:pos x="connsiteX104" y="connsiteY104"/>
+              </a:cxn>
+              <a:cxn ang="0">
+                <a:pos x="connsiteX105" y="connsiteY105"/>
+              </a:cxn>
+              <a:cxn ang="0">
+                <a:pos x="connsiteX106" y="connsiteY106"/>
+              </a:cxn>
+              <a:cxn ang="0">
+                <a:pos x="connsiteX107" y="connsiteY107"/>
+              </a:cxn>
+              <a:cxn ang="0">
+                <a:pos x="connsiteX108" y="connsiteY108"/>
+              </a:cxn>
+              <a:cxn ang="0">
+                <a:pos x="connsiteX109" y="connsiteY109"/>
+              </a:cxn>
+              <a:cxn ang="0">
+                <a:pos x="connsiteX110" y="connsiteY110"/>
+              </a:cxn>
+              <a:cxn ang="0">
+                <a:pos x="connsiteX111" y="connsiteY111"/>
+              </a:cxn>
+              <a:cxn ang="0">
+                <a:pos x="connsiteX112" y="connsiteY112"/>
+              </a:cxn>
+              <a:cxn ang="0">
+                <a:pos x="connsiteX113" y="connsiteY113"/>
+              </a:cxn>
+              <a:cxn ang="0">
+                <a:pos x="connsiteX114" y="connsiteY114"/>
+              </a:cxn>
+              <a:cxn ang="0">
+                <a:pos x="connsiteX115" y="connsiteY115"/>
+              </a:cxn>
+              <a:cxn ang="0">
+                <a:pos x="connsiteX116" y="connsiteY116"/>
+              </a:cxn>
+              <a:cxn ang="0">
+                <a:pos x="connsiteX117" y="connsiteY117"/>
+              </a:cxn>
+              <a:cxn ang="0">
+                <a:pos x="connsiteX118" y="connsiteY118"/>
+              </a:cxn>
+              <a:cxn ang="0">
+                <a:pos x="connsiteX119" y="connsiteY119"/>
+              </a:cxn>
+              <a:cxn ang="0">
+                <a:pos x="connsiteX120" y="connsiteY120"/>
+              </a:cxn>
+              <a:cxn ang="0">
+                <a:pos x="connsiteX121" y="connsiteY121"/>
+              </a:cxn>
+              <a:cxn ang="0">
+                <a:pos x="connsiteX122" y="connsiteY122"/>
+              </a:cxn>
+              <a:cxn ang="0">
+                <a:pos x="connsiteX123" y="connsiteY123"/>
+              </a:cxn>
+              <a:cxn ang="0">
+                <a:pos x="connsiteX124" y="connsiteY124"/>
+              </a:cxn>
+              <a:cxn ang="0">
+                <a:pos x="connsiteX125" y="connsiteY125"/>
+              </a:cxn>
+              <a:cxn ang="0">
+                <a:pos x="connsiteX126" y="connsiteY126"/>
+              </a:cxn>
+              <a:cxn ang="0">
+                <a:pos x="connsiteX127" y="connsiteY127"/>
+              </a:cxn>
+              <a:cxn ang="0">
+                <a:pos x="connsiteX128" y="connsiteY128"/>
+              </a:cxn>
+              <a:cxn ang="0">
+                <a:pos x="connsiteX129" y="connsiteY129"/>
+              </a:cxn>
+              <a:cxn ang="0">
+                <a:pos x="connsiteX130" y="connsiteY130"/>
+              </a:cxn>
+              <a:cxn ang="0">
+                <a:pos x="connsiteX131" y="connsiteY131"/>
+              </a:cxn>
+              <a:cxn ang="0">
+                <a:pos x="connsiteX132" y="connsiteY132"/>
+              </a:cxn>
+              <a:cxn ang="0">
+                <a:pos x="connsiteX133" y="connsiteY133"/>
+              </a:cxn>
+              <a:cxn ang="0">
+                <a:pos x="connsiteX134" y="connsiteY134"/>
+              </a:cxn>
+              <a:cxn ang="0">
+                <a:pos x="connsiteX135" y="connsiteY135"/>
+              </a:cxn>
+              <a:cxn ang="0">
+                <a:pos x="connsiteX136" y="connsiteY136"/>
+              </a:cxn>
+              <a:cxn ang="0">
+                <a:pos x="connsiteX137" y="connsiteY137"/>
+              </a:cxn>
+              <a:cxn ang="0">
+                <a:pos x="connsiteX138" y="connsiteY138"/>
+              </a:cxn>
+              <a:cxn ang="0">
+                <a:pos x="connsiteX139" y="connsiteY139"/>
+              </a:cxn>
+              <a:cxn ang="0">
+                <a:pos x="connsiteX140" y="connsiteY140"/>
+              </a:cxn>
+              <a:cxn ang="0">
+                <a:pos x="connsiteX141" y="connsiteY141"/>
+              </a:cxn>
+              <a:cxn ang="0">
+                <a:pos x="connsiteX142" y="connsiteY142"/>
+              </a:cxn>
+              <a:cxn ang="0">
+                <a:pos x="connsiteX143" y="connsiteY143"/>
+              </a:cxn>
+              <a:cxn ang="0">
+                <a:pos x="connsiteX144" y="connsiteY144"/>
+              </a:cxn>
+            </a:cxnLst>
+            <a:rect l="l" t="t" r="r" b="b"/>
+            <a:pathLst>
+              <a:path w="4417162" h="6858000">
+                <a:moveTo>
+                  <a:pt x="0" y="0"/>
+                </a:moveTo>
+                <a:lnTo>
+                  <a:pt x="144378" y="0"/>
+                </a:lnTo>
+                <a:lnTo>
+                  <a:pt x="2310062" y="0"/>
+                </a:lnTo>
+                <a:lnTo>
+                  <a:pt x="4227367" y="0"/>
+                </a:lnTo>
+                <a:lnTo>
+                  <a:pt x="4232407" y="66675"/>
+                </a:lnTo>
+                <a:lnTo>
+                  <a:pt x="4240804" y="122237"/>
+                </a:lnTo>
+                <a:lnTo>
+                  <a:pt x="4250882" y="174625"/>
+                </a:lnTo>
+                <a:lnTo>
+                  <a:pt x="4267678" y="217487"/>
+                </a:lnTo>
+                <a:lnTo>
+                  <a:pt x="4284474" y="260350"/>
+                </a:lnTo>
+                <a:lnTo>
+                  <a:pt x="4304629" y="296862"/>
+                </a:lnTo>
+                <a:lnTo>
+                  <a:pt x="4324784" y="334962"/>
+                </a:lnTo>
+                <a:lnTo>
+                  <a:pt x="4343260" y="369887"/>
+                </a:lnTo>
+                <a:lnTo>
+                  <a:pt x="4361735" y="409575"/>
+                </a:lnTo>
+                <a:lnTo>
+                  <a:pt x="4378531" y="450850"/>
+                </a:lnTo>
+                <a:lnTo>
+                  <a:pt x="4393648" y="496887"/>
+                </a:lnTo>
+                <a:lnTo>
+                  <a:pt x="4405405" y="546100"/>
+                </a:lnTo>
+                <a:lnTo>
+                  <a:pt x="4413803" y="606425"/>
+                </a:lnTo>
+                <a:lnTo>
+                  <a:pt x="4417162" y="673100"/>
+                </a:lnTo>
+                <a:lnTo>
+                  <a:pt x="4413803" y="744537"/>
+                </a:lnTo>
+                <a:lnTo>
+                  <a:pt x="4405405" y="801687"/>
+                </a:lnTo>
+                <a:lnTo>
+                  <a:pt x="4393648" y="854075"/>
+                </a:lnTo>
+                <a:lnTo>
+                  <a:pt x="4378531" y="901700"/>
+                </a:lnTo>
+                <a:lnTo>
+                  <a:pt x="4361735" y="942975"/>
+                </a:lnTo>
+                <a:lnTo>
+                  <a:pt x="4341580" y="981075"/>
+                </a:lnTo>
+                <a:lnTo>
+                  <a:pt x="4321425" y="1017587"/>
+                </a:lnTo>
+                <a:lnTo>
+                  <a:pt x="4301270" y="1055687"/>
+                </a:lnTo>
+                <a:lnTo>
+                  <a:pt x="4282794" y="1095375"/>
+                </a:lnTo>
+                <a:lnTo>
+                  <a:pt x="4264318" y="1136650"/>
+                </a:lnTo>
+                <a:lnTo>
+                  <a:pt x="4249203" y="1182687"/>
+                </a:lnTo>
+                <a:lnTo>
+                  <a:pt x="4239125" y="1235075"/>
+                </a:lnTo>
+                <a:lnTo>
+                  <a:pt x="4229047" y="1295400"/>
+                </a:lnTo>
+                <a:lnTo>
+                  <a:pt x="4227367" y="1363662"/>
+                </a:lnTo>
+                <a:lnTo>
+                  <a:pt x="4229047" y="1431925"/>
+                </a:lnTo>
+                <a:lnTo>
+                  <a:pt x="4239125" y="1492250"/>
+                </a:lnTo>
+                <a:lnTo>
+                  <a:pt x="4249203" y="1544637"/>
+                </a:lnTo>
+                <a:lnTo>
+                  <a:pt x="4264318" y="1589087"/>
+                </a:lnTo>
+                <a:lnTo>
+                  <a:pt x="4282794" y="1631950"/>
+                </a:lnTo>
+                <a:lnTo>
+                  <a:pt x="4301270" y="1671637"/>
+                </a:lnTo>
+                <a:lnTo>
+                  <a:pt x="4321425" y="1708150"/>
+                </a:lnTo>
+                <a:lnTo>
+                  <a:pt x="4341580" y="1743075"/>
+                </a:lnTo>
+                <a:lnTo>
+                  <a:pt x="4361735" y="1782762"/>
+                </a:lnTo>
+                <a:lnTo>
+                  <a:pt x="4378531" y="1824037"/>
+                </a:lnTo>
+                <a:lnTo>
+                  <a:pt x="4393648" y="1870075"/>
+                </a:lnTo>
+                <a:lnTo>
+                  <a:pt x="4405405" y="1922462"/>
+                </a:lnTo>
+                <a:lnTo>
+                  <a:pt x="4413803" y="1982787"/>
+                </a:lnTo>
+                <a:lnTo>
+                  <a:pt x="4417162" y="2051050"/>
+                </a:lnTo>
+                <a:lnTo>
+                  <a:pt x="4413803" y="2119312"/>
+                </a:lnTo>
+                <a:lnTo>
+                  <a:pt x="4405405" y="2179637"/>
+                </a:lnTo>
+                <a:lnTo>
+                  <a:pt x="4393648" y="2232025"/>
+                </a:lnTo>
+                <a:lnTo>
+                  <a:pt x="4378531" y="2278062"/>
+                </a:lnTo>
+                <a:lnTo>
+                  <a:pt x="4361735" y="2319337"/>
+                </a:lnTo>
+                <a:lnTo>
+                  <a:pt x="4341580" y="2359025"/>
+                </a:lnTo>
+                <a:lnTo>
+                  <a:pt x="4321425" y="2395537"/>
+                </a:lnTo>
+                <a:lnTo>
+                  <a:pt x="4301270" y="2433637"/>
+                </a:lnTo>
+                <a:lnTo>
+                  <a:pt x="4282794" y="2471737"/>
+                </a:lnTo>
+                <a:lnTo>
+                  <a:pt x="4264318" y="2513012"/>
+                </a:lnTo>
+                <a:lnTo>
+                  <a:pt x="4249203" y="2560637"/>
+                </a:lnTo>
+                <a:lnTo>
+                  <a:pt x="4239125" y="2613025"/>
+                </a:lnTo>
+                <a:lnTo>
+                  <a:pt x="4229047" y="2671762"/>
+                </a:lnTo>
+                <a:lnTo>
+                  <a:pt x="4227367" y="2741612"/>
+                </a:lnTo>
+                <a:lnTo>
+                  <a:pt x="4229047" y="2809875"/>
+                </a:lnTo>
+                <a:lnTo>
+                  <a:pt x="4239125" y="2868612"/>
+                </a:lnTo>
+                <a:lnTo>
+                  <a:pt x="4249203" y="2922587"/>
+                </a:lnTo>
+                <a:lnTo>
+                  <a:pt x="4264318" y="2967037"/>
+                </a:lnTo>
+                <a:lnTo>
+                  <a:pt x="4282794" y="3009900"/>
+                </a:lnTo>
+                <a:lnTo>
+                  <a:pt x="4301270" y="3046412"/>
+                </a:lnTo>
+                <a:lnTo>
+                  <a:pt x="4321425" y="3084512"/>
+                </a:lnTo>
+                <a:lnTo>
+                  <a:pt x="4341580" y="3121025"/>
+                </a:lnTo>
+                <a:lnTo>
+                  <a:pt x="4361735" y="3160712"/>
+                </a:lnTo>
+                <a:lnTo>
+                  <a:pt x="4378531" y="3201987"/>
+                </a:lnTo>
+                <a:lnTo>
+                  <a:pt x="4393648" y="3248025"/>
+                </a:lnTo>
+                <a:lnTo>
+                  <a:pt x="4405405" y="3300412"/>
+                </a:lnTo>
+                <a:lnTo>
+                  <a:pt x="4413803" y="3360737"/>
+                </a:lnTo>
+                <a:lnTo>
+                  <a:pt x="4417162" y="3427412"/>
+                </a:lnTo>
+                <a:lnTo>
+                  <a:pt x="4413803" y="3497262"/>
+                </a:lnTo>
+                <a:lnTo>
+                  <a:pt x="4405405" y="3557587"/>
+                </a:lnTo>
+                <a:lnTo>
+                  <a:pt x="4393648" y="3609975"/>
+                </a:lnTo>
+                <a:lnTo>
+                  <a:pt x="4378531" y="3656012"/>
+                </a:lnTo>
+                <a:lnTo>
+                  <a:pt x="4361735" y="3697287"/>
+                </a:lnTo>
+                <a:lnTo>
+                  <a:pt x="4341580" y="3736975"/>
+                </a:lnTo>
+                <a:lnTo>
+                  <a:pt x="4301270" y="3811587"/>
+                </a:lnTo>
+                <a:lnTo>
+                  <a:pt x="4282794" y="3848100"/>
+                </a:lnTo>
+                <a:lnTo>
+                  <a:pt x="4264318" y="3890962"/>
+                </a:lnTo>
+                <a:lnTo>
+                  <a:pt x="4249203" y="3935412"/>
+                </a:lnTo>
+                <a:lnTo>
+                  <a:pt x="4239125" y="3987800"/>
+                </a:lnTo>
+                <a:lnTo>
+                  <a:pt x="4229047" y="4048125"/>
+                </a:lnTo>
+                <a:lnTo>
+                  <a:pt x="4227367" y="4116387"/>
+                </a:lnTo>
+                <a:lnTo>
+                  <a:pt x="4229047" y="4186237"/>
+                </a:lnTo>
+                <a:lnTo>
+                  <a:pt x="4239125" y="4244975"/>
+                </a:lnTo>
+                <a:lnTo>
+                  <a:pt x="4249203" y="4297362"/>
+                </a:lnTo>
+                <a:lnTo>
+                  <a:pt x="4264318" y="4343400"/>
+                </a:lnTo>
+                <a:lnTo>
+                  <a:pt x="4282794" y="4386262"/>
+                </a:lnTo>
+                <a:lnTo>
+                  <a:pt x="4301270" y="4424362"/>
+                </a:lnTo>
+                <a:lnTo>
+                  <a:pt x="4341580" y="4498975"/>
+                </a:lnTo>
+                <a:lnTo>
+                  <a:pt x="4361735" y="4537075"/>
+                </a:lnTo>
+                <a:lnTo>
+                  <a:pt x="4378531" y="4579937"/>
+                </a:lnTo>
+                <a:lnTo>
+                  <a:pt x="4393648" y="4625975"/>
+                </a:lnTo>
+                <a:lnTo>
+                  <a:pt x="4405405" y="4678362"/>
+                </a:lnTo>
+                <a:lnTo>
+                  <a:pt x="4413803" y="4738687"/>
+                </a:lnTo>
+                <a:lnTo>
+                  <a:pt x="4417162" y="4806950"/>
+                </a:lnTo>
+                <a:lnTo>
+                  <a:pt x="4413803" y="4875212"/>
+                </a:lnTo>
+                <a:lnTo>
+                  <a:pt x="4405405" y="4935537"/>
+                </a:lnTo>
+                <a:lnTo>
+                  <a:pt x="4393648" y="4987925"/>
+                </a:lnTo>
+                <a:lnTo>
+                  <a:pt x="4378531" y="5033962"/>
+                </a:lnTo>
+                <a:lnTo>
+                  <a:pt x="4361735" y="5075237"/>
+                </a:lnTo>
+                <a:lnTo>
+                  <a:pt x="4341580" y="5114925"/>
+                </a:lnTo>
+                <a:lnTo>
+                  <a:pt x="4321425" y="5149850"/>
+                </a:lnTo>
+                <a:lnTo>
+                  <a:pt x="4301270" y="5186362"/>
+                </a:lnTo>
+                <a:lnTo>
+                  <a:pt x="4282794" y="5226050"/>
+                </a:lnTo>
+                <a:lnTo>
+                  <a:pt x="4264318" y="5268912"/>
+                </a:lnTo>
+                <a:lnTo>
+                  <a:pt x="4249203" y="5313362"/>
+                </a:lnTo>
+                <a:lnTo>
+                  <a:pt x="4239125" y="5365750"/>
+                </a:lnTo>
+                <a:lnTo>
+                  <a:pt x="4229047" y="5426075"/>
+                </a:lnTo>
+                <a:lnTo>
+                  <a:pt x="4227367" y="5494337"/>
+                </a:lnTo>
+                <a:lnTo>
+                  <a:pt x="4229047" y="5562600"/>
+                </a:lnTo>
+                <a:lnTo>
+                  <a:pt x="4239125" y="5622925"/>
+                </a:lnTo>
+                <a:lnTo>
+                  <a:pt x="4249203" y="5675312"/>
+                </a:lnTo>
+                <a:lnTo>
+                  <a:pt x="4264318" y="5721350"/>
+                </a:lnTo>
+                <a:lnTo>
+                  <a:pt x="4282794" y="5762625"/>
+                </a:lnTo>
+                <a:lnTo>
+                  <a:pt x="4301270" y="5802312"/>
+                </a:lnTo>
+                <a:lnTo>
+                  <a:pt x="4321425" y="5840412"/>
+                </a:lnTo>
+                <a:lnTo>
+                  <a:pt x="4341580" y="5876925"/>
+                </a:lnTo>
+                <a:lnTo>
+                  <a:pt x="4361735" y="5915025"/>
+                </a:lnTo>
+                <a:lnTo>
+                  <a:pt x="4378531" y="5956300"/>
+                </a:lnTo>
+                <a:lnTo>
+                  <a:pt x="4393648" y="6003925"/>
+                </a:lnTo>
+                <a:lnTo>
+                  <a:pt x="4405405" y="6056312"/>
+                </a:lnTo>
+                <a:lnTo>
+                  <a:pt x="4413803" y="6113462"/>
+                </a:lnTo>
+                <a:lnTo>
+                  <a:pt x="4417162" y="6183312"/>
+                </a:lnTo>
+                <a:lnTo>
+                  <a:pt x="4413803" y="6251575"/>
+                </a:lnTo>
+                <a:lnTo>
+                  <a:pt x="4405405" y="6311900"/>
+                </a:lnTo>
+                <a:lnTo>
+                  <a:pt x="4393648" y="6361112"/>
+                </a:lnTo>
+                <a:lnTo>
+                  <a:pt x="4378531" y="6407150"/>
+                </a:lnTo>
+                <a:lnTo>
+                  <a:pt x="4361735" y="6448425"/>
+                </a:lnTo>
+                <a:lnTo>
+                  <a:pt x="4343260" y="6488112"/>
+                </a:lnTo>
+                <a:lnTo>
+                  <a:pt x="4324784" y="6523037"/>
+                </a:lnTo>
+                <a:lnTo>
+                  <a:pt x="4304629" y="6561137"/>
+                </a:lnTo>
+                <a:lnTo>
+                  <a:pt x="4284474" y="6597650"/>
+                </a:lnTo>
+                <a:lnTo>
+                  <a:pt x="4267678" y="6640512"/>
+                </a:lnTo>
+                <a:lnTo>
+                  <a:pt x="4250882" y="6683375"/>
+                </a:lnTo>
+                <a:lnTo>
+                  <a:pt x="4240804" y="6735762"/>
+                </a:lnTo>
+                <a:lnTo>
+                  <a:pt x="4232407" y="6791325"/>
+                </a:lnTo>
+                <a:lnTo>
+                  <a:pt x="4227367" y="6858000"/>
+                </a:lnTo>
+                <a:lnTo>
+                  <a:pt x="2310062" y="6858000"/>
+                </a:lnTo>
+                <a:lnTo>
+                  <a:pt x="144378" y="6858000"/>
+                </a:lnTo>
+                <a:lnTo>
+                  <a:pt x="0" y="6858000"/>
+                </a:lnTo>
+                <a:close/>
+              </a:path>
+            </a:pathLst>
+          </a:custGeom>
+          <a:solidFill>
+            <a:srgbClr val="FFFFFF"/>
+          </a:solidFill>
+          <a:ln w="0">
+            <a:noFill/>
+            <a:prstDash val="solid"/>
+            <a:round/>
+            <a:headEnd/>
+            <a:tailEnd/>
+          </a:ln>
+        </p:spPr>
+      </p:sp>
+      <p:sp useBgFill="1">
+        <p:nvSpPr>
+          <p:cNvPr id="46" name="Freeform: Shape 45">
+            <a:extLst>
+              <a:ext uri="{FF2B5EF4-FFF2-40B4-BE49-F238E27FC236}">
+                <a16:creationId xmlns:a16="http://schemas.microsoft.com/office/drawing/2014/main" id="{A7A4B465-FBCC-4CD4-89A1-82992A7B47FF}"/>
+              </a:ext>
+              <a:ext uri="{C183D7F6-B498-43B3-948B-1728B52AA6E4}">
+                <adec:decorative xmlns:adec="http://schemas.microsoft.com/office/drawing/2017/decorative" val="1"/>
+              </a:ext>
+            </a:extLst>
+          </p:cNvPr>
+          <p:cNvSpPr>
+            <a:spLocks noGrp="1" noRot="1" noChangeAspect="1" noMove="1" noResize="1" noEditPoints="1" noAdjustHandles="1" noChangeArrowheads="1" noChangeShapeType="1" noTextEdit="1"/>
+          </p:cNvSpPr>
+          <p:nvPr>
+            <p:extLst>
+              <p:ext uri="{386F3935-93C4-4BCD-93E2-E3B085C9AB24}">
+                <p16:designElem xmlns:p16="http://schemas.microsoft.com/office/powerpoint/2015/main" val="1"/>
+              </p:ext>
+            </p:extLst>
+          </p:nvPr>
+        </p:nvSpPr>
+        <p:spPr bwMode="ltGray">
+          <a:xfrm>
+            <a:off x="0" y="0"/>
+            <a:ext cx="4272784" cy="6858000"/>
+          </a:xfrm>
+          <a:custGeom>
+            <a:avLst/>
+            <a:gdLst>
+              <a:gd name="connsiteX0" fmla="*/ 0 w 4272784"/>
+              <a:gd name="connsiteY0" fmla="*/ 0 h 6858000"/>
+              <a:gd name="connsiteX1" fmla="*/ 4082989 w 4272784"/>
+              <a:gd name="connsiteY1" fmla="*/ 0 h 6858000"/>
+              <a:gd name="connsiteX2" fmla="*/ 4088029 w 4272784"/>
+              <a:gd name="connsiteY2" fmla="*/ 66675 h 6858000"/>
+              <a:gd name="connsiteX3" fmla="*/ 4096426 w 4272784"/>
+              <a:gd name="connsiteY3" fmla="*/ 122237 h 6858000"/>
+              <a:gd name="connsiteX4" fmla="*/ 4106504 w 4272784"/>
+              <a:gd name="connsiteY4" fmla="*/ 174625 h 6858000"/>
+              <a:gd name="connsiteX5" fmla="*/ 4123300 w 4272784"/>
+              <a:gd name="connsiteY5" fmla="*/ 217487 h 6858000"/>
+              <a:gd name="connsiteX6" fmla="*/ 4140096 w 4272784"/>
+              <a:gd name="connsiteY6" fmla="*/ 260350 h 6858000"/>
+              <a:gd name="connsiteX7" fmla="*/ 4160251 w 4272784"/>
+              <a:gd name="connsiteY7" fmla="*/ 296862 h 6858000"/>
+              <a:gd name="connsiteX8" fmla="*/ 4180406 w 4272784"/>
+              <a:gd name="connsiteY8" fmla="*/ 334962 h 6858000"/>
+              <a:gd name="connsiteX9" fmla="*/ 4198882 w 4272784"/>
+              <a:gd name="connsiteY9" fmla="*/ 369887 h 6858000"/>
+              <a:gd name="connsiteX10" fmla="*/ 4217357 w 4272784"/>
+              <a:gd name="connsiteY10" fmla="*/ 409575 h 6858000"/>
+              <a:gd name="connsiteX11" fmla="*/ 4234153 w 4272784"/>
+              <a:gd name="connsiteY11" fmla="*/ 450850 h 6858000"/>
+              <a:gd name="connsiteX12" fmla="*/ 4249270 w 4272784"/>
+              <a:gd name="connsiteY12" fmla="*/ 496887 h 6858000"/>
+              <a:gd name="connsiteX13" fmla="*/ 4261027 w 4272784"/>
+              <a:gd name="connsiteY13" fmla="*/ 546100 h 6858000"/>
+              <a:gd name="connsiteX14" fmla="*/ 4269425 w 4272784"/>
+              <a:gd name="connsiteY14" fmla="*/ 606425 h 6858000"/>
+              <a:gd name="connsiteX15" fmla="*/ 4272784 w 4272784"/>
+              <a:gd name="connsiteY15" fmla="*/ 673100 h 6858000"/>
+              <a:gd name="connsiteX16" fmla="*/ 4269425 w 4272784"/>
+              <a:gd name="connsiteY16" fmla="*/ 744537 h 6858000"/>
+              <a:gd name="connsiteX17" fmla="*/ 4261027 w 4272784"/>
+              <a:gd name="connsiteY17" fmla="*/ 801687 h 6858000"/>
+              <a:gd name="connsiteX18" fmla="*/ 4249270 w 4272784"/>
+              <a:gd name="connsiteY18" fmla="*/ 854075 h 6858000"/>
+              <a:gd name="connsiteX19" fmla="*/ 4234153 w 4272784"/>
+              <a:gd name="connsiteY19" fmla="*/ 901700 h 6858000"/>
+              <a:gd name="connsiteX20" fmla="*/ 4217357 w 4272784"/>
+              <a:gd name="connsiteY20" fmla="*/ 942975 h 6858000"/>
+              <a:gd name="connsiteX21" fmla="*/ 4197202 w 4272784"/>
+              <a:gd name="connsiteY21" fmla="*/ 981075 h 6858000"/>
+              <a:gd name="connsiteX22" fmla="*/ 4177047 w 4272784"/>
+              <a:gd name="connsiteY22" fmla="*/ 1017587 h 6858000"/>
+              <a:gd name="connsiteX23" fmla="*/ 4156892 w 4272784"/>
+              <a:gd name="connsiteY23" fmla="*/ 1055687 h 6858000"/>
+              <a:gd name="connsiteX24" fmla="*/ 4138416 w 4272784"/>
+              <a:gd name="connsiteY24" fmla="*/ 1095375 h 6858000"/>
+              <a:gd name="connsiteX25" fmla="*/ 4119940 w 4272784"/>
+              <a:gd name="connsiteY25" fmla="*/ 1136650 h 6858000"/>
+              <a:gd name="connsiteX26" fmla="*/ 4104825 w 4272784"/>
+              <a:gd name="connsiteY26" fmla="*/ 1182687 h 6858000"/>
+              <a:gd name="connsiteX27" fmla="*/ 4094747 w 4272784"/>
+              <a:gd name="connsiteY27" fmla="*/ 1235075 h 6858000"/>
+              <a:gd name="connsiteX28" fmla="*/ 4084669 w 4272784"/>
+              <a:gd name="connsiteY28" fmla="*/ 1295400 h 6858000"/>
+              <a:gd name="connsiteX29" fmla="*/ 4082989 w 4272784"/>
+              <a:gd name="connsiteY29" fmla="*/ 1363662 h 6858000"/>
+              <a:gd name="connsiteX30" fmla="*/ 4084669 w 4272784"/>
+              <a:gd name="connsiteY30" fmla="*/ 1431925 h 6858000"/>
+              <a:gd name="connsiteX31" fmla="*/ 4094747 w 4272784"/>
+              <a:gd name="connsiteY31" fmla="*/ 1492250 h 6858000"/>
+              <a:gd name="connsiteX32" fmla="*/ 4104825 w 4272784"/>
+              <a:gd name="connsiteY32" fmla="*/ 1544637 h 6858000"/>
+              <a:gd name="connsiteX33" fmla="*/ 4119940 w 4272784"/>
+              <a:gd name="connsiteY33" fmla="*/ 1589087 h 6858000"/>
+              <a:gd name="connsiteX34" fmla="*/ 4138416 w 4272784"/>
+              <a:gd name="connsiteY34" fmla="*/ 1631950 h 6858000"/>
+              <a:gd name="connsiteX35" fmla="*/ 4156892 w 4272784"/>
+              <a:gd name="connsiteY35" fmla="*/ 1671637 h 6858000"/>
+              <a:gd name="connsiteX36" fmla="*/ 4177047 w 4272784"/>
+              <a:gd name="connsiteY36" fmla="*/ 1708150 h 6858000"/>
+              <a:gd name="connsiteX37" fmla="*/ 4197202 w 4272784"/>
+              <a:gd name="connsiteY37" fmla="*/ 1743075 h 6858000"/>
+              <a:gd name="connsiteX38" fmla="*/ 4217357 w 4272784"/>
+              <a:gd name="connsiteY38" fmla="*/ 1782762 h 6858000"/>
+              <a:gd name="connsiteX39" fmla="*/ 4234153 w 4272784"/>
+              <a:gd name="connsiteY39" fmla="*/ 1824037 h 6858000"/>
+              <a:gd name="connsiteX40" fmla="*/ 4249270 w 4272784"/>
+              <a:gd name="connsiteY40" fmla="*/ 1870075 h 6858000"/>
+              <a:gd name="connsiteX41" fmla="*/ 4261027 w 4272784"/>
+              <a:gd name="connsiteY41" fmla="*/ 1922462 h 6858000"/>
+              <a:gd name="connsiteX42" fmla="*/ 4269425 w 4272784"/>
+              <a:gd name="connsiteY42" fmla="*/ 1982787 h 6858000"/>
+              <a:gd name="connsiteX43" fmla="*/ 4272784 w 4272784"/>
+              <a:gd name="connsiteY43" fmla="*/ 2051050 h 6858000"/>
+              <a:gd name="connsiteX44" fmla="*/ 4269425 w 4272784"/>
+              <a:gd name="connsiteY44" fmla="*/ 2119312 h 6858000"/>
+              <a:gd name="connsiteX45" fmla="*/ 4261027 w 4272784"/>
+              <a:gd name="connsiteY45" fmla="*/ 2179637 h 6858000"/>
+              <a:gd name="connsiteX46" fmla="*/ 4249270 w 4272784"/>
+              <a:gd name="connsiteY46" fmla="*/ 2232025 h 6858000"/>
+              <a:gd name="connsiteX47" fmla="*/ 4234153 w 4272784"/>
+              <a:gd name="connsiteY47" fmla="*/ 2278062 h 6858000"/>
+              <a:gd name="connsiteX48" fmla="*/ 4217357 w 4272784"/>
+              <a:gd name="connsiteY48" fmla="*/ 2319337 h 6858000"/>
+              <a:gd name="connsiteX49" fmla="*/ 4197202 w 4272784"/>
+              <a:gd name="connsiteY49" fmla="*/ 2359025 h 6858000"/>
+              <a:gd name="connsiteX50" fmla="*/ 4177047 w 4272784"/>
+              <a:gd name="connsiteY50" fmla="*/ 2395537 h 6858000"/>
+              <a:gd name="connsiteX51" fmla="*/ 4156892 w 4272784"/>
+              <a:gd name="connsiteY51" fmla="*/ 2433637 h 6858000"/>
+              <a:gd name="connsiteX52" fmla="*/ 4138416 w 4272784"/>
+              <a:gd name="connsiteY52" fmla="*/ 2471737 h 6858000"/>
+              <a:gd name="connsiteX53" fmla="*/ 4119940 w 4272784"/>
+              <a:gd name="connsiteY53" fmla="*/ 2513012 h 6858000"/>
+              <a:gd name="connsiteX54" fmla="*/ 4104825 w 4272784"/>
+              <a:gd name="connsiteY54" fmla="*/ 2560637 h 6858000"/>
+              <a:gd name="connsiteX55" fmla="*/ 4094747 w 4272784"/>
+              <a:gd name="connsiteY55" fmla="*/ 2613025 h 6858000"/>
+              <a:gd name="connsiteX56" fmla="*/ 4084669 w 4272784"/>
+              <a:gd name="connsiteY56" fmla="*/ 2671762 h 6858000"/>
+              <a:gd name="connsiteX57" fmla="*/ 4082989 w 4272784"/>
+              <a:gd name="connsiteY57" fmla="*/ 2741612 h 6858000"/>
+              <a:gd name="connsiteX58" fmla="*/ 4084669 w 4272784"/>
+              <a:gd name="connsiteY58" fmla="*/ 2809875 h 6858000"/>
+              <a:gd name="connsiteX59" fmla="*/ 4094747 w 4272784"/>
+              <a:gd name="connsiteY59" fmla="*/ 2868612 h 6858000"/>
+              <a:gd name="connsiteX60" fmla="*/ 4104825 w 4272784"/>
+              <a:gd name="connsiteY60" fmla="*/ 2922587 h 6858000"/>
+              <a:gd name="connsiteX61" fmla="*/ 4119940 w 4272784"/>
+              <a:gd name="connsiteY61" fmla="*/ 2967037 h 6858000"/>
+              <a:gd name="connsiteX62" fmla="*/ 4138416 w 4272784"/>
+              <a:gd name="connsiteY62" fmla="*/ 3009900 h 6858000"/>
+              <a:gd name="connsiteX63" fmla="*/ 4156892 w 4272784"/>
+              <a:gd name="connsiteY63" fmla="*/ 3046412 h 6858000"/>
+              <a:gd name="connsiteX64" fmla="*/ 4177047 w 4272784"/>
+              <a:gd name="connsiteY64" fmla="*/ 3084512 h 6858000"/>
+              <a:gd name="connsiteX65" fmla="*/ 4197202 w 4272784"/>
+              <a:gd name="connsiteY65" fmla="*/ 3121025 h 6858000"/>
+              <a:gd name="connsiteX66" fmla="*/ 4217357 w 4272784"/>
+              <a:gd name="connsiteY66" fmla="*/ 3160712 h 6858000"/>
+              <a:gd name="connsiteX67" fmla="*/ 4234153 w 4272784"/>
+              <a:gd name="connsiteY67" fmla="*/ 3201987 h 6858000"/>
+              <a:gd name="connsiteX68" fmla="*/ 4249270 w 4272784"/>
+              <a:gd name="connsiteY68" fmla="*/ 3248025 h 6858000"/>
+              <a:gd name="connsiteX69" fmla="*/ 4261027 w 4272784"/>
+              <a:gd name="connsiteY69" fmla="*/ 3300412 h 6858000"/>
+              <a:gd name="connsiteX70" fmla="*/ 4269425 w 4272784"/>
+              <a:gd name="connsiteY70" fmla="*/ 3360737 h 6858000"/>
+              <a:gd name="connsiteX71" fmla="*/ 4272784 w 4272784"/>
+              <a:gd name="connsiteY71" fmla="*/ 3427412 h 6858000"/>
+              <a:gd name="connsiteX72" fmla="*/ 4269425 w 4272784"/>
+              <a:gd name="connsiteY72" fmla="*/ 3497262 h 6858000"/>
+              <a:gd name="connsiteX73" fmla="*/ 4261027 w 4272784"/>
+              <a:gd name="connsiteY73" fmla="*/ 3557587 h 6858000"/>
+              <a:gd name="connsiteX74" fmla="*/ 4249270 w 4272784"/>
+              <a:gd name="connsiteY74" fmla="*/ 3609975 h 6858000"/>
+              <a:gd name="connsiteX75" fmla="*/ 4234153 w 4272784"/>
+              <a:gd name="connsiteY75" fmla="*/ 3656012 h 6858000"/>
+              <a:gd name="connsiteX76" fmla="*/ 4217357 w 4272784"/>
+              <a:gd name="connsiteY76" fmla="*/ 3697287 h 6858000"/>
+              <a:gd name="connsiteX77" fmla="*/ 4197202 w 4272784"/>
+              <a:gd name="connsiteY77" fmla="*/ 3736975 h 6858000"/>
+              <a:gd name="connsiteX78" fmla="*/ 4156892 w 4272784"/>
+              <a:gd name="connsiteY78" fmla="*/ 3811587 h 6858000"/>
+              <a:gd name="connsiteX79" fmla="*/ 4138416 w 4272784"/>
+              <a:gd name="connsiteY79" fmla="*/ 3848100 h 6858000"/>
+              <a:gd name="connsiteX80" fmla="*/ 4119940 w 4272784"/>
+              <a:gd name="connsiteY80" fmla="*/ 3890962 h 6858000"/>
+              <a:gd name="connsiteX81" fmla="*/ 4104825 w 4272784"/>
+              <a:gd name="connsiteY81" fmla="*/ 3935412 h 6858000"/>
+              <a:gd name="connsiteX82" fmla="*/ 4094747 w 4272784"/>
+              <a:gd name="connsiteY82" fmla="*/ 3987800 h 6858000"/>
+              <a:gd name="connsiteX83" fmla="*/ 4084669 w 4272784"/>
+              <a:gd name="connsiteY83" fmla="*/ 4048125 h 6858000"/>
+              <a:gd name="connsiteX84" fmla="*/ 4082989 w 4272784"/>
+              <a:gd name="connsiteY84" fmla="*/ 4116387 h 6858000"/>
+              <a:gd name="connsiteX85" fmla="*/ 4084669 w 4272784"/>
+              <a:gd name="connsiteY85" fmla="*/ 4186237 h 6858000"/>
+              <a:gd name="connsiteX86" fmla="*/ 4094747 w 4272784"/>
+              <a:gd name="connsiteY86" fmla="*/ 4244975 h 6858000"/>
+              <a:gd name="connsiteX87" fmla="*/ 4104825 w 4272784"/>
+              <a:gd name="connsiteY87" fmla="*/ 4297362 h 6858000"/>
+              <a:gd name="connsiteX88" fmla="*/ 4119940 w 4272784"/>
+              <a:gd name="connsiteY88" fmla="*/ 4343400 h 6858000"/>
+              <a:gd name="connsiteX89" fmla="*/ 4138416 w 4272784"/>
+              <a:gd name="connsiteY89" fmla="*/ 4386262 h 6858000"/>
+              <a:gd name="connsiteX90" fmla="*/ 4156892 w 4272784"/>
+              <a:gd name="connsiteY90" fmla="*/ 4424362 h 6858000"/>
+              <a:gd name="connsiteX91" fmla="*/ 4197202 w 4272784"/>
+              <a:gd name="connsiteY91" fmla="*/ 4498975 h 6858000"/>
+              <a:gd name="connsiteX92" fmla="*/ 4217357 w 4272784"/>
+              <a:gd name="connsiteY92" fmla="*/ 4537075 h 6858000"/>
+              <a:gd name="connsiteX93" fmla="*/ 4234153 w 4272784"/>
+              <a:gd name="connsiteY93" fmla="*/ 4579937 h 6858000"/>
+              <a:gd name="connsiteX94" fmla="*/ 4249270 w 4272784"/>
+              <a:gd name="connsiteY94" fmla="*/ 4625975 h 6858000"/>
+              <a:gd name="connsiteX95" fmla="*/ 4261027 w 4272784"/>
+              <a:gd name="connsiteY95" fmla="*/ 4678362 h 6858000"/>
+              <a:gd name="connsiteX96" fmla="*/ 4269425 w 4272784"/>
+              <a:gd name="connsiteY96" fmla="*/ 4738687 h 6858000"/>
+              <a:gd name="connsiteX97" fmla="*/ 4272784 w 4272784"/>
+              <a:gd name="connsiteY97" fmla="*/ 4806950 h 6858000"/>
+              <a:gd name="connsiteX98" fmla="*/ 4269425 w 4272784"/>
+              <a:gd name="connsiteY98" fmla="*/ 4875212 h 6858000"/>
+              <a:gd name="connsiteX99" fmla="*/ 4261027 w 4272784"/>
+              <a:gd name="connsiteY99" fmla="*/ 4935537 h 6858000"/>
+              <a:gd name="connsiteX100" fmla="*/ 4249270 w 4272784"/>
+              <a:gd name="connsiteY100" fmla="*/ 4987925 h 6858000"/>
+              <a:gd name="connsiteX101" fmla="*/ 4234153 w 4272784"/>
+              <a:gd name="connsiteY101" fmla="*/ 5033962 h 6858000"/>
+              <a:gd name="connsiteX102" fmla="*/ 4217357 w 4272784"/>
+              <a:gd name="connsiteY102" fmla="*/ 5075237 h 6858000"/>
+              <a:gd name="connsiteX103" fmla="*/ 4197202 w 4272784"/>
+              <a:gd name="connsiteY103" fmla="*/ 5114925 h 6858000"/>
+              <a:gd name="connsiteX104" fmla="*/ 4177047 w 4272784"/>
+              <a:gd name="connsiteY104" fmla="*/ 5149850 h 6858000"/>
+              <a:gd name="connsiteX105" fmla="*/ 4156892 w 4272784"/>
+              <a:gd name="connsiteY105" fmla="*/ 5186362 h 6858000"/>
+              <a:gd name="connsiteX106" fmla="*/ 4138416 w 4272784"/>
+              <a:gd name="connsiteY106" fmla="*/ 5226050 h 6858000"/>
+              <a:gd name="connsiteX107" fmla="*/ 4119940 w 4272784"/>
+              <a:gd name="connsiteY107" fmla="*/ 5268912 h 6858000"/>
+              <a:gd name="connsiteX108" fmla="*/ 4104825 w 4272784"/>
+              <a:gd name="connsiteY108" fmla="*/ 5313362 h 6858000"/>
+              <a:gd name="connsiteX109" fmla="*/ 4094747 w 4272784"/>
+              <a:gd name="connsiteY109" fmla="*/ 5365750 h 6858000"/>
+              <a:gd name="connsiteX110" fmla="*/ 4084669 w 4272784"/>
+              <a:gd name="connsiteY110" fmla="*/ 5426075 h 6858000"/>
+              <a:gd name="connsiteX111" fmla="*/ 4082989 w 4272784"/>
+              <a:gd name="connsiteY111" fmla="*/ 5494337 h 6858000"/>
+              <a:gd name="connsiteX112" fmla="*/ 4084669 w 4272784"/>
+              <a:gd name="connsiteY112" fmla="*/ 5562600 h 6858000"/>
+              <a:gd name="connsiteX113" fmla="*/ 4094747 w 4272784"/>
+              <a:gd name="connsiteY113" fmla="*/ 5622925 h 6858000"/>
+              <a:gd name="connsiteX114" fmla="*/ 4104825 w 4272784"/>
+              <a:gd name="connsiteY114" fmla="*/ 5675312 h 6858000"/>
+              <a:gd name="connsiteX115" fmla="*/ 4119940 w 4272784"/>
+              <a:gd name="connsiteY115" fmla="*/ 5721350 h 6858000"/>
+              <a:gd name="connsiteX116" fmla="*/ 4138416 w 4272784"/>
+              <a:gd name="connsiteY116" fmla="*/ 5762625 h 6858000"/>
+              <a:gd name="connsiteX117" fmla="*/ 4156892 w 4272784"/>
+              <a:gd name="connsiteY117" fmla="*/ 5802312 h 6858000"/>
+              <a:gd name="connsiteX118" fmla="*/ 4177047 w 4272784"/>
+              <a:gd name="connsiteY118" fmla="*/ 5840412 h 6858000"/>
+              <a:gd name="connsiteX119" fmla="*/ 4197202 w 4272784"/>
+              <a:gd name="connsiteY119" fmla="*/ 5876925 h 6858000"/>
+              <a:gd name="connsiteX120" fmla="*/ 4217357 w 4272784"/>
+              <a:gd name="connsiteY120" fmla="*/ 5915025 h 6858000"/>
+              <a:gd name="connsiteX121" fmla="*/ 4234153 w 4272784"/>
+              <a:gd name="connsiteY121" fmla="*/ 5956300 h 6858000"/>
+              <a:gd name="connsiteX122" fmla="*/ 4249270 w 4272784"/>
+              <a:gd name="connsiteY122" fmla="*/ 6003925 h 6858000"/>
+              <a:gd name="connsiteX123" fmla="*/ 4261027 w 4272784"/>
+              <a:gd name="connsiteY123" fmla="*/ 6056312 h 6858000"/>
+              <a:gd name="connsiteX124" fmla="*/ 4269425 w 4272784"/>
+              <a:gd name="connsiteY124" fmla="*/ 6113462 h 6858000"/>
+              <a:gd name="connsiteX125" fmla="*/ 4272784 w 4272784"/>
+              <a:gd name="connsiteY125" fmla="*/ 6183312 h 6858000"/>
+              <a:gd name="connsiteX126" fmla="*/ 4269425 w 4272784"/>
+              <a:gd name="connsiteY126" fmla="*/ 6251575 h 6858000"/>
+              <a:gd name="connsiteX127" fmla="*/ 4261027 w 4272784"/>
+              <a:gd name="connsiteY127" fmla="*/ 6311900 h 6858000"/>
+              <a:gd name="connsiteX128" fmla="*/ 4249270 w 4272784"/>
+              <a:gd name="connsiteY128" fmla="*/ 6361112 h 6858000"/>
+              <a:gd name="connsiteX129" fmla="*/ 4234153 w 4272784"/>
+              <a:gd name="connsiteY129" fmla="*/ 6407150 h 6858000"/>
+              <a:gd name="connsiteX130" fmla="*/ 4217357 w 4272784"/>
+              <a:gd name="connsiteY130" fmla="*/ 6448425 h 6858000"/>
+              <a:gd name="connsiteX131" fmla="*/ 4198882 w 4272784"/>
+              <a:gd name="connsiteY131" fmla="*/ 6488112 h 6858000"/>
+              <a:gd name="connsiteX132" fmla="*/ 4180406 w 4272784"/>
+              <a:gd name="connsiteY132" fmla="*/ 6523037 h 6858000"/>
+              <a:gd name="connsiteX133" fmla="*/ 4160251 w 4272784"/>
+              <a:gd name="connsiteY133" fmla="*/ 6561137 h 6858000"/>
+              <a:gd name="connsiteX134" fmla="*/ 4140096 w 4272784"/>
+              <a:gd name="connsiteY134" fmla="*/ 6597650 h 6858000"/>
+              <a:gd name="connsiteX135" fmla="*/ 4123300 w 4272784"/>
+              <a:gd name="connsiteY135" fmla="*/ 6640512 h 6858000"/>
+              <a:gd name="connsiteX136" fmla="*/ 4106504 w 4272784"/>
+              <a:gd name="connsiteY136" fmla="*/ 6683375 h 6858000"/>
+              <a:gd name="connsiteX137" fmla="*/ 4096426 w 4272784"/>
+              <a:gd name="connsiteY137" fmla="*/ 6735762 h 6858000"/>
+              <a:gd name="connsiteX138" fmla="*/ 4088029 w 4272784"/>
+              <a:gd name="connsiteY138" fmla="*/ 6791325 h 6858000"/>
+              <a:gd name="connsiteX139" fmla="*/ 4082989 w 4272784"/>
+              <a:gd name="connsiteY139" fmla="*/ 6858000 h 6858000"/>
+              <a:gd name="connsiteX140" fmla="*/ 0 w 4272784"/>
+              <a:gd name="connsiteY140" fmla="*/ 6858000 h 6858000"/>
+            </a:gdLst>
+            <a:ahLst/>
+            <a:cxnLst>
+              <a:cxn ang="0">
+                <a:pos x="connsiteX0" y="connsiteY0"/>
+              </a:cxn>
+              <a:cxn ang="0">
+                <a:pos x="connsiteX1" y="connsiteY1"/>
+              </a:cxn>
+              <a:cxn ang="0">
+                <a:pos x="connsiteX2" y="connsiteY2"/>
+              </a:cxn>
+              <a:cxn ang="0">
+                <a:pos x="connsiteX3" y="connsiteY3"/>
+              </a:cxn>
+              <a:cxn ang="0">
+                <a:pos x="connsiteX4" y="connsiteY4"/>
+              </a:cxn>
+              <a:cxn ang="0">
+                <a:pos x="connsiteX5" y="connsiteY5"/>
+              </a:cxn>
+              <a:cxn ang="0">
+                <a:pos x="connsiteX6" y="connsiteY6"/>
+              </a:cxn>
+              <a:cxn ang="0">
+                <a:pos x="connsiteX7" y="connsiteY7"/>
+              </a:cxn>
+              <a:cxn ang="0">
+                <a:pos x="connsiteX8" y="connsiteY8"/>
+              </a:cxn>
+              <a:cxn ang="0">
+                <a:pos x="connsiteX9" y="connsiteY9"/>
+              </a:cxn>
+              <a:cxn ang="0">
+                <a:pos x="connsiteX10" y="connsiteY10"/>
+              </a:cxn>
+              <a:cxn ang="0">
+                <a:pos x="connsiteX11" y="connsiteY11"/>
+              </a:cxn>
+              <a:cxn ang="0">
+                <a:pos x="connsiteX12" y="connsiteY12"/>
+              </a:cxn>
+              <a:cxn ang="0">
+                <a:pos x="connsiteX13" y="connsiteY13"/>
+              </a:cxn>
+              <a:cxn ang="0">
+                <a:pos x="connsiteX14" y="connsiteY14"/>
+              </a:cxn>
+              <a:cxn ang="0">
+                <a:pos x="connsiteX15" y="connsiteY15"/>
+              </a:cxn>
+              <a:cxn ang="0">
+                <a:pos x="connsiteX16" y="connsiteY16"/>
+              </a:cxn>
+              <a:cxn ang="0">
+                <a:pos x="connsiteX17" y="connsiteY17"/>
+              </a:cxn>
+              <a:cxn ang="0">
+                <a:pos x="connsiteX18" y="connsiteY18"/>
+              </a:cxn>
+              <a:cxn ang="0">
+                <a:pos x="connsiteX19" y="connsiteY19"/>
+              </a:cxn>
+              <a:cxn ang="0">
+                <a:pos x="connsiteX20" y="connsiteY20"/>
+              </a:cxn>
+              <a:cxn ang="0">
+                <a:pos x="connsiteX21" y="connsiteY21"/>
+              </a:cxn>
+              <a:cxn ang="0">
+                <a:pos x="connsiteX22" y="connsiteY22"/>
+              </a:cxn>
+              <a:cxn ang="0">
+                <a:pos x="connsiteX23" y="connsiteY23"/>
+              </a:cxn>
+              <a:cxn ang="0">
+                <a:pos x="connsiteX24" y="connsiteY24"/>
+              </a:cxn>
+              <a:cxn ang="0">
+                <a:pos x="connsiteX25" y="connsiteY25"/>
+              </a:cxn>
+              <a:cxn ang="0">
+                <a:pos x="connsiteX26" y="connsiteY26"/>
+              </a:cxn>
+              <a:cxn ang="0">
+                <a:pos x="connsiteX27" y="connsiteY27"/>
+              </a:cxn>
+              <a:cxn ang="0">
+                <a:pos x="connsiteX28" y="connsiteY28"/>
+              </a:cxn>
+              <a:cxn ang="0">
+                <a:pos x="connsiteX29" y="connsiteY29"/>
+              </a:cxn>
+              <a:cxn ang="0">
+                <a:pos x="connsiteX30" y="connsiteY30"/>
+              </a:cxn>
+              <a:cxn ang="0">
+                <a:pos x="connsiteX31" y="connsiteY31"/>
+              </a:cxn>
+              <a:cxn ang="0">
+                <a:pos x="connsiteX32" y="connsiteY32"/>
+              </a:cxn>
+              <a:cxn ang="0">
+                <a:pos x="connsiteX33" y="connsiteY33"/>
+              </a:cxn>
+              <a:cxn ang="0">
+                <a:pos x="connsiteX34" y="connsiteY34"/>
+              </a:cxn>
+              <a:cxn ang="0">
+                <a:pos x="connsiteX35" y="connsiteY35"/>
+              </a:cxn>
+              <a:cxn ang="0">
+                <a:pos x="connsiteX36" y="connsiteY36"/>
+              </a:cxn>
+              <a:cxn ang="0">
+                <a:pos x="connsiteX37" y="connsiteY37"/>
+              </a:cxn>
+              <a:cxn ang="0">
+                <a:pos x="connsiteX38" y="connsiteY38"/>
+              </a:cxn>
+              <a:cxn ang="0">
+                <a:pos x="connsiteX39" y="connsiteY39"/>
+              </a:cxn>
+              <a:cxn ang="0">
+                <a:pos x="connsiteX40" y="connsiteY40"/>
+              </a:cxn>
+              <a:cxn ang="0">
+                <a:pos x="connsiteX41" y="connsiteY41"/>
+              </a:cxn>
+              <a:cxn ang="0">
+                <a:pos x="connsiteX42" y="connsiteY42"/>
+              </a:cxn>
+              <a:cxn ang="0">
+                <a:pos x="connsiteX43" y="connsiteY43"/>
+              </a:cxn>
+              <a:cxn ang="0">
+                <a:pos x="connsiteX44" y="connsiteY44"/>
+              </a:cxn>
+              <a:cxn ang="0">
+                <a:pos x="connsiteX45" y="connsiteY45"/>
+              </a:cxn>
+              <a:cxn ang="0">
+                <a:pos x="connsiteX46" y="connsiteY46"/>
+              </a:cxn>
+              <a:cxn ang="0">
+                <a:pos x="connsiteX47" y="connsiteY47"/>
+              </a:cxn>
+              <a:cxn ang="0">
+                <a:pos x="connsiteX48" y="connsiteY48"/>
+              </a:cxn>
+              <a:cxn ang="0">
+                <a:pos x="connsiteX49" y="connsiteY49"/>
+              </a:cxn>
+              <a:cxn ang="0">
+                <a:pos x="connsiteX50" y="connsiteY50"/>
+              </a:cxn>
+              <a:cxn ang="0">
+                <a:pos x="connsiteX51" y="connsiteY51"/>
+              </a:cxn>
+              <a:cxn ang="0">
+                <a:pos x="connsiteX52" y="connsiteY52"/>
+              </a:cxn>
+              <a:cxn ang="0">
+                <a:pos x="connsiteX53" y="connsiteY53"/>
+              </a:cxn>
+              <a:cxn ang="0">
+                <a:pos x="connsiteX54" y="connsiteY54"/>
+              </a:cxn>
+              <a:cxn ang="0">
+                <a:pos x="connsiteX55" y="connsiteY55"/>
+              </a:cxn>
+              <a:cxn ang="0">
+                <a:pos x="connsiteX56" y="connsiteY56"/>
+              </a:cxn>
+              <a:cxn ang="0">
+                <a:pos x="connsiteX57" y="connsiteY57"/>
+              </a:cxn>
+              <a:cxn ang="0">
+                <a:pos x="connsiteX58" y="connsiteY58"/>
+              </a:cxn>
+              <a:cxn ang="0">
+                <a:pos x="connsiteX59" y="connsiteY59"/>
+              </a:cxn>
+              <a:cxn ang="0">
+                <a:pos x="connsiteX60" y="connsiteY60"/>
+              </a:cxn>
+              <a:cxn ang="0">
+                <a:pos x="connsiteX61" y="connsiteY61"/>
+              </a:cxn>
+              <a:cxn ang="0">
+                <a:pos x="connsiteX62" y="connsiteY62"/>
+              </a:cxn>
+              <a:cxn ang="0">
+                <a:pos x="connsiteX63" y="connsiteY63"/>
+              </a:cxn>
+              <a:cxn ang="0">
+                <a:pos x="connsiteX64" y="connsiteY64"/>
+              </a:cxn>
+              <a:cxn ang="0">
+                <a:pos x="connsiteX65" y="connsiteY65"/>
+              </a:cxn>
+              <a:cxn ang="0">
+                <a:pos x="connsiteX66" y="connsiteY66"/>
+              </a:cxn>
+              <a:cxn ang="0">
+                <a:pos x="connsiteX67" y="connsiteY67"/>
+              </a:cxn>
+              <a:cxn ang="0">
+                <a:pos x="connsiteX68" y="connsiteY68"/>
+              </a:cxn>
+              <a:cxn ang="0">
+                <a:pos x="connsiteX69" y="connsiteY69"/>
+              </a:cxn>
+              <a:cxn ang="0">
+                <a:pos x="connsiteX70" y="connsiteY70"/>
+              </a:cxn>
+              <a:cxn ang="0">
+                <a:pos x="connsiteX71" y="connsiteY71"/>
+              </a:cxn>
+              <a:cxn ang="0">
+                <a:pos x="connsiteX72" y="connsiteY72"/>
+              </a:cxn>
+              <a:cxn ang="0">
+                <a:pos x="connsiteX73" y="connsiteY73"/>
+              </a:cxn>
+              <a:cxn ang="0">
+                <a:pos x="connsiteX74" y="connsiteY74"/>
+              </a:cxn>
+              <a:cxn ang="0">
+                <a:pos x="connsiteX75" y="connsiteY75"/>
+              </a:cxn>
+              <a:cxn ang="0">
+                <a:pos x="connsiteX76" y="connsiteY76"/>
+              </a:cxn>
+              <a:cxn ang="0">
+                <a:pos x="connsiteX77" y="connsiteY77"/>
+              </a:cxn>
+              <a:cxn ang="0">
+                <a:pos x="connsiteX78" y="connsiteY78"/>
+              </a:cxn>
+              <a:cxn ang="0">
+                <a:pos x="connsiteX79" y="connsiteY79"/>
+              </a:cxn>
+              <a:cxn ang="0">
+                <a:pos x="connsiteX80" y="connsiteY80"/>
+              </a:cxn>
+              <a:cxn ang="0">
+                <a:pos x="connsiteX81" y="connsiteY81"/>
+              </a:cxn>
+              <a:cxn ang="0">
+                <a:pos x="connsiteX82" y="connsiteY82"/>
+              </a:cxn>
+              <a:cxn ang="0">
+                <a:pos x="connsiteX83" y="connsiteY83"/>
+              </a:cxn>
+              <a:cxn ang="0">
+                <a:pos x="connsiteX84" y="connsiteY84"/>
+              </a:cxn>
+              <a:cxn ang="0">
+                <a:pos x="connsiteX85" y="connsiteY85"/>
+              </a:cxn>
+              <a:cxn ang="0">
+                <a:pos x="connsiteX86" y="connsiteY86"/>
+              </a:cxn>
+              <a:cxn ang="0">
+                <a:pos x="connsiteX87" y="connsiteY87"/>
+              </a:cxn>
+              <a:cxn ang="0">
+                <a:pos x="connsiteX88" y="connsiteY88"/>
+              </a:cxn>
+              <a:cxn ang="0">
+                <a:pos x="connsiteX89" y="connsiteY89"/>
+              </a:cxn>
+              <a:cxn ang="0">
+                <a:pos x="connsiteX90" y="connsiteY90"/>
+              </a:cxn>
+              <a:cxn ang="0">
+                <a:pos x="connsiteX91" y="connsiteY91"/>
+              </a:cxn>
+              <a:cxn ang="0">
+                <a:pos x="connsiteX92" y="connsiteY92"/>
+              </a:cxn>
+              <a:cxn ang="0">
+                <a:pos x="connsiteX93" y="connsiteY93"/>
+              </a:cxn>
+              <a:cxn ang="0">
+                <a:pos x="connsiteX94" y="connsiteY94"/>
+              </a:cxn>
+              <a:cxn ang="0">
+                <a:pos x="connsiteX95" y="connsiteY95"/>
+              </a:cxn>
+              <a:cxn ang="0">
+                <a:pos x="connsiteX96" y="connsiteY96"/>
+              </a:cxn>
+              <a:cxn ang="0">
+                <a:pos x="connsiteX97" y="connsiteY97"/>
+              </a:cxn>
+              <a:cxn ang="0">
+                <a:pos x="connsiteX98" y="connsiteY98"/>
+              </a:cxn>
+              <a:cxn ang="0">
+                <a:pos x="connsiteX99" y="connsiteY99"/>
+              </a:cxn>
+              <a:cxn ang="0">
+                <a:pos x="connsiteX100" y="connsiteY100"/>
+              </a:cxn>
+              <a:cxn ang="0">
+                <a:pos x="connsiteX101" y="connsiteY101"/>
+              </a:cxn>
+              <a:cxn ang="0">
+                <a:pos x="connsiteX102" y="connsiteY102"/>
+              </a:cxn>
+              <a:cxn ang="0">
+                <a:pos x="connsiteX103" y="connsiteY103"/>
+              </a:cxn>
+              <a:cxn ang="0">
+                <a:pos x="connsiteX104" y="connsiteY104"/>
+              </a:cxn>
+              <a:cxn ang="0">
+                <a:pos x="connsiteX105" y="connsiteY105"/>
+              </a:cxn>
+              <a:cxn ang="0">
+                <a:pos x="connsiteX106" y="connsiteY106"/>
+              </a:cxn>
+              <a:cxn ang="0">
+                <a:pos x="connsiteX107" y="connsiteY107"/>
+              </a:cxn>
+              <a:cxn ang="0">
+                <a:pos x="connsiteX108" y="connsiteY108"/>
+              </a:cxn>
+              <a:cxn ang="0">
+                <a:pos x="connsiteX109" y="connsiteY109"/>
+              </a:cxn>
+              <a:cxn ang="0">
+                <a:pos x="connsiteX110" y="connsiteY110"/>
+              </a:cxn>
+              <a:cxn ang="0">
+                <a:pos x="connsiteX111" y="connsiteY111"/>
+              </a:cxn>
+              <a:cxn ang="0">
+                <a:pos x="connsiteX112" y="connsiteY112"/>
+              </a:cxn>
+              <a:cxn ang="0">
+                <a:pos x="connsiteX113" y="connsiteY113"/>
+              </a:cxn>
+              <a:cxn ang="0">
+                <a:pos x="connsiteX114" y="connsiteY114"/>
+              </a:cxn>
+              <a:cxn ang="0">
+                <a:pos x="connsiteX115" y="connsiteY115"/>
+              </a:cxn>
+              <a:cxn ang="0">
+                <a:pos x="connsiteX116" y="connsiteY116"/>
+              </a:cxn>
+              <a:cxn ang="0">
+                <a:pos x="connsiteX117" y="connsiteY117"/>
+              </a:cxn>
+              <a:cxn ang="0">
+                <a:pos x="connsiteX118" y="connsiteY118"/>
+              </a:cxn>
+              <a:cxn ang="0">
+                <a:pos x="connsiteX119" y="connsiteY119"/>
+              </a:cxn>
+              <a:cxn ang="0">
+                <a:pos x="connsiteX120" y="connsiteY120"/>
+              </a:cxn>
+              <a:cxn ang="0">
+                <a:pos x="connsiteX121" y="connsiteY121"/>
+              </a:cxn>
+              <a:cxn ang="0">
+                <a:pos x="connsiteX122" y="connsiteY122"/>
+              </a:cxn>
+              <a:cxn ang="0">
+                <a:pos x="connsiteX123" y="connsiteY123"/>
+              </a:cxn>
+              <a:cxn ang="0">
+                <a:pos x="connsiteX124" y="connsiteY124"/>
+              </a:cxn>
+              <a:cxn ang="0">
+                <a:pos x="connsiteX125" y="connsiteY125"/>
+              </a:cxn>
+              <a:cxn ang="0">
+                <a:pos x="connsiteX126" y="connsiteY126"/>
+              </a:cxn>
+              <a:cxn ang="0">
+                <a:pos x="connsiteX127" y="connsiteY127"/>
+              </a:cxn>
+              <a:cxn ang="0">
+                <a:pos x="connsiteX128" y="connsiteY128"/>
+              </a:cxn>
+              <a:cxn ang="0">
+                <a:pos x="connsiteX129" y="connsiteY129"/>
+              </a:cxn>
+              <a:cxn ang="0">
+                <a:pos x="connsiteX130" y="connsiteY130"/>
+              </a:cxn>
+              <a:cxn ang="0">
+                <a:pos x="connsiteX131" y="connsiteY131"/>
+              </a:cxn>
+              <a:cxn ang="0">
+                <a:pos x="connsiteX132" y="connsiteY132"/>
+              </a:cxn>
+              <a:cxn ang="0">
+                <a:pos x="connsiteX133" y="connsiteY133"/>
+              </a:cxn>
+              <a:cxn ang="0">
+                <a:pos x="connsiteX134" y="connsiteY134"/>
+              </a:cxn>
+              <a:cxn ang="0">
+                <a:pos x="connsiteX135" y="connsiteY135"/>
+              </a:cxn>
+              <a:cxn ang="0">
+                <a:pos x="connsiteX136" y="connsiteY136"/>
+              </a:cxn>
+              <a:cxn ang="0">
+                <a:pos x="connsiteX137" y="connsiteY137"/>
+              </a:cxn>
+              <a:cxn ang="0">
+                <a:pos x="connsiteX138" y="connsiteY138"/>
+              </a:cxn>
+              <a:cxn ang="0">
+                <a:pos x="connsiteX139" y="connsiteY139"/>
+              </a:cxn>
+              <a:cxn ang="0">
+                <a:pos x="connsiteX140" y="connsiteY140"/>
+              </a:cxn>
+            </a:cxnLst>
+            <a:rect l="l" t="t" r="r" b="b"/>
+            <a:pathLst>
+              <a:path w="4272784" h="6858000">
+                <a:moveTo>
+                  <a:pt x="0" y="0"/>
+                </a:moveTo>
+                <a:lnTo>
+                  <a:pt x="4082989" y="0"/>
+                </a:lnTo>
+                <a:lnTo>
+                  <a:pt x="4088029" y="66675"/>
+                </a:lnTo>
+                <a:lnTo>
+                  <a:pt x="4096426" y="122237"/>
+                </a:lnTo>
+                <a:lnTo>
+                  <a:pt x="4106504" y="174625"/>
+                </a:lnTo>
+                <a:lnTo>
+                  <a:pt x="4123300" y="217487"/>
+                </a:lnTo>
+                <a:lnTo>
+                  <a:pt x="4140096" y="260350"/>
+                </a:lnTo>
+                <a:lnTo>
+                  <a:pt x="4160251" y="296862"/>
+                </a:lnTo>
+                <a:lnTo>
+                  <a:pt x="4180406" y="334962"/>
+                </a:lnTo>
+                <a:lnTo>
+                  <a:pt x="4198882" y="369887"/>
+                </a:lnTo>
+                <a:lnTo>
+                  <a:pt x="4217357" y="409575"/>
+                </a:lnTo>
+                <a:lnTo>
+                  <a:pt x="4234153" y="450850"/>
+                </a:lnTo>
+                <a:lnTo>
+                  <a:pt x="4249270" y="496887"/>
+                </a:lnTo>
+                <a:lnTo>
+                  <a:pt x="4261027" y="546100"/>
+                </a:lnTo>
+                <a:lnTo>
+                  <a:pt x="4269425" y="606425"/>
+                </a:lnTo>
+                <a:lnTo>
+                  <a:pt x="4272784" y="673100"/>
+                </a:lnTo>
+                <a:lnTo>
+                  <a:pt x="4269425" y="744537"/>
+                </a:lnTo>
+                <a:lnTo>
+                  <a:pt x="4261027" y="801687"/>
+                </a:lnTo>
+                <a:lnTo>
+                  <a:pt x="4249270" y="854075"/>
+                </a:lnTo>
+                <a:lnTo>
+                  <a:pt x="4234153" y="901700"/>
+                </a:lnTo>
+                <a:lnTo>
+                  <a:pt x="4217357" y="942975"/>
+                </a:lnTo>
+                <a:lnTo>
+                  <a:pt x="4197202" y="981075"/>
+                </a:lnTo>
+                <a:lnTo>
+                  <a:pt x="4177047" y="1017587"/>
+                </a:lnTo>
+                <a:lnTo>
+                  <a:pt x="4156892" y="1055687"/>
+                </a:lnTo>
+                <a:lnTo>
+                  <a:pt x="4138416" y="1095375"/>
+                </a:lnTo>
+                <a:lnTo>
+                  <a:pt x="4119940" y="1136650"/>
+                </a:lnTo>
+                <a:lnTo>
+                  <a:pt x="4104825" y="1182687"/>
+                </a:lnTo>
+                <a:lnTo>
+                  <a:pt x="4094747" y="1235075"/>
+                </a:lnTo>
+                <a:lnTo>
+                  <a:pt x="4084669" y="1295400"/>
+                </a:lnTo>
+                <a:lnTo>
+                  <a:pt x="4082989" y="1363662"/>
+                </a:lnTo>
+                <a:lnTo>
+                  <a:pt x="4084669" y="1431925"/>
+                </a:lnTo>
+                <a:lnTo>
+                  <a:pt x="4094747" y="1492250"/>
+                </a:lnTo>
+                <a:lnTo>
+                  <a:pt x="4104825" y="1544637"/>
+                </a:lnTo>
+                <a:lnTo>
+                  <a:pt x="4119940" y="1589087"/>
+                </a:lnTo>
+                <a:lnTo>
+                  <a:pt x="4138416" y="1631950"/>
+                </a:lnTo>
+                <a:lnTo>
+                  <a:pt x="4156892" y="1671637"/>
+                </a:lnTo>
+                <a:lnTo>
+                  <a:pt x="4177047" y="1708150"/>
+                </a:lnTo>
+                <a:lnTo>
+                  <a:pt x="4197202" y="1743075"/>
+                </a:lnTo>
+                <a:lnTo>
+                  <a:pt x="4217357" y="1782762"/>
+                </a:lnTo>
+                <a:lnTo>
+                  <a:pt x="4234153" y="1824037"/>
+                </a:lnTo>
+                <a:lnTo>
+                  <a:pt x="4249270" y="1870075"/>
+                </a:lnTo>
+                <a:lnTo>
+                  <a:pt x="4261027" y="1922462"/>
+                </a:lnTo>
+                <a:lnTo>
+                  <a:pt x="4269425" y="1982787"/>
+                </a:lnTo>
+                <a:lnTo>
+                  <a:pt x="4272784" y="2051050"/>
+                </a:lnTo>
+                <a:lnTo>
+                  <a:pt x="4269425" y="2119312"/>
+                </a:lnTo>
+                <a:lnTo>
+                  <a:pt x="4261027" y="2179637"/>
+                </a:lnTo>
+                <a:lnTo>
+                  <a:pt x="4249270" y="2232025"/>
+                </a:lnTo>
+                <a:lnTo>
+                  <a:pt x="4234153" y="2278062"/>
+                </a:lnTo>
+                <a:lnTo>
+                  <a:pt x="4217357" y="2319337"/>
+                </a:lnTo>
+                <a:lnTo>
+                  <a:pt x="4197202" y="2359025"/>
+                </a:lnTo>
+                <a:lnTo>
+                  <a:pt x="4177047" y="2395537"/>
+                </a:lnTo>
+                <a:lnTo>
+                  <a:pt x="4156892" y="2433637"/>
+                </a:lnTo>
+                <a:lnTo>
+                  <a:pt x="4138416" y="2471737"/>
+                </a:lnTo>
+                <a:lnTo>
+                  <a:pt x="4119940" y="2513012"/>
+                </a:lnTo>
+                <a:lnTo>
+                  <a:pt x="4104825" y="2560637"/>
+                </a:lnTo>
+                <a:lnTo>
+                  <a:pt x="4094747" y="2613025"/>
+                </a:lnTo>
+                <a:lnTo>
+                  <a:pt x="4084669" y="2671762"/>
+                </a:lnTo>
+                <a:lnTo>
+                  <a:pt x="4082989" y="2741612"/>
+                </a:lnTo>
+                <a:lnTo>
+                  <a:pt x="4084669" y="2809875"/>
+                </a:lnTo>
+                <a:lnTo>
+                  <a:pt x="4094747" y="2868612"/>
+                </a:lnTo>
+                <a:lnTo>
+                  <a:pt x="4104825" y="2922587"/>
+                </a:lnTo>
+                <a:lnTo>
+                  <a:pt x="4119940" y="2967037"/>
+                </a:lnTo>
+                <a:lnTo>
+                  <a:pt x="4138416" y="3009900"/>
+                </a:lnTo>
+                <a:lnTo>
+                  <a:pt x="4156892" y="3046412"/>
+                </a:lnTo>
+                <a:lnTo>
+                  <a:pt x="4177047" y="3084512"/>
+                </a:lnTo>
+                <a:lnTo>
+                  <a:pt x="4197202" y="3121025"/>
+                </a:lnTo>
+                <a:lnTo>
+                  <a:pt x="4217357" y="3160712"/>
+                </a:lnTo>
+                <a:lnTo>
+                  <a:pt x="4234153" y="3201987"/>
+                </a:lnTo>
+                <a:lnTo>
+                  <a:pt x="4249270" y="3248025"/>
+                </a:lnTo>
+                <a:lnTo>
+                  <a:pt x="4261027" y="3300412"/>
+                </a:lnTo>
+                <a:lnTo>
+                  <a:pt x="4269425" y="3360737"/>
+                </a:lnTo>
+                <a:lnTo>
+                  <a:pt x="4272784" y="3427412"/>
+                </a:lnTo>
+                <a:lnTo>
+                  <a:pt x="4269425" y="3497262"/>
+                </a:lnTo>
+                <a:lnTo>
+                  <a:pt x="4261027" y="3557587"/>
+                </a:lnTo>
+                <a:lnTo>
+                  <a:pt x="4249270" y="3609975"/>
+                </a:lnTo>
+                <a:lnTo>
+                  <a:pt x="4234153" y="3656012"/>
+                </a:lnTo>
+                <a:lnTo>
+                  <a:pt x="4217357" y="3697287"/>
+                </a:lnTo>
+                <a:lnTo>
+                  <a:pt x="4197202" y="3736975"/>
+                </a:lnTo>
+                <a:lnTo>
+                  <a:pt x="4156892" y="3811587"/>
+                </a:lnTo>
+                <a:lnTo>
+                  <a:pt x="4138416" y="3848100"/>
+                </a:lnTo>
+                <a:lnTo>
+                  <a:pt x="4119940" y="3890962"/>
+                </a:lnTo>
+                <a:lnTo>
+                  <a:pt x="4104825" y="3935412"/>
+                </a:lnTo>
+                <a:lnTo>
+                  <a:pt x="4094747" y="3987800"/>
+                </a:lnTo>
+                <a:lnTo>
+                  <a:pt x="4084669" y="4048125"/>
+                </a:lnTo>
+                <a:lnTo>
+                  <a:pt x="4082989" y="4116387"/>
+                </a:lnTo>
+                <a:lnTo>
+                  <a:pt x="4084669" y="4186237"/>
+                </a:lnTo>
+                <a:lnTo>
+                  <a:pt x="4094747" y="4244975"/>
+                </a:lnTo>
+                <a:lnTo>
+                  <a:pt x="4104825" y="4297362"/>
+                </a:lnTo>
+                <a:lnTo>
+                  <a:pt x="4119940" y="4343400"/>
+                </a:lnTo>
+                <a:lnTo>
+                  <a:pt x="4138416" y="4386262"/>
+                </a:lnTo>
+                <a:lnTo>
+                  <a:pt x="4156892" y="4424362"/>
+                </a:lnTo>
+                <a:lnTo>
+                  <a:pt x="4197202" y="4498975"/>
+                </a:lnTo>
+                <a:lnTo>
+                  <a:pt x="4217357" y="4537075"/>
+                </a:lnTo>
+                <a:lnTo>
+                  <a:pt x="4234153" y="4579937"/>
+                </a:lnTo>
+                <a:lnTo>
+                  <a:pt x="4249270" y="4625975"/>
+                </a:lnTo>
+                <a:lnTo>
+                  <a:pt x="4261027" y="4678362"/>
+                </a:lnTo>
+                <a:lnTo>
+                  <a:pt x="4269425" y="4738687"/>
+                </a:lnTo>
+                <a:lnTo>
+                  <a:pt x="4272784" y="4806950"/>
+                </a:lnTo>
+                <a:lnTo>
+                  <a:pt x="4269425" y="4875212"/>
+                </a:lnTo>
+                <a:lnTo>
+                  <a:pt x="4261027" y="4935537"/>
+                </a:lnTo>
+                <a:lnTo>
+                  <a:pt x="4249270" y="4987925"/>
+                </a:lnTo>
+                <a:lnTo>
+                  <a:pt x="4234153" y="5033962"/>
+                </a:lnTo>
+                <a:lnTo>
+                  <a:pt x="4217357" y="5075237"/>
+                </a:lnTo>
+                <a:lnTo>
+                  <a:pt x="4197202" y="5114925"/>
+                </a:lnTo>
+                <a:lnTo>
+                  <a:pt x="4177047" y="5149850"/>
+                </a:lnTo>
+                <a:lnTo>
+                  <a:pt x="4156892" y="5186362"/>
+                </a:lnTo>
+                <a:lnTo>
+                  <a:pt x="4138416" y="5226050"/>
+                </a:lnTo>
+                <a:lnTo>
+                  <a:pt x="4119940" y="5268912"/>
+                </a:lnTo>
+                <a:lnTo>
+                  <a:pt x="4104825" y="5313362"/>
+                </a:lnTo>
+                <a:lnTo>
+                  <a:pt x="4094747" y="5365750"/>
+                </a:lnTo>
+                <a:lnTo>
+                  <a:pt x="4084669" y="5426075"/>
+                </a:lnTo>
+                <a:lnTo>
+                  <a:pt x="4082989" y="5494337"/>
+                </a:lnTo>
+                <a:lnTo>
+                  <a:pt x="4084669" y="5562600"/>
+                </a:lnTo>
+                <a:lnTo>
+                  <a:pt x="4094747" y="5622925"/>
+                </a:lnTo>
+                <a:lnTo>
+                  <a:pt x="4104825" y="5675312"/>
+                </a:lnTo>
+                <a:lnTo>
+                  <a:pt x="4119940" y="5721350"/>
+                </a:lnTo>
+                <a:lnTo>
+                  <a:pt x="4138416" y="5762625"/>
+                </a:lnTo>
+                <a:lnTo>
+                  <a:pt x="4156892" y="5802312"/>
+                </a:lnTo>
+                <a:lnTo>
+                  <a:pt x="4177047" y="5840412"/>
+                </a:lnTo>
+                <a:lnTo>
+                  <a:pt x="4197202" y="5876925"/>
+                </a:lnTo>
+                <a:lnTo>
+                  <a:pt x="4217357" y="5915025"/>
+                </a:lnTo>
+                <a:lnTo>
+                  <a:pt x="4234153" y="5956300"/>
+                </a:lnTo>
+                <a:lnTo>
+                  <a:pt x="4249270" y="6003925"/>
+                </a:lnTo>
+                <a:lnTo>
+                  <a:pt x="4261027" y="6056312"/>
+                </a:lnTo>
+                <a:lnTo>
+                  <a:pt x="4269425" y="6113462"/>
+                </a:lnTo>
+                <a:lnTo>
+                  <a:pt x="4272784" y="6183312"/>
+                </a:lnTo>
+                <a:lnTo>
+                  <a:pt x="4269425" y="6251575"/>
+                </a:lnTo>
+                <a:lnTo>
+                  <a:pt x="4261027" y="6311900"/>
+                </a:lnTo>
+                <a:lnTo>
+                  <a:pt x="4249270" y="6361112"/>
+                </a:lnTo>
+                <a:lnTo>
+                  <a:pt x="4234153" y="6407150"/>
+                </a:lnTo>
+                <a:lnTo>
+                  <a:pt x="4217357" y="6448425"/>
+                </a:lnTo>
+                <a:lnTo>
+                  <a:pt x="4198882" y="6488112"/>
+                </a:lnTo>
+                <a:lnTo>
+                  <a:pt x="4180406" y="6523037"/>
+                </a:lnTo>
+                <a:lnTo>
+                  <a:pt x="4160251" y="6561137"/>
+                </a:lnTo>
+                <a:lnTo>
+                  <a:pt x="4140096" y="6597650"/>
+                </a:lnTo>
+                <a:lnTo>
+                  <a:pt x="4123300" y="6640512"/>
+                </a:lnTo>
+                <a:lnTo>
+                  <a:pt x="4106504" y="6683375"/>
+                </a:lnTo>
+                <a:lnTo>
+                  <a:pt x="4096426" y="6735762"/>
+                </a:lnTo>
+                <a:lnTo>
+                  <a:pt x="4088029" y="6791325"/>
+                </a:lnTo>
+                <a:lnTo>
+                  <a:pt x="4082989" y="6858000"/>
+                </a:lnTo>
+                <a:lnTo>
+                  <a:pt x="0" y="6858000"/>
+                </a:lnTo>
+                <a:close/>
+              </a:path>
+            </a:pathLst>
+          </a:custGeom>
+          <a:ln w="0">
+            <a:noFill/>
+            <a:prstDash val="solid"/>
+            <a:round/>
+            <a:headEnd/>
+            <a:tailEnd/>
+          </a:ln>
+        </p:spPr>
+        <p:txBody>
+          <a:bodyPr/>
+          <a:lstStyle/>
+          <a:p>
+            <a:endParaRPr lang="en-US" dirty="0"/>
+          </a:p>
+        </p:txBody>
+      </p:sp>
+      <p:sp>
+        <p:nvSpPr>
+          <p:cNvPr id="48" name="Freeform: Shape 47">
+            <a:extLst>
+              <a:ext uri="{FF2B5EF4-FFF2-40B4-BE49-F238E27FC236}">
+                <a16:creationId xmlns:a16="http://schemas.microsoft.com/office/drawing/2014/main" id="{909E572F-9CDC-4214-9D42-FF0017649590}"/>
+              </a:ext>
+              <a:ext uri="{C183D7F6-B498-43B3-948B-1728B52AA6E4}">
+                <adec:decorative xmlns:adec="http://schemas.microsoft.com/office/drawing/2017/decorative" val="1"/>
+              </a:ext>
+            </a:extLst>
+          </p:cNvPr>
+          <p:cNvSpPr>
+            <a:spLocks noGrp="1" noRot="1" noChangeAspect="1" noMove="1" noResize="1" noEditPoints="1" noAdjustHandles="1" noChangeArrowheads="1" noChangeShapeType="1" noTextEdit="1"/>
+          </p:cNvSpPr>
+          <p:nvPr>
+            <p:extLst>
+              <p:ext uri="{386F3935-93C4-4BCD-93E2-E3B085C9AB24}">
+                <p16:designElem xmlns:p16="http://schemas.microsoft.com/office/powerpoint/2015/main" val="1"/>
+              </p:ext>
+            </p:extLst>
+          </p:nvPr>
+        </p:nvSpPr>
+        <p:spPr>
+          <a:xfrm flipH="1">
+            <a:off x="0" y="0"/>
+            <a:ext cx="4417162" cy="6858000"/>
+          </a:xfrm>
+          <a:custGeom>
+            <a:avLst/>
+            <a:gdLst>
+              <a:gd name="connsiteX0" fmla="*/ 4417162 w 4417162"/>
+              <a:gd name="connsiteY0" fmla="*/ 0 h 6858000"/>
+              <a:gd name="connsiteX1" fmla="*/ 334174 w 4417162"/>
+              <a:gd name="connsiteY1" fmla="*/ 0 h 6858000"/>
+              <a:gd name="connsiteX2" fmla="*/ 334173 w 4417162"/>
+              <a:gd name="connsiteY2" fmla="*/ 0 h 6858000"/>
+              <a:gd name="connsiteX3" fmla="*/ 189795 w 4417162"/>
+              <a:gd name="connsiteY3" fmla="*/ 0 h 6858000"/>
+              <a:gd name="connsiteX4" fmla="*/ 184756 w 4417162"/>
+              <a:gd name="connsiteY4" fmla="*/ 66675 h 6858000"/>
+              <a:gd name="connsiteX5" fmla="*/ 176358 w 4417162"/>
+              <a:gd name="connsiteY5" fmla="*/ 122237 h 6858000"/>
+              <a:gd name="connsiteX6" fmla="*/ 166281 w 4417162"/>
+              <a:gd name="connsiteY6" fmla="*/ 174625 h 6858000"/>
+              <a:gd name="connsiteX7" fmla="*/ 149485 w 4417162"/>
+              <a:gd name="connsiteY7" fmla="*/ 217487 h 6858000"/>
+              <a:gd name="connsiteX8" fmla="*/ 132689 w 4417162"/>
+              <a:gd name="connsiteY8" fmla="*/ 260350 h 6858000"/>
+              <a:gd name="connsiteX9" fmla="*/ 112534 w 4417162"/>
+              <a:gd name="connsiteY9" fmla="*/ 296862 h 6858000"/>
+              <a:gd name="connsiteX10" fmla="*/ 92379 w 4417162"/>
+              <a:gd name="connsiteY10" fmla="*/ 334962 h 6858000"/>
+              <a:gd name="connsiteX11" fmla="*/ 73903 w 4417162"/>
+              <a:gd name="connsiteY11" fmla="*/ 369887 h 6858000"/>
+              <a:gd name="connsiteX12" fmla="*/ 55427 w 4417162"/>
+              <a:gd name="connsiteY12" fmla="*/ 409575 h 6858000"/>
+              <a:gd name="connsiteX13" fmla="*/ 38632 w 4417162"/>
+              <a:gd name="connsiteY13" fmla="*/ 450850 h 6858000"/>
+              <a:gd name="connsiteX14" fmla="*/ 23515 w 4417162"/>
+              <a:gd name="connsiteY14" fmla="*/ 496887 h 6858000"/>
+              <a:gd name="connsiteX15" fmla="*/ 11758 w 4417162"/>
+              <a:gd name="connsiteY15" fmla="*/ 546100 h 6858000"/>
+              <a:gd name="connsiteX16" fmla="*/ 3359 w 4417162"/>
+              <a:gd name="connsiteY16" fmla="*/ 606425 h 6858000"/>
+              <a:gd name="connsiteX17" fmla="*/ 0 w 4417162"/>
+              <a:gd name="connsiteY17" fmla="*/ 673100 h 6858000"/>
+              <a:gd name="connsiteX18" fmla="*/ 3359 w 4417162"/>
+              <a:gd name="connsiteY18" fmla="*/ 744537 h 6858000"/>
+              <a:gd name="connsiteX19" fmla="*/ 11758 w 4417162"/>
+              <a:gd name="connsiteY19" fmla="*/ 801687 h 6858000"/>
+              <a:gd name="connsiteX20" fmla="*/ 23515 w 4417162"/>
+              <a:gd name="connsiteY20" fmla="*/ 854075 h 6858000"/>
+              <a:gd name="connsiteX21" fmla="*/ 38632 w 4417162"/>
+              <a:gd name="connsiteY21" fmla="*/ 901700 h 6858000"/>
+              <a:gd name="connsiteX22" fmla="*/ 55427 w 4417162"/>
+              <a:gd name="connsiteY22" fmla="*/ 942975 h 6858000"/>
+              <a:gd name="connsiteX23" fmla="*/ 75583 w 4417162"/>
+              <a:gd name="connsiteY23" fmla="*/ 981075 h 6858000"/>
+              <a:gd name="connsiteX24" fmla="*/ 95738 w 4417162"/>
+              <a:gd name="connsiteY24" fmla="*/ 1017587 h 6858000"/>
+              <a:gd name="connsiteX25" fmla="*/ 115893 w 4417162"/>
+              <a:gd name="connsiteY25" fmla="*/ 1055687 h 6858000"/>
+              <a:gd name="connsiteX26" fmla="*/ 134368 w 4417162"/>
+              <a:gd name="connsiteY26" fmla="*/ 1095375 h 6858000"/>
+              <a:gd name="connsiteX27" fmla="*/ 152844 w 4417162"/>
+              <a:gd name="connsiteY27" fmla="*/ 1136650 h 6858000"/>
+              <a:gd name="connsiteX28" fmla="*/ 167960 w 4417162"/>
+              <a:gd name="connsiteY28" fmla="*/ 1182687 h 6858000"/>
+              <a:gd name="connsiteX29" fmla="*/ 178038 w 4417162"/>
+              <a:gd name="connsiteY29" fmla="*/ 1235075 h 6858000"/>
+              <a:gd name="connsiteX30" fmla="*/ 188115 w 4417162"/>
+              <a:gd name="connsiteY30" fmla="*/ 1295400 h 6858000"/>
+              <a:gd name="connsiteX31" fmla="*/ 189795 w 4417162"/>
+              <a:gd name="connsiteY31" fmla="*/ 1363662 h 6858000"/>
+              <a:gd name="connsiteX32" fmla="*/ 188115 w 4417162"/>
+              <a:gd name="connsiteY32" fmla="*/ 1431925 h 6858000"/>
+              <a:gd name="connsiteX33" fmla="*/ 178038 w 4417162"/>
+              <a:gd name="connsiteY33" fmla="*/ 1492250 h 6858000"/>
+              <a:gd name="connsiteX34" fmla="*/ 167960 w 4417162"/>
+              <a:gd name="connsiteY34" fmla="*/ 1544637 h 6858000"/>
+              <a:gd name="connsiteX35" fmla="*/ 152844 w 4417162"/>
+              <a:gd name="connsiteY35" fmla="*/ 1589087 h 6858000"/>
+              <a:gd name="connsiteX36" fmla="*/ 134368 w 4417162"/>
+              <a:gd name="connsiteY36" fmla="*/ 1631950 h 6858000"/>
+              <a:gd name="connsiteX37" fmla="*/ 115893 w 4417162"/>
+              <a:gd name="connsiteY37" fmla="*/ 1671637 h 6858000"/>
+              <a:gd name="connsiteX38" fmla="*/ 95738 w 4417162"/>
+              <a:gd name="connsiteY38" fmla="*/ 1708150 h 6858000"/>
+              <a:gd name="connsiteX39" fmla="*/ 75583 w 4417162"/>
+              <a:gd name="connsiteY39" fmla="*/ 1743075 h 6858000"/>
+              <a:gd name="connsiteX40" fmla="*/ 55427 w 4417162"/>
+              <a:gd name="connsiteY40" fmla="*/ 1782762 h 6858000"/>
+              <a:gd name="connsiteX41" fmla="*/ 38632 w 4417162"/>
+              <a:gd name="connsiteY41" fmla="*/ 1824037 h 6858000"/>
+              <a:gd name="connsiteX42" fmla="*/ 23515 w 4417162"/>
+              <a:gd name="connsiteY42" fmla="*/ 1870075 h 6858000"/>
+              <a:gd name="connsiteX43" fmla="*/ 11758 w 4417162"/>
+              <a:gd name="connsiteY43" fmla="*/ 1922462 h 6858000"/>
+              <a:gd name="connsiteX44" fmla="*/ 3359 w 4417162"/>
+              <a:gd name="connsiteY44" fmla="*/ 1982787 h 6858000"/>
+              <a:gd name="connsiteX45" fmla="*/ 0 w 4417162"/>
+              <a:gd name="connsiteY45" fmla="*/ 2051050 h 6858000"/>
+              <a:gd name="connsiteX46" fmla="*/ 3359 w 4417162"/>
+              <a:gd name="connsiteY46" fmla="*/ 2119312 h 6858000"/>
+              <a:gd name="connsiteX47" fmla="*/ 11758 w 4417162"/>
+              <a:gd name="connsiteY47" fmla="*/ 2179637 h 6858000"/>
+              <a:gd name="connsiteX48" fmla="*/ 23515 w 4417162"/>
+              <a:gd name="connsiteY48" fmla="*/ 2232025 h 6858000"/>
+              <a:gd name="connsiteX49" fmla="*/ 38632 w 4417162"/>
+              <a:gd name="connsiteY49" fmla="*/ 2278062 h 6858000"/>
+              <a:gd name="connsiteX50" fmla="*/ 55427 w 4417162"/>
+              <a:gd name="connsiteY50" fmla="*/ 2319337 h 6858000"/>
+              <a:gd name="connsiteX51" fmla="*/ 75583 w 4417162"/>
+              <a:gd name="connsiteY51" fmla="*/ 2359025 h 6858000"/>
+              <a:gd name="connsiteX52" fmla="*/ 95738 w 4417162"/>
+              <a:gd name="connsiteY52" fmla="*/ 2395537 h 6858000"/>
+              <a:gd name="connsiteX53" fmla="*/ 115893 w 4417162"/>
+              <a:gd name="connsiteY53" fmla="*/ 2433637 h 6858000"/>
+              <a:gd name="connsiteX54" fmla="*/ 134368 w 4417162"/>
+              <a:gd name="connsiteY54" fmla="*/ 2471737 h 6858000"/>
+              <a:gd name="connsiteX55" fmla="*/ 152844 w 4417162"/>
+              <a:gd name="connsiteY55" fmla="*/ 2513012 h 6858000"/>
+              <a:gd name="connsiteX56" fmla="*/ 167960 w 4417162"/>
+              <a:gd name="connsiteY56" fmla="*/ 2560637 h 6858000"/>
+              <a:gd name="connsiteX57" fmla="*/ 178038 w 4417162"/>
+              <a:gd name="connsiteY57" fmla="*/ 2613025 h 6858000"/>
+              <a:gd name="connsiteX58" fmla="*/ 188115 w 4417162"/>
+              <a:gd name="connsiteY58" fmla="*/ 2671762 h 6858000"/>
+              <a:gd name="connsiteX59" fmla="*/ 189795 w 4417162"/>
+              <a:gd name="connsiteY59" fmla="*/ 2741612 h 6858000"/>
+              <a:gd name="connsiteX60" fmla="*/ 188115 w 4417162"/>
+              <a:gd name="connsiteY60" fmla="*/ 2809875 h 6858000"/>
+              <a:gd name="connsiteX61" fmla="*/ 178038 w 4417162"/>
+              <a:gd name="connsiteY61" fmla="*/ 2868612 h 6858000"/>
+              <a:gd name="connsiteX62" fmla="*/ 167960 w 4417162"/>
+              <a:gd name="connsiteY62" fmla="*/ 2922587 h 6858000"/>
+              <a:gd name="connsiteX63" fmla="*/ 152844 w 4417162"/>
+              <a:gd name="connsiteY63" fmla="*/ 2967037 h 6858000"/>
+              <a:gd name="connsiteX64" fmla="*/ 134368 w 4417162"/>
+              <a:gd name="connsiteY64" fmla="*/ 3009900 h 6858000"/>
+              <a:gd name="connsiteX65" fmla="*/ 115893 w 4417162"/>
+              <a:gd name="connsiteY65" fmla="*/ 3046412 h 6858000"/>
+              <a:gd name="connsiteX66" fmla="*/ 95738 w 4417162"/>
+              <a:gd name="connsiteY66" fmla="*/ 3084512 h 6858000"/>
+              <a:gd name="connsiteX67" fmla="*/ 75583 w 4417162"/>
+              <a:gd name="connsiteY67" fmla="*/ 3121025 h 6858000"/>
+              <a:gd name="connsiteX68" fmla="*/ 55427 w 4417162"/>
+              <a:gd name="connsiteY68" fmla="*/ 3160712 h 6858000"/>
+              <a:gd name="connsiteX69" fmla="*/ 38632 w 4417162"/>
+              <a:gd name="connsiteY69" fmla="*/ 3201987 h 6858000"/>
+              <a:gd name="connsiteX70" fmla="*/ 23515 w 4417162"/>
+              <a:gd name="connsiteY70" fmla="*/ 3248025 h 6858000"/>
+              <a:gd name="connsiteX71" fmla="*/ 11758 w 4417162"/>
+              <a:gd name="connsiteY71" fmla="*/ 3300412 h 6858000"/>
+              <a:gd name="connsiteX72" fmla="*/ 3359 w 4417162"/>
+              <a:gd name="connsiteY72" fmla="*/ 3360737 h 6858000"/>
+              <a:gd name="connsiteX73" fmla="*/ 0 w 4417162"/>
+              <a:gd name="connsiteY73" fmla="*/ 3427412 h 6858000"/>
+              <a:gd name="connsiteX74" fmla="*/ 3359 w 4417162"/>
+              <a:gd name="connsiteY74" fmla="*/ 3497262 h 6858000"/>
+              <a:gd name="connsiteX75" fmla="*/ 11758 w 4417162"/>
+              <a:gd name="connsiteY75" fmla="*/ 3557587 h 6858000"/>
+              <a:gd name="connsiteX76" fmla="*/ 23515 w 4417162"/>
+              <a:gd name="connsiteY76" fmla="*/ 3609975 h 6858000"/>
+              <a:gd name="connsiteX77" fmla="*/ 38632 w 4417162"/>
+              <a:gd name="connsiteY77" fmla="*/ 3656012 h 6858000"/>
+              <a:gd name="connsiteX78" fmla="*/ 55427 w 4417162"/>
+              <a:gd name="connsiteY78" fmla="*/ 3697287 h 6858000"/>
+              <a:gd name="connsiteX79" fmla="*/ 75583 w 4417162"/>
+              <a:gd name="connsiteY79" fmla="*/ 3736975 h 6858000"/>
+              <a:gd name="connsiteX80" fmla="*/ 115893 w 4417162"/>
+              <a:gd name="connsiteY80" fmla="*/ 3811587 h 6858000"/>
+              <a:gd name="connsiteX81" fmla="*/ 134368 w 4417162"/>
+              <a:gd name="connsiteY81" fmla="*/ 3848100 h 6858000"/>
+              <a:gd name="connsiteX82" fmla="*/ 152844 w 4417162"/>
+              <a:gd name="connsiteY82" fmla="*/ 3890962 h 6858000"/>
+              <a:gd name="connsiteX83" fmla="*/ 167960 w 4417162"/>
+              <a:gd name="connsiteY83" fmla="*/ 3935412 h 6858000"/>
+              <a:gd name="connsiteX84" fmla="*/ 178038 w 4417162"/>
+              <a:gd name="connsiteY84" fmla="*/ 3987800 h 6858000"/>
+              <a:gd name="connsiteX85" fmla="*/ 188115 w 4417162"/>
+              <a:gd name="connsiteY85" fmla="*/ 4048125 h 6858000"/>
+              <a:gd name="connsiteX86" fmla="*/ 189795 w 4417162"/>
+              <a:gd name="connsiteY86" fmla="*/ 4116387 h 6858000"/>
+              <a:gd name="connsiteX87" fmla="*/ 188115 w 4417162"/>
+              <a:gd name="connsiteY87" fmla="*/ 4186237 h 6858000"/>
+              <a:gd name="connsiteX88" fmla="*/ 178038 w 4417162"/>
+              <a:gd name="connsiteY88" fmla="*/ 4244975 h 6858000"/>
+              <a:gd name="connsiteX89" fmla="*/ 167960 w 4417162"/>
+              <a:gd name="connsiteY89" fmla="*/ 4297362 h 6858000"/>
+              <a:gd name="connsiteX90" fmla="*/ 152844 w 4417162"/>
+              <a:gd name="connsiteY90" fmla="*/ 4343400 h 6858000"/>
+              <a:gd name="connsiteX91" fmla="*/ 134368 w 4417162"/>
+              <a:gd name="connsiteY91" fmla="*/ 4386262 h 6858000"/>
+              <a:gd name="connsiteX92" fmla="*/ 115893 w 4417162"/>
+              <a:gd name="connsiteY92" fmla="*/ 4424362 h 6858000"/>
+              <a:gd name="connsiteX93" fmla="*/ 75583 w 4417162"/>
+              <a:gd name="connsiteY93" fmla="*/ 4498975 h 6858000"/>
+              <a:gd name="connsiteX94" fmla="*/ 55427 w 4417162"/>
+              <a:gd name="connsiteY94" fmla="*/ 4537075 h 6858000"/>
+              <a:gd name="connsiteX95" fmla="*/ 38632 w 4417162"/>
+              <a:gd name="connsiteY95" fmla="*/ 4579937 h 6858000"/>
+              <a:gd name="connsiteX96" fmla="*/ 23515 w 4417162"/>
+              <a:gd name="connsiteY96" fmla="*/ 4625975 h 6858000"/>
+              <a:gd name="connsiteX97" fmla="*/ 11758 w 4417162"/>
+              <a:gd name="connsiteY97" fmla="*/ 4678362 h 6858000"/>
+              <a:gd name="connsiteX98" fmla="*/ 3359 w 4417162"/>
+              <a:gd name="connsiteY98" fmla="*/ 4738687 h 6858000"/>
+              <a:gd name="connsiteX99" fmla="*/ 0 w 4417162"/>
+              <a:gd name="connsiteY99" fmla="*/ 4806950 h 6858000"/>
+              <a:gd name="connsiteX100" fmla="*/ 3359 w 4417162"/>
+              <a:gd name="connsiteY100" fmla="*/ 4875212 h 6858000"/>
+              <a:gd name="connsiteX101" fmla="*/ 11758 w 4417162"/>
+              <a:gd name="connsiteY101" fmla="*/ 4935537 h 6858000"/>
+              <a:gd name="connsiteX102" fmla="*/ 23515 w 4417162"/>
+              <a:gd name="connsiteY102" fmla="*/ 4987925 h 6858000"/>
+              <a:gd name="connsiteX103" fmla="*/ 38632 w 4417162"/>
+              <a:gd name="connsiteY103" fmla="*/ 5033962 h 6858000"/>
+              <a:gd name="connsiteX104" fmla="*/ 55427 w 4417162"/>
+              <a:gd name="connsiteY104" fmla="*/ 5075237 h 6858000"/>
+              <a:gd name="connsiteX105" fmla="*/ 75583 w 4417162"/>
+              <a:gd name="connsiteY105" fmla="*/ 5114925 h 6858000"/>
+              <a:gd name="connsiteX106" fmla="*/ 95738 w 4417162"/>
+              <a:gd name="connsiteY106" fmla="*/ 5149850 h 6858000"/>
+              <a:gd name="connsiteX107" fmla="*/ 115893 w 4417162"/>
+              <a:gd name="connsiteY107" fmla="*/ 5186362 h 6858000"/>
+              <a:gd name="connsiteX108" fmla="*/ 134368 w 4417162"/>
+              <a:gd name="connsiteY108" fmla="*/ 5226050 h 6858000"/>
+              <a:gd name="connsiteX109" fmla="*/ 152844 w 4417162"/>
+              <a:gd name="connsiteY109" fmla="*/ 5268912 h 6858000"/>
+              <a:gd name="connsiteX110" fmla="*/ 167960 w 4417162"/>
+              <a:gd name="connsiteY110" fmla="*/ 5313362 h 6858000"/>
+              <a:gd name="connsiteX111" fmla="*/ 178038 w 4417162"/>
+              <a:gd name="connsiteY111" fmla="*/ 5365750 h 6858000"/>
+              <a:gd name="connsiteX112" fmla="*/ 188115 w 4417162"/>
+              <a:gd name="connsiteY112" fmla="*/ 5426075 h 6858000"/>
+              <a:gd name="connsiteX113" fmla="*/ 189795 w 4417162"/>
+              <a:gd name="connsiteY113" fmla="*/ 5494337 h 6858000"/>
+              <a:gd name="connsiteX114" fmla="*/ 188115 w 4417162"/>
+              <a:gd name="connsiteY114" fmla="*/ 5562600 h 6858000"/>
+              <a:gd name="connsiteX115" fmla="*/ 178038 w 4417162"/>
+              <a:gd name="connsiteY115" fmla="*/ 5622925 h 6858000"/>
+              <a:gd name="connsiteX116" fmla="*/ 167960 w 4417162"/>
+              <a:gd name="connsiteY116" fmla="*/ 5675312 h 6858000"/>
+              <a:gd name="connsiteX117" fmla="*/ 152844 w 4417162"/>
+              <a:gd name="connsiteY117" fmla="*/ 5721350 h 6858000"/>
+              <a:gd name="connsiteX118" fmla="*/ 134368 w 4417162"/>
+              <a:gd name="connsiteY118" fmla="*/ 5762625 h 6858000"/>
+              <a:gd name="connsiteX119" fmla="*/ 115893 w 4417162"/>
+              <a:gd name="connsiteY119" fmla="*/ 5802312 h 6858000"/>
+              <a:gd name="connsiteX120" fmla="*/ 95738 w 4417162"/>
+              <a:gd name="connsiteY120" fmla="*/ 5840412 h 6858000"/>
+              <a:gd name="connsiteX121" fmla="*/ 75583 w 4417162"/>
+              <a:gd name="connsiteY121" fmla="*/ 5876925 h 6858000"/>
+              <a:gd name="connsiteX122" fmla="*/ 55427 w 4417162"/>
+              <a:gd name="connsiteY122" fmla="*/ 5915025 h 6858000"/>
+              <a:gd name="connsiteX123" fmla="*/ 38632 w 4417162"/>
+              <a:gd name="connsiteY123" fmla="*/ 5956300 h 6858000"/>
+              <a:gd name="connsiteX124" fmla="*/ 23515 w 4417162"/>
+              <a:gd name="connsiteY124" fmla="*/ 6003925 h 6858000"/>
+              <a:gd name="connsiteX125" fmla="*/ 11758 w 4417162"/>
+              <a:gd name="connsiteY125" fmla="*/ 6056312 h 6858000"/>
+              <a:gd name="connsiteX126" fmla="*/ 3359 w 4417162"/>
+              <a:gd name="connsiteY126" fmla="*/ 6113462 h 6858000"/>
+              <a:gd name="connsiteX127" fmla="*/ 0 w 4417162"/>
+              <a:gd name="connsiteY127" fmla="*/ 6183312 h 6858000"/>
+              <a:gd name="connsiteX128" fmla="*/ 3359 w 4417162"/>
+              <a:gd name="connsiteY128" fmla="*/ 6251575 h 6858000"/>
+              <a:gd name="connsiteX129" fmla="*/ 11758 w 4417162"/>
+              <a:gd name="connsiteY129" fmla="*/ 6311900 h 6858000"/>
+              <a:gd name="connsiteX130" fmla="*/ 23515 w 4417162"/>
+              <a:gd name="connsiteY130" fmla="*/ 6361112 h 6858000"/>
+              <a:gd name="connsiteX131" fmla="*/ 38632 w 4417162"/>
+              <a:gd name="connsiteY131" fmla="*/ 6407150 h 6858000"/>
+              <a:gd name="connsiteX132" fmla="*/ 55427 w 4417162"/>
+              <a:gd name="connsiteY132" fmla="*/ 6448425 h 6858000"/>
+              <a:gd name="connsiteX133" fmla="*/ 73903 w 4417162"/>
+              <a:gd name="connsiteY133" fmla="*/ 6488112 h 6858000"/>
+              <a:gd name="connsiteX134" fmla="*/ 92379 w 4417162"/>
+              <a:gd name="connsiteY134" fmla="*/ 6523037 h 6858000"/>
+              <a:gd name="connsiteX135" fmla="*/ 112534 w 4417162"/>
+              <a:gd name="connsiteY135" fmla="*/ 6561137 h 6858000"/>
+              <a:gd name="connsiteX136" fmla="*/ 132689 w 4417162"/>
+              <a:gd name="connsiteY136" fmla="*/ 6597650 h 6858000"/>
+              <a:gd name="connsiteX137" fmla="*/ 149485 w 4417162"/>
+              <a:gd name="connsiteY137" fmla="*/ 6640512 h 6858000"/>
+              <a:gd name="connsiteX138" fmla="*/ 166281 w 4417162"/>
+              <a:gd name="connsiteY138" fmla="*/ 6683375 h 6858000"/>
+              <a:gd name="connsiteX139" fmla="*/ 176358 w 4417162"/>
+              <a:gd name="connsiteY139" fmla="*/ 6735762 h 6858000"/>
+              <a:gd name="connsiteX140" fmla="*/ 184756 w 4417162"/>
+              <a:gd name="connsiteY140" fmla="*/ 6791325 h 6858000"/>
+              <a:gd name="connsiteX141" fmla="*/ 189795 w 4417162"/>
+              <a:gd name="connsiteY141" fmla="*/ 6858000 h 6858000"/>
+              <a:gd name="connsiteX142" fmla="*/ 334173 w 4417162"/>
+              <a:gd name="connsiteY142" fmla="*/ 6858000 h 6858000"/>
+              <a:gd name="connsiteX143" fmla="*/ 334174 w 4417162"/>
+              <a:gd name="connsiteY143" fmla="*/ 6858000 h 6858000"/>
+              <a:gd name="connsiteX144" fmla="*/ 4417162 w 4417162"/>
+              <a:gd name="connsiteY144" fmla="*/ 6858000 h 6858000"/>
+            </a:gdLst>
+            <a:ahLst/>
+            <a:cxnLst>
+              <a:cxn ang="0">
+                <a:pos x="connsiteX0" y="connsiteY0"/>
+              </a:cxn>
+              <a:cxn ang="0">
+                <a:pos x="connsiteX1" y="connsiteY1"/>
+              </a:cxn>
+              <a:cxn ang="0">
+                <a:pos x="connsiteX2" y="connsiteY2"/>
+              </a:cxn>
+              <a:cxn ang="0">
+                <a:pos x="connsiteX3" y="connsiteY3"/>
+              </a:cxn>
+              <a:cxn ang="0">
+                <a:pos x="connsiteX4" y="connsiteY4"/>
+              </a:cxn>
+              <a:cxn ang="0">
+                <a:pos x="connsiteX5" y="connsiteY5"/>
+              </a:cxn>
+              <a:cxn ang="0">
+                <a:pos x="connsiteX6" y="connsiteY6"/>
+              </a:cxn>
+              <a:cxn ang="0">
+                <a:pos x="connsiteX7" y="connsiteY7"/>
+              </a:cxn>
+              <a:cxn ang="0">
+                <a:pos x="connsiteX8" y="connsiteY8"/>
+              </a:cxn>
+              <a:cxn ang="0">
+                <a:pos x="connsiteX9" y="connsiteY9"/>
+              </a:cxn>
+              <a:cxn ang="0">
+                <a:pos x="connsiteX10" y="connsiteY10"/>
+              </a:cxn>
+              <a:cxn ang="0">
+                <a:pos x="connsiteX11" y="connsiteY11"/>
+              </a:cxn>
+              <a:cxn ang="0">
+                <a:pos x="connsiteX12" y="connsiteY12"/>
+              </a:cxn>
+              <a:cxn ang="0">
+                <a:pos x="connsiteX13" y="connsiteY13"/>
+              </a:cxn>
+              <a:cxn ang="0">
+                <a:pos x="connsiteX14" y="connsiteY14"/>
+              </a:cxn>
+              <a:cxn ang="0">
+                <a:pos x="connsiteX15" y="connsiteY15"/>
+              </a:cxn>
+              <a:cxn ang="0">
+                <a:pos x="connsiteX16" y="connsiteY16"/>
+              </a:cxn>
+              <a:cxn ang="0">
+                <a:pos x="connsiteX17" y="connsiteY17"/>
+              </a:cxn>
+              <a:cxn ang="0">
+                <a:pos x="connsiteX18" y="connsiteY18"/>
+              </a:cxn>
+              <a:cxn ang="0">
+                <a:pos x="connsiteX19" y="connsiteY19"/>
+              </a:cxn>
+              <a:cxn ang="0">
+                <a:pos x="connsiteX20" y="connsiteY20"/>
+              </a:cxn>
+              <a:cxn ang="0">
+                <a:pos x="connsiteX21" y="connsiteY21"/>
+              </a:cxn>
+              <a:cxn ang="0">
+                <a:pos x="connsiteX22" y="connsiteY22"/>
+              </a:cxn>
+              <a:cxn ang="0">
+                <a:pos x="connsiteX23" y="connsiteY23"/>
+              </a:cxn>
+              <a:cxn ang="0">
+                <a:pos x="connsiteX24" y="connsiteY24"/>
+              </a:cxn>
+              <a:cxn ang="0">
+                <a:pos x="connsiteX25" y="connsiteY25"/>
+              </a:cxn>
+              <a:cxn ang="0">
+                <a:pos x="connsiteX26" y="connsiteY26"/>
+              </a:cxn>
+              <a:cxn ang="0">
+                <a:pos x="connsiteX27" y="connsiteY27"/>
+              </a:cxn>
+              <a:cxn ang="0">
+                <a:pos x="connsiteX28" y="connsiteY28"/>
+              </a:cxn>
+              <a:cxn ang="0">
+                <a:pos x="connsiteX29" y="connsiteY29"/>
+              </a:cxn>
+              <a:cxn ang="0">
+                <a:pos x="connsiteX30" y="connsiteY30"/>
+              </a:cxn>
+              <a:cxn ang="0">
+                <a:pos x="connsiteX31" y="connsiteY31"/>
+              </a:cxn>
+              <a:cxn ang="0">
+                <a:pos x="connsiteX32" y="connsiteY32"/>
+              </a:cxn>
+              <a:cxn ang="0">
+                <a:pos x="connsiteX33" y="connsiteY33"/>
+              </a:cxn>
+              <a:cxn ang="0">
+                <a:pos x="connsiteX34" y="connsiteY34"/>
+              </a:cxn>
+              <a:cxn ang="0">
+                <a:pos x="connsiteX35" y="connsiteY35"/>
+              </a:cxn>
+              <a:cxn ang="0">
+                <a:pos x="connsiteX36" y="connsiteY36"/>
+              </a:cxn>
+              <a:cxn ang="0">
+                <a:pos x="connsiteX37" y="connsiteY37"/>
+              </a:cxn>
+              <a:cxn ang="0">
+                <a:pos x="connsiteX38" y="connsiteY38"/>
+              </a:cxn>
+              <a:cxn ang="0">
+                <a:pos x="connsiteX39" y="connsiteY39"/>
+              </a:cxn>
+              <a:cxn ang="0">
+                <a:pos x="connsiteX40" y="connsiteY40"/>
+              </a:cxn>
+              <a:cxn ang="0">
+                <a:pos x="connsiteX41" y="connsiteY41"/>
+              </a:cxn>
+              <a:cxn ang="0">
+                <a:pos x="connsiteX42" y="connsiteY42"/>
+              </a:cxn>
+              <a:cxn ang="0">
+                <a:pos x="connsiteX43" y="connsiteY43"/>
+              </a:cxn>
+              <a:cxn ang="0">
+                <a:pos x="connsiteX44" y="connsiteY44"/>
+              </a:cxn>
+              <a:cxn ang="0">
+                <a:pos x="connsiteX45" y="connsiteY45"/>
+              </a:cxn>
+              <a:cxn ang="0">
+                <a:pos x="connsiteX46" y="connsiteY46"/>
+              </a:cxn>
+              <a:cxn ang="0">
+                <a:pos x="connsiteX47" y="connsiteY47"/>
+              </a:cxn>
+              <a:cxn ang="0">
+                <a:pos x="connsiteX48" y="connsiteY48"/>
+              </a:cxn>
+              <a:cxn ang="0">
+                <a:pos x="connsiteX49" y="connsiteY49"/>
+              </a:cxn>
+              <a:cxn ang="0">
+                <a:pos x="connsiteX50" y="connsiteY50"/>
+              </a:cxn>
+              <a:cxn ang="0">
+                <a:pos x="connsiteX51" y="connsiteY51"/>
+              </a:cxn>
+              <a:cxn ang="0">
+                <a:pos x="connsiteX52" y="connsiteY52"/>
+              </a:cxn>
+              <a:cxn ang="0">
+                <a:pos x="connsiteX53" y="connsiteY53"/>
+              </a:cxn>
+              <a:cxn ang="0">
+                <a:pos x="connsiteX54" y="connsiteY54"/>
+              </a:cxn>
+              <a:cxn ang="0">
+                <a:pos x="connsiteX55" y="connsiteY55"/>
+              </a:cxn>
+              <a:cxn ang="0">
+                <a:pos x="connsiteX56" y="connsiteY56"/>
+              </a:cxn>
+              <a:cxn ang="0">
+                <a:pos x="connsiteX57" y="connsiteY57"/>
+              </a:cxn>
+              <a:cxn ang="0">
+                <a:pos x="connsiteX58" y="connsiteY58"/>
+              </a:cxn>
+              <a:cxn ang="0">
+                <a:pos x="connsiteX59" y="connsiteY59"/>
+              </a:cxn>
+              <a:cxn ang="0">
+                <a:pos x="connsiteX60" y="connsiteY60"/>
+              </a:cxn>
+              <a:cxn ang="0">
+                <a:pos x="connsiteX61" y="connsiteY61"/>
+              </a:cxn>
+              <a:cxn ang="0">
+                <a:pos x="connsiteX62" y="connsiteY62"/>
+              </a:cxn>
+              <a:cxn ang="0">
+                <a:pos x="connsiteX63" y="connsiteY63"/>
+              </a:cxn>
+              <a:cxn ang="0">
+                <a:pos x="connsiteX64" y="connsiteY64"/>
+              </a:cxn>
+              <a:cxn ang="0">
+                <a:pos x="connsiteX65" y="connsiteY65"/>
+              </a:cxn>
+              <a:cxn ang="0">
+                <a:pos x="connsiteX66" y="connsiteY66"/>
+              </a:cxn>
+              <a:cxn ang="0">
+                <a:pos x="connsiteX67" y="connsiteY67"/>
+              </a:cxn>
+              <a:cxn ang="0">
+                <a:pos x="connsiteX68" y="connsiteY68"/>
+              </a:cxn>
+              <a:cxn ang="0">
+                <a:pos x="connsiteX69" y="connsiteY69"/>
+              </a:cxn>
+              <a:cxn ang="0">
+                <a:pos x="connsiteX70" y="connsiteY70"/>
+              </a:cxn>
+              <a:cxn ang="0">
+                <a:pos x="connsiteX71" y="connsiteY71"/>
+              </a:cxn>
+              <a:cxn ang="0">
+                <a:pos x="connsiteX72" y="connsiteY72"/>
+              </a:cxn>
+              <a:cxn ang="0">
+                <a:pos x="connsiteX73" y="connsiteY73"/>
+              </a:cxn>
+              <a:cxn ang="0">
+                <a:pos x="connsiteX74" y="connsiteY74"/>
+              </a:cxn>
+              <a:cxn ang="0">
+                <a:pos x="connsiteX75" y="connsiteY75"/>
+              </a:cxn>
+              <a:cxn ang="0">
+                <a:pos x="connsiteX76" y="connsiteY76"/>
+              </a:cxn>
+              <a:cxn ang="0">
+                <a:pos x="connsiteX77" y="connsiteY77"/>
+              </a:cxn>
+              <a:cxn ang="0">
+                <a:pos x="connsiteX78" y="connsiteY78"/>
+              </a:cxn>
+              <a:cxn ang="0">
+                <a:pos x="connsiteX79" y="connsiteY79"/>
+              </a:cxn>
+              <a:cxn ang="0">
+                <a:pos x="connsiteX80" y="connsiteY80"/>
+              </a:cxn>
+              <a:cxn ang="0">
+                <a:pos x="connsiteX81" y="connsiteY81"/>
+              </a:cxn>
+              <a:cxn ang="0">
+                <a:pos x="connsiteX82" y="connsiteY82"/>
+              </a:cxn>
+              <a:cxn ang="0">
+                <a:pos x="connsiteX83" y="connsiteY83"/>
+              </a:cxn>
+              <a:cxn ang="0">
+                <a:pos x="connsiteX84" y="connsiteY84"/>
+              </a:cxn>
+              <a:cxn ang="0">
+                <a:pos x="connsiteX85" y="connsiteY85"/>
+              </a:cxn>
+              <a:cxn ang="0">
+                <a:pos x="connsiteX86" y="connsiteY86"/>
+              </a:cxn>
+              <a:cxn ang="0">
+                <a:pos x="connsiteX87" y="connsiteY87"/>
+              </a:cxn>
+              <a:cxn ang="0">
+                <a:pos x="connsiteX88" y="connsiteY88"/>
+              </a:cxn>
+              <a:cxn ang="0">
+                <a:pos x="connsiteX89" y="connsiteY89"/>
+              </a:cxn>
+              <a:cxn ang="0">
+                <a:pos x="connsiteX90" y="connsiteY90"/>
+              </a:cxn>
+              <a:cxn ang="0">
+                <a:pos x="connsiteX91" y="connsiteY91"/>
+              </a:cxn>
+              <a:cxn ang="0">
+                <a:pos x="connsiteX92" y="connsiteY92"/>
+              </a:cxn>
+              <a:cxn ang="0">
+                <a:pos x="connsiteX93" y="connsiteY93"/>
+              </a:cxn>
+              <a:cxn ang="0">
+                <a:pos x="connsiteX94" y="connsiteY94"/>
+              </a:cxn>
+              <a:cxn ang="0">
+                <a:pos x="connsiteX95" y="connsiteY95"/>
+              </a:cxn>
+              <a:cxn ang="0">
+                <a:pos x="connsiteX96" y="connsiteY96"/>
+              </a:cxn>
+              <a:cxn ang="0">
+                <a:pos x="connsiteX97" y="connsiteY97"/>
+              </a:cxn>
+              <a:cxn ang="0">
+                <a:pos x="connsiteX98" y="connsiteY98"/>
+              </a:cxn>
+              <a:cxn ang="0">
+                <a:pos x="connsiteX99" y="connsiteY99"/>
+              </a:cxn>
+              <a:cxn ang="0">
+                <a:pos x="connsiteX100" y="connsiteY100"/>
+              </a:cxn>
+              <a:cxn ang="0">
+                <a:pos x="connsiteX101" y="connsiteY101"/>
+              </a:cxn>
+              <a:cxn ang="0">
+                <a:pos x="connsiteX102" y="connsiteY102"/>
+              </a:cxn>
+              <a:cxn ang="0">
+                <a:pos x="connsiteX103" y="connsiteY103"/>
+              </a:cxn>
+              <a:cxn ang="0">
+                <a:pos x="connsiteX104" y="connsiteY104"/>
+              </a:cxn>
+              <a:cxn ang="0">
+                <a:pos x="connsiteX105" y="connsiteY105"/>
+              </a:cxn>
+              <a:cxn ang="0">
+                <a:pos x="connsiteX106" y="connsiteY106"/>
+              </a:cxn>
+              <a:cxn ang="0">
+                <a:pos x="connsiteX107" y="connsiteY107"/>
+              </a:cxn>
+              <a:cxn ang="0">
+                <a:pos x="connsiteX108" y="connsiteY108"/>
+              </a:cxn>
+              <a:cxn ang="0">
+                <a:pos x="connsiteX109" y="connsiteY109"/>
+              </a:cxn>
+              <a:cxn ang="0">
+                <a:pos x="connsiteX110" y="connsiteY110"/>
+              </a:cxn>
+              <a:cxn ang="0">
+                <a:pos x="connsiteX111" y="connsiteY111"/>
+              </a:cxn>
+              <a:cxn ang="0">
+                <a:pos x="connsiteX112" y="connsiteY112"/>
+              </a:cxn>
+              <a:cxn ang="0">
+                <a:pos x="connsiteX113" y="connsiteY113"/>
+              </a:cxn>
+              <a:cxn ang="0">
+                <a:pos x="connsiteX114" y="connsiteY114"/>
+              </a:cxn>
+              <a:cxn ang="0">
+                <a:pos x="connsiteX115" y="connsiteY115"/>
+              </a:cxn>
+              <a:cxn ang="0">
+                <a:pos x="connsiteX116" y="connsiteY116"/>
+              </a:cxn>
+              <a:cxn ang="0">
+                <a:pos x="connsiteX117" y="connsiteY117"/>
+              </a:cxn>
+              <a:cxn ang="0">
+                <a:pos x="connsiteX118" y="connsiteY118"/>
+              </a:cxn>
+              <a:cxn ang="0">
+                <a:pos x="connsiteX119" y="connsiteY119"/>
+              </a:cxn>
+              <a:cxn ang="0">
+                <a:pos x="connsiteX120" y="connsiteY120"/>
+              </a:cxn>
+              <a:cxn ang="0">
+                <a:pos x="connsiteX121" y="connsiteY121"/>
+              </a:cxn>
+              <a:cxn ang="0">
+                <a:pos x="connsiteX122" y="connsiteY122"/>
+              </a:cxn>
+              <a:cxn ang="0">
+                <a:pos x="connsiteX123" y="connsiteY123"/>
+              </a:cxn>
+              <a:cxn ang="0">
+                <a:pos x="connsiteX124" y="connsiteY124"/>
+              </a:cxn>
+              <a:cxn ang="0">
+                <a:pos x="connsiteX125" y="connsiteY125"/>
+              </a:cxn>
+              <a:cxn ang="0">
+                <a:pos x="connsiteX126" y="connsiteY126"/>
+              </a:cxn>
+              <a:cxn ang="0">
+                <a:pos x="connsiteX127" y="connsiteY127"/>
+              </a:cxn>
+              <a:cxn ang="0">
+                <a:pos x="connsiteX128" y="connsiteY128"/>
+              </a:cxn>
+              <a:cxn ang="0">
+                <a:pos x="connsiteX129" y="connsiteY129"/>
+              </a:cxn>
+              <a:cxn ang="0">
+                <a:pos x="connsiteX130" y="connsiteY130"/>
+              </a:cxn>
+              <a:cxn ang="0">
+                <a:pos x="connsiteX131" y="connsiteY131"/>
+              </a:cxn>
+              <a:cxn ang="0">
+                <a:pos x="connsiteX132" y="connsiteY132"/>
+              </a:cxn>
+              <a:cxn ang="0">
+                <a:pos x="connsiteX133" y="connsiteY133"/>
+              </a:cxn>
+              <a:cxn ang="0">
+                <a:pos x="connsiteX134" y="connsiteY134"/>
+              </a:cxn>
+              <a:cxn ang="0">
+                <a:pos x="connsiteX135" y="connsiteY135"/>
+              </a:cxn>
+              <a:cxn ang="0">
+                <a:pos x="connsiteX136" y="connsiteY136"/>
+              </a:cxn>
+              <a:cxn ang="0">
+                <a:pos x="connsiteX137" y="connsiteY137"/>
+              </a:cxn>
+              <a:cxn ang="0">
+                <a:pos x="connsiteX138" y="connsiteY138"/>
+              </a:cxn>
+              <a:cxn ang="0">
+                <a:pos x="connsiteX139" y="connsiteY139"/>
+              </a:cxn>
+              <a:cxn ang="0">
+                <a:pos x="connsiteX140" y="connsiteY140"/>
+              </a:cxn>
+              <a:cxn ang="0">
+                <a:pos x="connsiteX141" y="connsiteY141"/>
+              </a:cxn>
+              <a:cxn ang="0">
+                <a:pos x="connsiteX142" y="connsiteY142"/>
+              </a:cxn>
+              <a:cxn ang="0">
+                <a:pos x="connsiteX143" y="connsiteY143"/>
+              </a:cxn>
+              <a:cxn ang="0">
+                <a:pos x="connsiteX144" y="connsiteY144"/>
+              </a:cxn>
+            </a:cxnLst>
+            <a:rect l="l" t="t" r="r" b="b"/>
+            <a:pathLst>
+              <a:path w="4417162" h="6858000">
+                <a:moveTo>
+                  <a:pt x="4417162" y="0"/>
+                </a:moveTo>
+                <a:lnTo>
+                  <a:pt x="334174" y="0"/>
+                </a:lnTo>
+                <a:lnTo>
+                  <a:pt x="334173" y="0"/>
+                </a:lnTo>
+                <a:lnTo>
+                  <a:pt x="189795" y="0"/>
+                </a:lnTo>
+                <a:lnTo>
+                  <a:pt x="184756" y="66675"/>
+                </a:lnTo>
+                <a:lnTo>
+                  <a:pt x="176358" y="122237"/>
+                </a:lnTo>
+                <a:lnTo>
+                  <a:pt x="166281" y="174625"/>
+                </a:lnTo>
+                <a:lnTo>
+                  <a:pt x="149485" y="217487"/>
+                </a:lnTo>
+                <a:lnTo>
+                  <a:pt x="132689" y="260350"/>
+                </a:lnTo>
+                <a:lnTo>
+                  <a:pt x="112534" y="296862"/>
+                </a:lnTo>
+                <a:lnTo>
+                  <a:pt x="92379" y="334962"/>
+                </a:lnTo>
+                <a:lnTo>
+                  <a:pt x="73903" y="369887"/>
+                </a:lnTo>
+                <a:lnTo>
+                  <a:pt x="55427" y="409575"/>
+                </a:lnTo>
+                <a:lnTo>
+                  <a:pt x="38632" y="450850"/>
+                </a:lnTo>
+                <a:lnTo>
+                  <a:pt x="23515" y="496887"/>
+                </a:lnTo>
+                <a:lnTo>
+                  <a:pt x="11758" y="546100"/>
+                </a:lnTo>
+                <a:lnTo>
+                  <a:pt x="3359" y="606425"/>
+                </a:lnTo>
+                <a:lnTo>
+                  <a:pt x="0" y="673100"/>
+                </a:lnTo>
+                <a:lnTo>
+                  <a:pt x="3359" y="744537"/>
+                </a:lnTo>
+                <a:lnTo>
+                  <a:pt x="11758" y="801687"/>
+                </a:lnTo>
+                <a:lnTo>
+                  <a:pt x="23515" y="854075"/>
+                </a:lnTo>
+                <a:lnTo>
+                  <a:pt x="38632" y="901700"/>
+                </a:lnTo>
+                <a:lnTo>
+                  <a:pt x="55427" y="942975"/>
+                </a:lnTo>
+                <a:lnTo>
+                  <a:pt x="75583" y="981075"/>
+                </a:lnTo>
+                <a:lnTo>
+                  <a:pt x="95738" y="1017587"/>
+                </a:lnTo>
+                <a:lnTo>
+                  <a:pt x="115893" y="1055687"/>
+                </a:lnTo>
+                <a:lnTo>
+                  <a:pt x="134368" y="1095375"/>
+                </a:lnTo>
+                <a:lnTo>
+                  <a:pt x="152844" y="1136650"/>
+                </a:lnTo>
+                <a:lnTo>
+                  <a:pt x="167960" y="1182687"/>
+                </a:lnTo>
+                <a:lnTo>
+                  <a:pt x="178038" y="1235075"/>
+                </a:lnTo>
+                <a:lnTo>
+                  <a:pt x="188115" y="1295400"/>
+                </a:lnTo>
+                <a:lnTo>
+                  <a:pt x="189795" y="1363662"/>
+                </a:lnTo>
+                <a:lnTo>
+                  <a:pt x="188115" y="1431925"/>
+                </a:lnTo>
+                <a:lnTo>
+                  <a:pt x="178038" y="1492250"/>
+                </a:lnTo>
+                <a:lnTo>
+                  <a:pt x="167960" y="1544637"/>
+                </a:lnTo>
+                <a:lnTo>
+                  <a:pt x="152844" y="1589087"/>
+                </a:lnTo>
+                <a:lnTo>
+                  <a:pt x="134368" y="1631950"/>
+                </a:lnTo>
+                <a:lnTo>
+                  <a:pt x="115893" y="1671637"/>
+                </a:lnTo>
+                <a:lnTo>
+                  <a:pt x="95738" y="1708150"/>
+                </a:lnTo>
+                <a:lnTo>
+                  <a:pt x="75583" y="1743075"/>
+                </a:lnTo>
+                <a:lnTo>
+                  <a:pt x="55427" y="1782762"/>
+                </a:lnTo>
+                <a:lnTo>
+                  <a:pt x="38632" y="1824037"/>
+                </a:lnTo>
+                <a:lnTo>
+                  <a:pt x="23515" y="1870075"/>
+                </a:lnTo>
+                <a:lnTo>
+                  <a:pt x="11758" y="1922462"/>
+                </a:lnTo>
+                <a:lnTo>
+                  <a:pt x="3359" y="1982787"/>
+                </a:lnTo>
+                <a:lnTo>
+                  <a:pt x="0" y="2051050"/>
+                </a:lnTo>
+                <a:lnTo>
+                  <a:pt x="3359" y="2119312"/>
+                </a:lnTo>
+                <a:lnTo>
+                  <a:pt x="11758" y="2179637"/>
+                </a:lnTo>
+                <a:lnTo>
+                  <a:pt x="23515" y="2232025"/>
+                </a:lnTo>
+                <a:lnTo>
+                  <a:pt x="38632" y="2278062"/>
+                </a:lnTo>
+                <a:lnTo>
+                  <a:pt x="55427" y="2319337"/>
+                </a:lnTo>
+                <a:lnTo>
+                  <a:pt x="75583" y="2359025"/>
+                </a:lnTo>
+                <a:lnTo>
+                  <a:pt x="95738" y="2395537"/>
+                </a:lnTo>
+                <a:lnTo>
+                  <a:pt x="115893" y="2433637"/>
+                </a:lnTo>
+                <a:lnTo>
+                  <a:pt x="134368" y="2471737"/>
+                </a:lnTo>
+                <a:lnTo>
+                  <a:pt x="152844" y="2513012"/>
+                </a:lnTo>
+                <a:lnTo>
+                  <a:pt x="167960" y="2560637"/>
+                </a:lnTo>
+                <a:lnTo>
+                  <a:pt x="178038" y="2613025"/>
+                </a:lnTo>
+                <a:lnTo>
+                  <a:pt x="188115" y="2671762"/>
+                </a:lnTo>
+                <a:lnTo>
+                  <a:pt x="189795" y="2741612"/>
+                </a:lnTo>
+                <a:lnTo>
+                  <a:pt x="188115" y="2809875"/>
+                </a:lnTo>
+                <a:lnTo>
+                  <a:pt x="178038" y="2868612"/>
+                </a:lnTo>
+                <a:lnTo>
+                  <a:pt x="167960" y="2922587"/>
+                </a:lnTo>
+                <a:lnTo>
+                  <a:pt x="152844" y="2967037"/>
+                </a:lnTo>
+                <a:lnTo>
+                  <a:pt x="134368" y="3009900"/>
+                </a:lnTo>
+                <a:lnTo>
+                  <a:pt x="115893" y="3046412"/>
+                </a:lnTo>
+                <a:lnTo>
+                  <a:pt x="95738" y="3084512"/>
+                </a:lnTo>
+                <a:lnTo>
+                  <a:pt x="75583" y="3121025"/>
+                </a:lnTo>
+                <a:lnTo>
+                  <a:pt x="55427" y="3160712"/>
+                </a:lnTo>
+                <a:lnTo>
+                  <a:pt x="38632" y="3201987"/>
+                </a:lnTo>
+                <a:lnTo>
+                  <a:pt x="23515" y="3248025"/>
+                </a:lnTo>
+                <a:lnTo>
+                  <a:pt x="11758" y="3300412"/>
+                </a:lnTo>
+                <a:lnTo>
+                  <a:pt x="3359" y="3360737"/>
+                </a:lnTo>
+                <a:lnTo>
+                  <a:pt x="0" y="3427412"/>
+                </a:lnTo>
+                <a:lnTo>
+                  <a:pt x="3359" y="3497262"/>
+                </a:lnTo>
+                <a:lnTo>
+                  <a:pt x="11758" y="3557587"/>
+                </a:lnTo>
+                <a:lnTo>
+                  <a:pt x="23515" y="3609975"/>
+                </a:lnTo>
+                <a:lnTo>
+                  <a:pt x="38632" y="3656012"/>
+                </a:lnTo>
+                <a:lnTo>
+                  <a:pt x="55427" y="3697287"/>
+                </a:lnTo>
+                <a:lnTo>
+                  <a:pt x="75583" y="3736975"/>
+                </a:lnTo>
+                <a:lnTo>
+                  <a:pt x="115893" y="3811587"/>
+                </a:lnTo>
+                <a:lnTo>
+                  <a:pt x="134368" y="3848100"/>
+                </a:lnTo>
+                <a:lnTo>
+                  <a:pt x="152844" y="3890962"/>
+                </a:lnTo>
+                <a:lnTo>
+                  <a:pt x="167960" y="3935412"/>
+                </a:lnTo>
+                <a:lnTo>
+                  <a:pt x="178038" y="3987800"/>
+                </a:lnTo>
+                <a:lnTo>
+                  <a:pt x="188115" y="4048125"/>
+                </a:lnTo>
+                <a:lnTo>
+                  <a:pt x="189795" y="4116387"/>
+                </a:lnTo>
+                <a:lnTo>
+                  <a:pt x="188115" y="4186237"/>
+                </a:lnTo>
+                <a:lnTo>
+                  <a:pt x="178038" y="4244975"/>
+                </a:lnTo>
+                <a:lnTo>
+                  <a:pt x="167960" y="4297362"/>
+                </a:lnTo>
+                <a:lnTo>
+                  <a:pt x="152844" y="4343400"/>
+                </a:lnTo>
+                <a:lnTo>
+                  <a:pt x="134368" y="4386262"/>
+                </a:lnTo>
+                <a:lnTo>
+                  <a:pt x="115893" y="4424362"/>
+                </a:lnTo>
+                <a:lnTo>
+                  <a:pt x="75583" y="4498975"/>
+                </a:lnTo>
+                <a:lnTo>
+                  <a:pt x="55427" y="4537075"/>
+                </a:lnTo>
+                <a:lnTo>
+                  <a:pt x="38632" y="4579937"/>
+                </a:lnTo>
+                <a:lnTo>
+                  <a:pt x="23515" y="4625975"/>
+                </a:lnTo>
+                <a:lnTo>
+                  <a:pt x="11758" y="4678362"/>
+                </a:lnTo>
+                <a:lnTo>
+                  <a:pt x="3359" y="4738687"/>
+                </a:lnTo>
+                <a:lnTo>
+                  <a:pt x="0" y="4806950"/>
+                </a:lnTo>
+                <a:lnTo>
+                  <a:pt x="3359" y="4875212"/>
+                </a:lnTo>
+                <a:lnTo>
+                  <a:pt x="11758" y="4935537"/>
+                </a:lnTo>
+                <a:lnTo>
+                  <a:pt x="23515" y="4987925"/>
+                </a:lnTo>
+                <a:lnTo>
+                  <a:pt x="38632" y="5033962"/>
+                </a:lnTo>
+                <a:lnTo>
+                  <a:pt x="55427" y="5075237"/>
+                </a:lnTo>
+                <a:lnTo>
+                  <a:pt x="75583" y="5114925"/>
+                </a:lnTo>
+                <a:lnTo>
+                  <a:pt x="95738" y="5149850"/>
+                </a:lnTo>
+                <a:lnTo>
+                  <a:pt x="115893" y="5186362"/>
+                </a:lnTo>
+                <a:lnTo>
+                  <a:pt x="134368" y="5226050"/>
+                </a:lnTo>
+                <a:lnTo>
+                  <a:pt x="152844" y="5268912"/>
+                </a:lnTo>
+                <a:lnTo>
+                  <a:pt x="167960" y="5313362"/>
+                </a:lnTo>
+                <a:lnTo>
+                  <a:pt x="178038" y="5365750"/>
+                </a:lnTo>
+                <a:lnTo>
+                  <a:pt x="188115" y="5426075"/>
+                </a:lnTo>
+                <a:lnTo>
+                  <a:pt x="189795" y="5494337"/>
+                </a:lnTo>
+                <a:lnTo>
+                  <a:pt x="188115" y="5562600"/>
+                </a:lnTo>
+                <a:lnTo>
+                  <a:pt x="178038" y="5622925"/>
+                </a:lnTo>
+                <a:lnTo>
+                  <a:pt x="167960" y="5675312"/>
+                </a:lnTo>
+                <a:lnTo>
+                  <a:pt x="152844" y="5721350"/>
+                </a:lnTo>
+                <a:lnTo>
+                  <a:pt x="134368" y="5762625"/>
+                </a:lnTo>
+                <a:lnTo>
+                  <a:pt x="115893" y="5802312"/>
+                </a:lnTo>
+                <a:lnTo>
+                  <a:pt x="95738" y="5840412"/>
+                </a:lnTo>
+                <a:lnTo>
+                  <a:pt x="75583" y="5876925"/>
+                </a:lnTo>
+                <a:lnTo>
+                  <a:pt x="55427" y="5915025"/>
+                </a:lnTo>
+                <a:lnTo>
+                  <a:pt x="38632" y="5956300"/>
+                </a:lnTo>
+                <a:lnTo>
+                  <a:pt x="23515" y="6003925"/>
+                </a:lnTo>
+                <a:lnTo>
+                  <a:pt x="11758" y="6056312"/>
+                </a:lnTo>
+                <a:lnTo>
+                  <a:pt x="3359" y="6113462"/>
+                </a:lnTo>
+                <a:lnTo>
+                  <a:pt x="0" y="6183312"/>
+                </a:lnTo>
+                <a:lnTo>
+                  <a:pt x="3359" y="6251575"/>
+                </a:lnTo>
+                <a:lnTo>
+                  <a:pt x="11758" y="6311900"/>
+                </a:lnTo>
+                <a:lnTo>
+                  <a:pt x="23515" y="6361112"/>
+                </a:lnTo>
+                <a:lnTo>
+                  <a:pt x="38632" y="6407150"/>
+                </a:lnTo>
+                <a:lnTo>
+                  <a:pt x="55427" y="6448425"/>
+                </a:lnTo>
+                <a:lnTo>
+                  <a:pt x="73903" y="6488112"/>
+                </a:lnTo>
+                <a:lnTo>
+                  <a:pt x="92379" y="6523037"/>
+                </a:lnTo>
+                <a:lnTo>
+                  <a:pt x="112534" y="6561137"/>
+                </a:lnTo>
+                <a:lnTo>
+                  <a:pt x="132689" y="6597650"/>
+                </a:lnTo>
+                <a:lnTo>
+                  <a:pt x="149485" y="6640512"/>
+                </a:lnTo>
+                <a:lnTo>
+                  <a:pt x="166281" y="6683375"/>
+                </a:lnTo>
+                <a:lnTo>
+                  <a:pt x="176358" y="6735762"/>
+                </a:lnTo>
+                <a:lnTo>
+                  <a:pt x="184756" y="6791325"/>
+                </a:lnTo>
+                <a:lnTo>
+                  <a:pt x="189795" y="6858000"/>
+                </a:lnTo>
+                <a:lnTo>
+                  <a:pt x="334173" y="6858000"/>
+                </a:lnTo>
+                <a:lnTo>
+                  <a:pt x="334174" y="6858000"/>
+                </a:lnTo>
+                <a:lnTo>
+                  <a:pt x="4417162" y="6858000"/>
+                </a:lnTo>
+                <a:close/>
+              </a:path>
+            </a:pathLst>
+          </a:custGeom>
+          <a:solidFill>
+            <a:schemeClr val="accent1">
+              <a:lumMod val="50000"/>
+              <a:alpha val="25000"/>
+            </a:schemeClr>
+          </a:solidFill>
+          <a:ln>
+            <a:noFill/>
+          </a:ln>
+        </p:spPr>
+        <p:style>
+          <a:lnRef idx="2">
+            <a:schemeClr val="accent1">
+              <a:shade val="50000"/>
+            </a:schemeClr>
+          </a:lnRef>
+          <a:fillRef idx="1">
+            <a:schemeClr val="accent1"/>
+          </a:fillRef>
+          <a:effectRef idx="0">
+            <a:schemeClr val="accent1"/>
+          </a:effectRef>
+          <a:fontRef idx="minor">
+            <a:schemeClr val="lt1"/>
+          </a:fontRef>
+        </p:style>
+        <p:txBody>
+          <a:bodyPr wrap="square" rtlCol="0" anchor="ctr">
+            <a:noAutofit/>
+          </a:bodyPr>
+          <a:lstStyle/>
+          <a:p>
+            <a:pPr algn="ctr"/>
+            <a:endParaRPr lang="en-US" dirty="0"/>
+          </a:p>
+        </p:txBody>
+      </p:sp>
+      <p:sp>
+        <p:nvSpPr>
           <p:cNvPr id="2" name="Title 1">
             <a:extLst>
               <a:ext uri="{FF2B5EF4-FFF2-40B4-BE49-F238E27FC236}">
@@ -7223,47 +11238,88 @@
             <p:ph type="title"/>
           </p:nvPr>
         </p:nvSpPr>
-        <p:spPr/>
+        <p:spPr>
+          <a:xfrm>
+            <a:off x="457201" y="723406"/>
+            <a:ext cx="3234018" cy="3826728"/>
+          </a:xfrm>
+        </p:spPr>
         <p:txBody>
-          <a:bodyPr/>
+          <a:bodyPr vert="horz" lIns="91440" tIns="45720" rIns="91440" bIns="45720" rtlCol="0" anchor="b">
+            <a:normAutofit/>
+          </a:bodyPr>
           <a:lstStyle/>
           <a:p>
+            <a:pPr algn="ctr"/>
             <a:r>
-              <a:rPr lang="en-GB" dirty="0"/>
+              <a:rPr lang="en-US" sz="6400" kern="1200" dirty="0">
+                <a:solidFill>
+                  <a:schemeClr val="tx1"/>
+                </a:solidFill>
+                <a:latin typeface="+mj-lt"/>
+                <a:ea typeface="+mj-ea"/>
+                <a:cs typeface="+mj-cs"/>
+              </a:rPr>
               <a:t>Postman</a:t>
+            </a:r>
+            <a:br>
+              <a:rPr lang="en-US" sz="6400" kern="1200" dirty="0">
+                <a:solidFill>
+                  <a:schemeClr val="tx1"/>
+                </a:solidFill>
+                <a:latin typeface="+mj-lt"/>
+                <a:ea typeface="+mj-ea"/>
+                <a:cs typeface="+mj-cs"/>
+              </a:rPr>
+            </a:br>
+            <a:r>
+              <a:rPr lang="en-US" sz="6400" kern="1200" dirty="0">
+                <a:solidFill>
+                  <a:schemeClr val="tx1"/>
+                </a:solidFill>
+                <a:latin typeface="+mj-lt"/>
+                <a:ea typeface="+mj-ea"/>
+                <a:cs typeface="+mj-cs"/>
+              </a:rPr>
+              <a:t>Part 2</a:t>
             </a:r>
           </a:p>
         </p:txBody>
       </p:sp>
-      <p:sp>
-        <p:nvSpPr>
-          <p:cNvPr id="3" name="Content Placeholder 2">
+      <p:pic>
+        <p:nvPicPr>
+          <p:cNvPr id="7" name="Content Placeholder 6">
             <a:extLst>
               <a:ext uri="{FF2B5EF4-FFF2-40B4-BE49-F238E27FC236}">
-                <a16:creationId xmlns:a16="http://schemas.microsoft.com/office/drawing/2014/main" id="{04C4D8B6-2E54-EBE6-B8EB-1FC8C3E7BF70}"/>
+                <a16:creationId xmlns:a16="http://schemas.microsoft.com/office/drawing/2014/main" id="{E1CB8435-5A0A-FEA7-6FE5-AB909F5BD25D}"/>
               </a:ext>
             </a:extLst>
           </p:cNvPr>
-          <p:cNvSpPr>
-            <a:spLocks noGrp="1"/>
-          </p:cNvSpPr>
-          <p:nvPr>
-            <p:ph idx="1"/>
-          </p:nvPr>
-        </p:nvSpPr>
-        <p:spPr/>
-        <p:txBody>
-          <a:bodyPr/>
-          <a:lstStyle/>
-          <a:p>
-            <a:endParaRPr lang="en-GB"/>
-          </a:p>
-        </p:txBody>
-      </p:sp>
+          <p:cNvPicPr>
+            <a:picLocks noChangeAspect="1"/>
+          </p:cNvPicPr>
+          <p:nvPr/>
+        </p:nvPicPr>
+        <p:blipFill>
+          <a:blip r:embed="rId2"/>
+          <a:stretch>
+            <a:fillRect/>
+          </a:stretch>
+        </p:blipFill>
+        <p:spPr>
+          <a:xfrm>
+            <a:off x="4666308" y="954974"/>
+            <a:ext cx="7276545" cy="4948051"/>
+          </a:xfrm>
+          <a:prstGeom prst="rect">
+            <a:avLst/>
+          </a:prstGeom>
+        </p:spPr>
+      </p:pic>
     </p:spTree>
     <p:extLst>
       <p:ext uri="{BB962C8B-B14F-4D97-AF65-F5344CB8AC3E}">
-        <p14:creationId xmlns:p14="http://schemas.microsoft.com/office/powerpoint/2010/main" val="1255525579"/>
+        <p14:creationId xmlns:p14="http://schemas.microsoft.com/office/powerpoint/2010/main" val="2411891905"/>
       </p:ext>
     </p:extLst>
   </p:cSld>
@@ -7273,7 +11329,7 @@
 </p:sld>
 </file>
 
-<file path=ppt/slides/slide13.xml><?xml version="1.0" encoding="utf-8"?>
+<file path=ppt/slides/slide14.xml><?xml version="1.0" encoding="utf-8"?>
 <p:sld xmlns:a="http://schemas.openxmlformats.org/drawingml/2006/main" xmlns:r="http://schemas.openxmlformats.org/officeDocument/2006/relationships" xmlns:p="http://schemas.openxmlformats.org/presentationml/2006/main">
   <p:cSld>
     <p:spTree>
@@ -7356,174 +11412,7 @@
 </p:sld>
 </file>
 
-<file path=ppt/slides/slide14.xml><?xml version="1.0" encoding="utf-8"?>
-<p:sld xmlns:a="http://schemas.openxmlformats.org/drawingml/2006/main" xmlns:r="http://schemas.openxmlformats.org/officeDocument/2006/relationships" xmlns:p="http://schemas.openxmlformats.org/presentationml/2006/main">
-  <p:cSld>
-    <p:spTree>
-      <p:nvGrpSpPr>
-        <p:cNvPr id="1" name=""/>
-        <p:cNvGrpSpPr/>
-        <p:nvPr/>
-      </p:nvGrpSpPr>
-      <p:grpSpPr>
-        <a:xfrm>
-          <a:off x="0" y="0"/>
-          <a:ext cx="0" cy="0"/>
-          <a:chOff x="0" y="0"/>
-          <a:chExt cx="0" cy="0"/>
-        </a:xfrm>
-      </p:grpSpPr>
-      <p:sp>
-        <p:nvSpPr>
-          <p:cNvPr id="2" name="Title 1">
-            <a:extLst>
-              <a:ext uri="{FF2B5EF4-FFF2-40B4-BE49-F238E27FC236}">
-                <a16:creationId xmlns:a16="http://schemas.microsoft.com/office/drawing/2014/main" id="{3E38681F-9ECE-C8D9-7A88-7E9E4D529640}"/>
-              </a:ext>
-            </a:extLst>
-          </p:cNvPr>
-          <p:cNvSpPr>
-            <a:spLocks noGrp="1"/>
-          </p:cNvSpPr>
-          <p:nvPr>
-            <p:ph type="title"/>
-          </p:nvPr>
-        </p:nvSpPr>
-        <p:spPr/>
-        <p:txBody>
-          <a:bodyPr/>
-          <a:lstStyle/>
-          <a:p>
-            <a:r>
-              <a:rPr lang="en-GB" dirty="0"/>
-              <a:t>SQL Database</a:t>
-            </a:r>
-          </a:p>
-        </p:txBody>
-      </p:sp>
-      <p:sp>
-        <p:nvSpPr>
-          <p:cNvPr id="3" name="Content Placeholder 2">
-            <a:extLst>
-              <a:ext uri="{FF2B5EF4-FFF2-40B4-BE49-F238E27FC236}">
-                <a16:creationId xmlns:a16="http://schemas.microsoft.com/office/drawing/2014/main" id="{3AEDA95E-AD4A-490C-8D4E-134CF2A1AB4D}"/>
-              </a:ext>
-            </a:extLst>
-          </p:cNvPr>
-          <p:cNvSpPr>
-            <a:spLocks noGrp="1"/>
-          </p:cNvSpPr>
-          <p:nvPr>
-            <p:ph idx="1"/>
-          </p:nvPr>
-        </p:nvSpPr>
-        <p:spPr/>
-        <p:txBody>
-          <a:bodyPr/>
-          <a:lstStyle/>
-          <a:p>
-            <a:endParaRPr lang="en-GB"/>
-          </a:p>
-        </p:txBody>
-      </p:sp>
-    </p:spTree>
-    <p:extLst>
-      <p:ext uri="{BB962C8B-B14F-4D97-AF65-F5344CB8AC3E}">
-        <p14:creationId xmlns:p14="http://schemas.microsoft.com/office/powerpoint/2010/main" val="2597843163"/>
-      </p:ext>
-    </p:extLst>
-  </p:cSld>
-  <p:clrMapOvr>
-    <a:masterClrMapping/>
-  </p:clrMapOvr>
-</p:sld>
-</file>
-
 <file path=ppt/slides/slide15.xml><?xml version="1.0" encoding="utf-8"?>
-<p:sld xmlns:a="http://schemas.openxmlformats.org/drawingml/2006/main" xmlns:r="http://schemas.openxmlformats.org/officeDocument/2006/relationships" xmlns:p="http://schemas.openxmlformats.org/presentationml/2006/main">
-  <p:cSld>
-    <p:spTree>
-      <p:nvGrpSpPr>
-        <p:cNvPr id="1" name=""/>
-        <p:cNvGrpSpPr/>
-        <p:nvPr/>
-      </p:nvGrpSpPr>
-      <p:grpSpPr>
-        <a:xfrm>
-          <a:off x="0" y="0"/>
-          <a:ext cx="0" cy="0"/>
-          <a:chOff x="0" y="0"/>
-          <a:chExt cx="0" cy="0"/>
-        </a:xfrm>
-      </p:grpSpPr>
-      <p:sp>
-        <p:nvSpPr>
-          <p:cNvPr id="2" name="Title 1">
-            <a:extLst>
-              <a:ext uri="{FF2B5EF4-FFF2-40B4-BE49-F238E27FC236}">
-                <a16:creationId xmlns:a16="http://schemas.microsoft.com/office/drawing/2014/main" id="{477EE2FC-63A1-76E2-A3F9-68F04AC53B34}"/>
-              </a:ext>
-            </a:extLst>
-          </p:cNvPr>
-          <p:cNvSpPr>
-            <a:spLocks noGrp="1"/>
-          </p:cNvSpPr>
-          <p:nvPr>
-            <p:ph type="title"/>
-          </p:nvPr>
-        </p:nvSpPr>
-        <p:spPr/>
-        <p:txBody>
-          <a:bodyPr/>
-          <a:lstStyle/>
-          <a:p>
-            <a:r>
-              <a:rPr lang="en-GB" dirty="0" err="1"/>
-              <a:t>WireFrame</a:t>
-            </a:r>
-            <a:endParaRPr lang="en-GB" dirty="0"/>
-          </a:p>
-        </p:txBody>
-      </p:sp>
-      <p:sp>
-        <p:nvSpPr>
-          <p:cNvPr id="3" name="Content Placeholder 2">
-            <a:extLst>
-              <a:ext uri="{FF2B5EF4-FFF2-40B4-BE49-F238E27FC236}">
-                <a16:creationId xmlns:a16="http://schemas.microsoft.com/office/drawing/2014/main" id="{AEDF9A08-ED1F-9852-BFD5-87E3BD3BE310}"/>
-              </a:ext>
-            </a:extLst>
-          </p:cNvPr>
-          <p:cNvSpPr>
-            <a:spLocks noGrp="1"/>
-          </p:cNvSpPr>
-          <p:nvPr>
-            <p:ph idx="1"/>
-          </p:nvPr>
-        </p:nvSpPr>
-        <p:spPr/>
-        <p:txBody>
-          <a:bodyPr/>
-          <a:lstStyle/>
-          <a:p>
-            <a:endParaRPr lang="en-GB"/>
-          </a:p>
-        </p:txBody>
-      </p:sp>
-    </p:spTree>
-    <p:extLst>
-      <p:ext uri="{BB962C8B-B14F-4D97-AF65-F5344CB8AC3E}">
-        <p14:creationId xmlns:p14="http://schemas.microsoft.com/office/powerpoint/2010/main" val="1980235916"/>
-      </p:ext>
-    </p:extLst>
-  </p:cSld>
-  <p:clrMapOvr>
-    <a:masterClrMapping/>
-  </p:clrMapOvr>
-</p:sld>
-</file>
-
-<file path=ppt/slides/slide16.xml><?xml version="1.0" encoding="utf-8"?>
 <p:sld xmlns:a="http://schemas.openxmlformats.org/drawingml/2006/main" xmlns:r="http://schemas.openxmlformats.org/officeDocument/2006/relationships" xmlns:p="http://schemas.openxmlformats.org/presentationml/2006/main">
   <p:cSld>
     <p:bg>
@@ -9486,6 +13375,90 @@
 </p:sld>
 </file>
 
+<file path=ppt/slides/slide16.xml><?xml version="1.0" encoding="utf-8"?>
+<p:sld xmlns:a="http://schemas.openxmlformats.org/drawingml/2006/main" xmlns:r="http://schemas.openxmlformats.org/officeDocument/2006/relationships" xmlns:p="http://schemas.openxmlformats.org/presentationml/2006/main">
+  <p:cSld>
+    <p:spTree>
+      <p:nvGrpSpPr>
+        <p:cNvPr id="1" name=""/>
+        <p:cNvGrpSpPr/>
+        <p:nvPr/>
+      </p:nvGrpSpPr>
+      <p:grpSpPr>
+        <a:xfrm>
+          <a:off x="0" y="0"/>
+          <a:ext cx="0" cy="0"/>
+          <a:chOff x="0" y="0"/>
+          <a:chExt cx="0" cy="0"/>
+        </a:xfrm>
+      </p:grpSpPr>
+      <p:sp>
+        <p:nvSpPr>
+          <p:cNvPr id="2" name="Title 1">
+            <a:extLst>
+              <a:ext uri="{FF2B5EF4-FFF2-40B4-BE49-F238E27FC236}">
+                <a16:creationId xmlns:a16="http://schemas.microsoft.com/office/drawing/2014/main" id="{477EE2FC-63A1-76E2-A3F9-68F04AC53B34}"/>
+              </a:ext>
+            </a:extLst>
+          </p:cNvPr>
+          <p:cNvSpPr>
+            <a:spLocks noGrp="1"/>
+          </p:cNvSpPr>
+          <p:nvPr>
+            <p:ph type="title"/>
+          </p:nvPr>
+        </p:nvSpPr>
+        <p:spPr/>
+        <p:txBody>
+          <a:bodyPr/>
+          <a:lstStyle/>
+          <a:p>
+            <a:r>
+              <a:rPr lang="en-GB" dirty="0" err="1"/>
+              <a:t>WireFrame</a:t>
+            </a:r>
+            <a:endParaRPr lang="en-GB" dirty="0"/>
+          </a:p>
+        </p:txBody>
+      </p:sp>
+      <p:sp>
+        <p:nvSpPr>
+          <p:cNvPr id="3" name="Content Placeholder 2">
+            <a:extLst>
+              <a:ext uri="{FF2B5EF4-FFF2-40B4-BE49-F238E27FC236}">
+                <a16:creationId xmlns:a16="http://schemas.microsoft.com/office/drawing/2014/main" id="{AEDF9A08-ED1F-9852-BFD5-87E3BD3BE310}"/>
+              </a:ext>
+            </a:extLst>
+          </p:cNvPr>
+          <p:cNvSpPr>
+            <a:spLocks noGrp="1"/>
+          </p:cNvSpPr>
+          <p:nvPr>
+            <p:ph idx="1"/>
+          </p:nvPr>
+        </p:nvSpPr>
+        <p:spPr/>
+        <p:txBody>
+          <a:bodyPr/>
+          <a:lstStyle/>
+          <a:p>
+            <a:endParaRPr lang="en-GB"/>
+          </a:p>
+        </p:txBody>
+      </p:sp>
+    </p:spTree>
+    <p:extLst>
+      <p:ext uri="{BB962C8B-B14F-4D97-AF65-F5344CB8AC3E}">
+        <p14:creationId xmlns:p14="http://schemas.microsoft.com/office/powerpoint/2010/main" val="1980235916"/>
+      </p:ext>
+    </p:extLst>
+  </p:cSld>
+  <p:clrMapOvr>
+    <a:masterClrMapping/>
+  </p:clrMapOvr>
+</p:sld>
+</file>
+
 <file path=ppt/slides/slide17.xml><?xml version="1.0" encoding="utf-8"?>
 <p:sld xmlns:a="http://schemas.openxmlformats.org/drawingml/2006/main" xmlns:r="http://schemas.openxmlformats.org/officeDocument/2006/relationships" xmlns:p="http://schemas.openxmlformats.org/presentationml/2006/main">
   <p:cSld>
@@ -9891,6 +13864,349 @@
 </file>
 
 <file path=ppt/slides/slide18.xml><?xml version="1.0" encoding="utf-8"?>
+<p:sld xmlns:a="http://schemas.openxmlformats.org/drawingml/2006/main" xmlns:r="http://schemas.openxmlformats.org/officeDocument/2006/relationships" xmlns:p="http://schemas.openxmlformats.org/presentationml/2006/main">
+  <p:cSld>
+    <p:bg>
+      <p:bgPr>
+        <a:solidFill>
+          <a:schemeClr val="bg1"/>
+        </a:solidFill>
+        <a:effectLst/>
+      </p:bgPr>
+    </p:bg>
+    <p:spTree>
+      <p:nvGrpSpPr>
+        <p:cNvPr id="1" name=""/>
+        <p:cNvGrpSpPr/>
+        <p:nvPr/>
+      </p:nvGrpSpPr>
+      <p:grpSpPr>
+        <a:xfrm>
+          <a:off x="0" y="0"/>
+          <a:ext cx="0" cy="0"/>
+          <a:chOff x="0" y="0"/>
+          <a:chExt cx="0" cy="0"/>
+        </a:xfrm>
+      </p:grpSpPr>
+      <p:cxnSp>
+        <p:nvCxnSpPr>
+          <p:cNvPr id="10" name="Straight Connector 9">
+            <a:extLst>
+              <a:ext uri="{FF2B5EF4-FFF2-40B4-BE49-F238E27FC236}">
+                <a16:creationId xmlns:a16="http://schemas.microsoft.com/office/drawing/2014/main" id="{D2E961F1-4A28-4A5F-BBD4-6E400E5E6C75}"/>
+              </a:ext>
+              <a:ext uri="{C183D7F6-B498-43B3-948B-1728B52AA6E4}">
+                <adec:decorative xmlns:adec="http://schemas.microsoft.com/office/drawing/2017/decorative" val="1"/>
+              </a:ext>
+            </a:extLst>
+          </p:cNvPr>
+          <p:cNvCxnSpPr>
+            <a:cxnSpLocks noGrp="1" noRot="1" noChangeAspect="1" noMove="1" noResize="1" noEditPoints="1" noAdjustHandles="1" noChangeArrowheads="1" noChangeShapeType="1"/>
+          </p:cNvCxnSpPr>
+          <p:nvPr>
+            <p:extLst>
+              <p:ext uri="{386F3935-93C4-4BCD-93E2-E3B085C9AB24}">
+                <p16:designElem xmlns:p16="http://schemas.microsoft.com/office/powerpoint/2015/main" val="1"/>
+              </p:ext>
+            </p:extLst>
+          </p:nvPr>
+        </p:nvCxnSpPr>
+        <p:spPr bwMode="white">
+          <a:xfrm>
+            <a:off x="0" y="272357"/>
+            <a:ext cx="12188824" cy="0"/>
+          </a:xfrm>
+          <a:prstGeom prst="line">
+            <a:avLst/>
+          </a:prstGeom>
+          <a:ln w="50800">
+            <a:solidFill>
+              <a:schemeClr val="tx1">
+                <a:lumMod val="75000"/>
+                <a:lumOff val="25000"/>
+              </a:schemeClr>
+            </a:solidFill>
+          </a:ln>
+        </p:spPr>
+        <p:style>
+          <a:lnRef idx="1">
+            <a:schemeClr val="accent1"/>
+          </a:lnRef>
+          <a:fillRef idx="0">
+            <a:schemeClr val="accent1"/>
+          </a:fillRef>
+          <a:effectRef idx="0">
+            <a:schemeClr val="accent1"/>
+          </a:effectRef>
+          <a:fontRef idx="minor">
+            <a:schemeClr val="tx1"/>
+          </a:fontRef>
+        </p:style>
+      </p:cxnSp>
+      <p:sp>
+        <p:nvSpPr>
+          <p:cNvPr id="12" name="Rectangle 11">
+            <a:extLst>
+              <a:ext uri="{FF2B5EF4-FFF2-40B4-BE49-F238E27FC236}">
+                <a16:creationId xmlns:a16="http://schemas.microsoft.com/office/drawing/2014/main" id="{7F57BEA8-497D-4AA8-8A18-BDCD696B25FE}"/>
+              </a:ext>
+              <a:ext uri="{C183D7F6-B498-43B3-948B-1728B52AA6E4}">
+                <adec:decorative xmlns:adec="http://schemas.microsoft.com/office/drawing/2017/decorative" val="1"/>
+              </a:ext>
+            </a:extLst>
+          </p:cNvPr>
+          <p:cNvSpPr>
+            <a:spLocks noGrp="1" noRot="1" noChangeAspect="1" noMove="1" noResize="1" noEditPoints="1" noAdjustHandles="1" noChangeArrowheads="1" noChangeShapeType="1" noTextEdit="1"/>
+          </p:cNvSpPr>
+          <p:nvPr>
+            <p:extLst>
+              <p:ext uri="{386F3935-93C4-4BCD-93E2-E3B085C9AB24}">
+                <p16:designElem xmlns:p16="http://schemas.microsoft.com/office/powerpoint/2015/main" val="1"/>
+              </p:ext>
+            </p:extLst>
+          </p:nvPr>
+        </p:nvSpPr>
+        <p:spPr>
+          <a:xfrm>
+            <a:off x="0" y="368596"/>
+            <a:ext cx="12192000" cy="1735555"/>
+          </a:xfrm>
+          <a:prstGeom prst="rect">
+            <a:avLst/>
+          </a:prstGeom>
+          <a:solidFill>
+            <a:schemeClr val="tx1">
+              <a:lumMod val="75000"/>
+              <a:lumOff val="25000"/>
+            </a:schemeClr>
+          </a:solidFill>
+          <a:ln>
+            <a:noFill/>
+          </a:ln>
+        </p:spPr>
+        <p:style>
+          <a:lnRef idx="2">
+            <a:schemeClr val="accent1">
+              <a:shade val="50000"/>
+            </a:schemeClr>
+          </a:lnRef>
+          <a:fillRef idx="1">
+            <a:schemeClr val="accent1"/>
+          </a:fillRef>
+          <a:effectRef idx="0">
+            <a:schemeClr val="accent1"/>
+          </a:effectRef>
+          <a:fontRef idx="minor">
+            <a:schemeClr val="lt1"/>
+          </a:fontRef>
+        </p:style>
+        <p:txBody>
+          <a:bodyPr rtlCol="0" anchor="ctr"/>
+          <a:lstStyle/>
+          <a:p>
+            <a:pPr algn="ctr"/>
+            <a:endParaRPr lang="en-US"/>
+          </a:p>
+        </p:txBody>
+      </p:sp>
+      <p:sp>
+        <p:nvSpPr>
+          <p:cNvPr id="2" name="Title 1">
+            <a:extLst>
+              <a:ext uri="{FF2B5EF4-FFF2-40B4-BE49-F238E27FC236}">
+                <a16:creationId xmlns:a16="http://schemas.microsoft.com/office/drawing/2014/main" id="{3E38681F-9ECE-C8D9-7A88-7E9E4D529640}"/>
+              </a:ext>
+            </a:extLst>
+          </p:cNvPr>
+          <p:cNvSpPr>
+            <a:spLocks noGrp="1"/>
+          </p:cNvSpPr>
+          <p:nvPr>
+            <p:ph type="title"/>
+          </p:nvPr>
+        </p:nvSpPr>
+        <p:spPr>
+          <a:xfrm>
+            <a:off x="526073" y="489439"/>
+            <a:ext cx="11139854" cy="930447"/>
+          </a:xfrm>
+        </p:spPr>
+        <p:txBody>
+          <a:bodyPr vert="horz" lIns="91440" tIns="45720" rIns="91440" bIns="45720" rtlCol="0" anchor="b">
+            <a:normAutofit/>
+          </a:bodyPr>
+          <a:lstStyle/>
+          <a:p>
+            <a:pPr algn="ctr"/>
+            <a:r>
+              <a:rPr lang="en-US" sz="5400" kern="1200">
+                <a:solidFill>
+                  <a:schemeClr val="bg1"/>
+                </a:solidFill>
+                <a:latin typeface="+mj-lt"/>
+                <a:ea typeface="+mj-ea"/>
+                <a:cs typeface="+mj-cs"/>
+              </a:rPr>
+              <a:t>SQL Database</a:t>
+            </a:r>
+          </a:p>
+        </p:txBody>
+      </p:sp>
+      <p:cxnSp>
+        <p:nvCxnSpPr>
+          <p:cNvPr id="14" name="Straight Connector 13">
+            <a:extLst>
+              <a:ext uri="{FF2B5EF4-FFF2-40B4-BE49-F238E27FC236}">
+                <a16:creationId xmlns:a16="http://schemas.microsoft.com/office/drawing/2014/main" id="{A82415D3-DDE5-4D63-8CB3-23A5EC581B27}"/>
+              </a:ext>
+              <a:ext uri="{C183D7F6-B498-43B3-948B-1728B52AA6E4}">
+                <adec:decorative xmlns:adec="http://schemas.microsoft.com/office/drawing/2017/decorative" val="1"/>
+              </a:ext>
+            </a:extLst>
+          </p:cNvPr>
+          <p:cNvCxnSpPr>
+            <a:cxnSpLocks noGrp="1" noRot="1" noChangeAspect="1" noMove="1" noResize="1" noEditPoints="1" noAdjustHandles="1" noChangeArrowheads="1" noChangeShapeType="1"/>
+          </p:cNvCxnSpPr>
+          <p:nvPr>
+            <p:extLst>
+              <p:ext uri="{386F3935-93C4-4BCD-93E2-E3B085C9AB24}">
+                <p16:designElem xmlns:p16="http://schemas.microsoft.com/office/powerpoint/2015/main" val="1"/>
+              </p:ext>
+            </p:extLst>
+          </p:nvPr>
+        </p:nvCxnSpPr>
+        <p:spPr>
+          <a:xfrm>
+            <a:off x="4724400" y="1479733"/>
+            <a:ext cx="2743200" cy="0"/>
+          </a:xfrm>
+          <a:prstGeom prst="line">
+            <a:avLst/>
+          </a:prstGeom>
+          <a:ln w="19050">
+            <a:solidFill>
+              <a:schemeClr val="bg1">
+                <a:alpha val="75000"/>
+              </a:schemeClr>
+            </a:solidFill>
+          </a:ln>
+        </p:spPr>
+        <p:style>
+          <a:lnRef idx="1">
+            <a:schemeClr val="accent1"/>
+          </a:lnRef>
+          <a:fillRef idx="0">
+            <a:schemeClr val="accent1"/>
+          </a:fillRef>
+          <a:effectRef idx="0">
+            <a:schemeClr val="accent1"/>
+          </a:effectRef>
+          <a:fontRef idx="minor">
+            <a:schemeClr val="tx1"/>
+          </a:fontRef>
+        </p:style>
+      </p:cxnSp>
+      <p:cxnSp>
+        <p:nvCxnSpPr>
+          <p:cNvPr id="16" name="Straight Connector 15">
+            <a:extLst>
+              <a:ext uri="{FF2B5EF4-FFF2-40B4-BE49-F238E27FC236}">
+                <a16:creationId xmlns:a16="http://schemas.microsoft.com/office/drawing/2014/main" id="{AD7193FB-6AE6-4B3B-8F89-56B55DD63B4D}"/>
+              </a:ext>
+              <a:ext uri="{C183D7F6-B498-43B3-948B-1728B52AA6E4}">
+                <adec:decorative xmlns:adec="http://schemas.microsoft.com/office/drawing/2017/decorative" val="1"/>
+              </a:ext>
+            </a:extLst>
+          </p:cNvPr>
+          <p:cNvCxnSpPr>
+            <a:cxnSpLocks noGrp="1" noRot="1" noChangeAspect="1" noMove="1" noResize="1" noEditPoints="1" noAdjustHandles="1" noChangeArrowheads="1" noChangeShapeType="1"/>
+          </p:cNvCxnSpPr>
+          <p:nvPr>
+            <p:extLst>
+              <p:ext uri="{386F3935-93C4-4BCD-93E2-E3B085C9AB24}">
+                <p16:designElem xmlns:p16="http://schemas.microsoft.com/office/powerpoint/2015/main" val="1"/>
+              </p:ext>
+            </p:extLst>
+          </p:nvPr>
+        </p:nvCxnSpPr>
+        <p:spPr bwMode="white">
+          <a:xfrm>
+            <a:off x="0" y="2201402"/>
+            <a:ext cx="12188824" cy="0"/>
+          </a:xfrm>
+          <a:prstGeom prst="line">
+            <a:avLst/>
+          </a:prstGeom>
+          <a:ln w="50800">
+            <a:solidFill>
+              <a:schemeClr val="tx1">
+                <a:lumMod val="75000"/>
+                <a:lumOff val="25000"/>
+              </a:schemeClr>
+            </a:solidFill>
+          </a:ln>
+        </p:spPr>
+        <p:style>
+          <a:lnRef idx="1">
+            <a:schemeClr val="accent1"/>
+          </a:lnRef>
+          <a:fillRef idx="0">
+            <a:schemeClr val="accent1"/>
+          </a:fillRef>
+          <a:effectRef idx="0">
+            <a:schemeClr val="accent1"/>
+          </a:effectRef>
+          <a:fontRef idx="minor">
+            <a:schemeClr val="tx1"/>
+          </a:fontRef>
+        </p:style>
+      </p:cxnSp>
+      <p:pic>
+        <p:nvPicPr>
+          <p:cNvPr id="5" name="Content Placeholder 4" descr="Table&#10;&#10;Description automatically generated">
+            <a:extLst>
+              <a:ext uri="{FF2B5EF4-FFF2-40B4-BE49-F238E27FC236}">
+                <a16:creationId xmlns:a16="http://schemas.microsoft.com/office/drawing/2014/main" id="{DAE489DE-59D8-B36D-6227-B7004C7B4443}"/>
+              </a:ext>
+            </a:extLst>
+          </p:cNvPr>
+          <p:cNvPicPr>
+            <a:picLocks noGrp="1" noChangeAspect="1"/>
+          </p:cNvPicPr>
+          <p:nvPr>
+            <p:ph idx="1"/>
+          </p:nvPr>
+        </p:nvPicPr>
+        <p:blipFill>
+          <a:blip r:embed="rId2"/>
+          <a:stretch>
+            <a:fillRect/>
+          </a:stretch>
+        </p:blipFill>
+        <p:spPr>
+          <a:xfrm>
+            <a:off x="808401" y="2427541"/>
+            <a:ext cx="10520098" cy="3997637"/>
+          </a:xfrm>
+          <a:prstGeom prst="rect">
+            <a:avLst/>
+          </a:prstGeom>
+        </p:spPr>
+      </p:pic>
+    </p:spTree>
+    <p:extLst>
+      <p:ext uri="{BB962C8B-B14F-4D97-AF65-F5344CB8AC3E}">
+        <p14:creationId xmlns:p14="http://schemas.microsoft.com/office/powerpoint/2010/main" val="2597843163"/>
+      </p:ext>
+    </p:extLst>
+  </p:cSld>
+  <p:clrMapOvr>
+    <a:masterClrMapping/>
+  </p:clrMapOvr>
+</p:sld>
+</file>
+
+<file path=ppt/slides/slide19.xml><?xml version="1.0" encoding="utf-8"?>
 <p:sld xmlns:a="http://schemas.openxmlformats.org/drawingml/2006/main" xmlns:r="http://schemas.openxmlformats.org/officeDocument/2006/relationships" xmlns:p="http://schemas.openxmlformats.org/presentationml/2006/main">
   <p:cSld>
     <p:bg>

</xml_diff>